<commit_message>
changed figures to png
</commit_message>
<xml_diff>
--- a/figures/drawing-board.pptx
+++ b/figures/drawing-board.pptx
@@ -105,6 +105,11 @@
       </a:defRPr>
     </a:lvl9pPr>
   </p:defaultTextStyle>
+  <p:extLst>
+    <p:ext uri="{EFAFB233-063F-42B5-8137-9DF3F51BA10A}">
+      <p15:sldGuideLst xmlns:p15="http://schemas.microsoft.com/office/powerpoint/2012/main"/>
+    </p:ext>
+  </p:extLst>
 </p:presentation>
 </file>
 

</xml_diff>

<commit_message>
annotated ML10M genre prediction for Miguel
</commit_message>
<xml_diff>
--- a/figures/drawing-board.pptx
+++ b/figures/drawing-board.pptx
@@ -6654,8 +6654,8 @@
         </p:nvSpPr>
         <p:spPr>
           <a:xfrm>
-            <a:off x="299498" y="297952"/>
-            <a:ext cx="3053686" cy="584775"/>
+            <a:off x="719300" y="666920"/>
+            <a:ext cx="2238258" cy="400110"/>
           </a:xfrm>
           <a:prstGeom prst="rect">
             <a:avLst/>
@@ -6669,13 +6669,13 @@
           <a:lstStyle/>
           <a:p>
             <a:r>
-              <a:rPr lang="en-US" sz="3200" dirty="0">
+              <a:rPr lang="en-US" sz="2000" dirty="0">
                 <a:latin typeface="Roboto Medium" panose="02000000000000000000" pitchFamily="2" charset="0"/>
                 <a:ea typeface="Roboto Medium" panose="02000000000000000000" pitchFamily="2" charset="0"/>
               </a:rPr>
               <a:t>Ratings model</a:t>
             </a:r>
-            <a:endParaRPr lang="en-NZ" sz="3200" dirty="0">
+            <a:endParaRPr lang="en-NZ" sz="2000" dirty="0">
               <a:latin typeface="Roboto Medium" panose="02000000000000000000" pitchFamily="2" charset="0"/>
               <a:ea typeface="Roboto Medium" panose="02000000000000000000" pitchFamily="2" charset="0"/>
             </a:endParaRPr>
@@ -11837,8 +11837,8 @@
         </p:nvSpPr>
         <p:spPr>
           <a:xfrm>
-            <a:off x="350025" y="346381"/>
-            <a:ext cx="3053686" cy="584775"/>
+            <a:off x="761114" y="687410"/>
+            <a:ext cx="3053686" cy="400110"/>
           </a:xfrm>
           <a:prstGeom prst="rect">
             <a:avLst/>
@@ -11852,13 +11852,55 @@
           <a:lstStyle/>
           <a:p>
             <a:r>
-              <a:rPr lang="en-US" sz="3200" dirty="0">
+              <a:rPr lang="en-US" sz="2000" dirty="0">
                 <a:latin typeface="Roboto Medium" panose="02000000000000000000" pitchFamily="2" charset="0"/>
                 <a:ea typeface="Roboto Medium" panose="02000000000000000000" pitchFamily="2" charset="0"/>
               </a:rPr>
               <a:t>Genre model</a:t>
             </a:r>
-            <a:endParaRPr lang="en-NZ" sz="3200" dirty="0">
+            <a:endParaRPr lang="en-NZ" sz="2000" dirty="0">
+              <a:latin typeface="Roboto Medium" panose="02000000000000000000" pitchFamily="2" charset="0"/>
+              <a:ea typeface="Roboto Medium" panose="02000000000000000000" pitchFamily="2" charset="0"/>
+            </a:endParaRPr>
+          </a:p>
+        </p:txBody>
+      </p:sp>
+      <p:sp>
+        <p:nvSpPr>
+          <p:cNvPr id="125" name="TextBox 124">
+            <a:extLst>
+              <a:ext uri="{FF2B5EF4-FFF2-40B4-BE49-F238E27FC236}">
+                <a16:creationId xmlns:a16="http://schemas.microsoft.com/office/drawing/2014/main" id="{D4652CC3-502F-4963-8221-A2A4E987240D}"/>
+              </a:ext>
+            </a:extLst>
+          </p:cNvPr>
+          <p:cNvSpPr txBox="1"/>
+          <p:nvPr/>
+        </p:nvSpPr>
+        <p:spPr>
+          <a:xfrm>
+            <a:off x="4090989" y="4214307"/>
+            <a:ext cx="2238258" cy="738664"/>
+          </a:xfrm>
+          <a:prstGeom prst="rect">
+            <a:avLst/>
+          </a:prstGeom>
+          <a:noFill/>
+        </p:spPr>
+        <p:txBody>
+          <a:bodyPr wrap="square" rtlCol="0">
+            <a:spAutoFit/>
+          </a:bodyPr>
+          <a:lstStyle/>
+          <a:p>
+            <a:r>
+              <a:rPr lang="en-US" sz="1400" dirty="0">
+                <a:latin typeface="Roboto Medium" panose="02000000000000000000" pitchFamily="2" charset="0"/>
+                <a:ea typeface="Roboto Medium" panose="02000000000000000000" pitchFamily="2" charset="0"/>
+              </a:rPr>
+              <a:t>Re-use pre-trained item embedding layer for genre prediction</a:t>
+            </a:r>
+            <a:endParaRPr lang="en-NZ" sz="1400" dirty="0">
               <a:latin typeface="Roboto Medium" panose="02000000000000000000" pitchFamily="2" charset="0"/>
               <a:ea typeface="Roboto Medium" panose="02000000000000000000" pitchFamily="2" charset="0"/>
             </a:endParaRPr>

</xml_diff>

<commit_message>
changed model architecture diagrams to pdf
</commit_message>
<xml_diff>
--- a/figures/drawing-board.pptx
+++ b/figures/drawing-board.pptx
@@ -5,8 +5,9 @@
     <p:sldMasterId id="2147483648" r:id="rId1"/>
   </p:sldMasterIdLst>
   <p:sldIdLst>
-    <p:sldId id="256" r:id="rId2"/>
-    <p:sldId id="257" r:id="rId3"/>
+    <p:sldId id="258" r:id="rId2"/>
+    <p:sldId id="259" r:id="rId3"/>
+    <p:sldId id="257" r:id="rId4"/>
   </p:sldIdLst>
   <p:sldSz cx="12192000" cy="6858000"/>
   <p:notesSz cx="6858000" cy="9144000"/>
@@ -262,7 +263,7 @@
           <a:p>
             <a:fld id="{7FCAF9BE-84FA-4DCA-8252-942D07F2383A}" type="datetimeFigureOut">
               <a:rPr lang="en-NZ" smtClean="0"/>
-              <a:t>2/08/2019</a:t>
+              <a:t>3/09/2019</a:t>
             </a:fld>
             <a:endParaRPr lang="en-NZ"/>
           </a:p>
@@ -462,7 +463,7 @@
           <a:p>
             <a:fld id="{7FCAF9BE-84FA-4DCA-8252-942D07F2383A}" type="datetimeFigureOut">
               <a:rPr lang="en-NZ" smtClean="0"/>
-              <a:t>2/08/2019</a:t>
+              <a:t>3/09/2019</a:t>
             </a:fld>
             <a:endParaRPr lang="en-NZ"/>
           </a:p>
@@ -672,7 +673,7 @@
           <a:p>
             <a:fld id="{7FCAF9BE-84FA-4DCA-8252-942D07F2383A}" type="datetimeFigureOut">
               <a:rPr lang="en-NZ" smtClean="0"/>
-              <a:t>2/08/2019</a:t>
+              <a:t>3/09/2019</a:t>
             </a:fld>
             <a:endParaRPr lang="en-NZ"/>
           </a:p>
@@ -872,7 +873,7 @@
           <a:p>
             <a:fld id="{7FCAF9BE-84FA-4DCA-8252-942D07F2383A}" type="datetimeFigureOut">
               <a:rPr lang="en-NZ" smtClean="0"/>
-              <a:t>2/08/2019</a:t>
+              <a:t>3/09/2019</a:t>
             </a:fld>
             <a:endParaRPr lang="en-NZ"/>
           </a:p>
@@ -1148,7 +1149,7 @@
           <a:p>
             <a:fld id="{7FCAF9BE-84FA-4DCA-8252-942D07F2383A}" type="datetimeFigureOut">
               <a:rPr lang="en-NZ" smtClean="0"/>
-              <a:t>2/08/2019</a:t>
+              <a:t>3/09/2019</a:t>
             </a:fld>
             <a:endParaRPr lang="en-NZ"/>
           </a:p>
@@ -1416,7 +1417,7 @@
           <a:p>
             <a:fld id="{7FCAF9BE-84FA-4DCA-8252-942D07F2383A}" type="datetimeFigureOut">
               <a:rPr lang="en-NZ" smtClean="0"/>
-              <a:t>2/08/2019</a:t>
+              <a:t>3/09/2019</a:t>
             </a:fld>
             <a:endParaRPr lang="en-NZ"/>
           </a:p>
@@ -1831,7 +1832,7 @@
           <a:p>
             <a:fld id="{7FCAF9BE-84FA-4DCA-8252-942D07F2383A}" type="datetimeFigureOut">
               <a:rPr lang="en-NZ" smtClean="0"/>
-              <a:t>2/08/2019</a:t>
+              <a:t>3/09/2019</a:t>
             </a:fld>
             <a:endParaRPr lang="en-NZ"/>
           </a:p>
@@ -1973,7 +1974,7 @@
           <a:p>
             <a:fld id="{7FCAF9BE-84FA-4DCA-8252-942D07F2383A}" type="datetimeFigureOut">
               <a:rPr lang="en-NZ" smtClean="0"/>
-              <a:t>2/08/2019</a:t>
+              <a:t>3/09/2019</a:t>
             </a:fld>
             <a:endParaRPr lang="en-NZ"/>
           </a:p>
@@ -2086,7 +2087,7 @@
           <a:p>
             <a:fld id="{7FCAF9BE-84FA-4DCA-8252-942D07F2383A}" type="datetimeFigureOut">
               <a:rPr lang="en-NZ" smtClean="0"/>
-              <a:t>2/08/2019</a:t>
+              <a:t>3/09/2019</a:t>
             </a:fld>
             <a:endParaRPr lang="en-NZ"/>
           </a:p>
@@ -2399,7 +2400,7 @@
           <a:p>
             <a:fld id="{7FCAF9BE-84FA-4DCA-8252-942D07F2383A}" type="datetimeFigureOut">
               <a:rPr lang="en-NZ" smtClean="0"/>
-              <a:t>2/08/2019</a:t>
+              <a:t>3/09/2019</a:t>
             </a:fld>
             <a:endParaRPr lang="en-NZ"/>
           </a:p>
@@ -2688,7 +2689,7 @@
           <a:p>
             <a:fld id="{7FCAF9BE-84FA-4DCA-8252-942D07F2383A}" type="datetimeFigureOut">
               <a:rPr lang="en-NZ" smtClean="0"/>
-              <a:t>2/08/2019</a:t>
+              <a:t>3/09/2019</a:t>
             </a:fld>
             <a:endParaRPr lang="en-NZ"/>
           </a:p>
@@ -2931,7 +2932,7 @@
           <a:p>
             <a:fld id="{7FCAF9BE-84FA-4DCA-8252-942D07F2383A}" type="datetimeFigureOut">
               <a:rPr lang="en-NZ" smtClean="0"/>
-              <a:t>2/08/2019</a:t>
+              <a:t>3/09/2019</a:t>
             </a:fld>
             <a:endParaRPr lang="en-NZ"/>
           </a:p>
@@ -6640,52 +6641,10 @@
           </a:p>
         </p:txBody>
       </p:sp>
-      <p:sp>
-        <p:nvSpPr>
-          <p:cNvPr id="280" name="TextBox 279">
-            <a:extLst>
-              <a:ext uri="{FF2B5EF4-FFF2-40B4-BE49-F238E27FC236}">
-                <a16:creationId xmlns:a16="http://schemas.microsoft.com/office/drawing/2014/main" id="{014EF51D-6B3F-4E6C-91FA-3F2BB4A1F54D}"/>
-              </a:ext>
-            </a:extLst>
-          </p:cNvPr>
-          <p:cNvSpPr txBox="1"/>
-          <p:nvPr/>
-        </p:nvSpPr>
-        <p:spPr>
-          <a:xfrm>
-            <a:off x="719300" y="666920"/>
-            <a:ext cx="2238258" cy="400110"/>
-          </a:xfrm>
-          <a:prstGeom prst="rect">
-            <a:avLst/>
-          </a:prstGeom>
-          <a:noFill/>
-        </p:spPr>
-        <p:txBody>
-          <a:bodyPr wrap="square" rtlCol="0">
-            <a:spAutoFit/>
-          </a:bodyPr>
-          <a:lstStyle/>
-          <a:p>
-            <a:r>
-              <a:rPr lang="en-US" sz="2000" dirty="0">
-                <a:latin typeface="Roboto Medium" panose="02000000000000000000" pitchFamily="2" charset="0"/>
-                <a:ea typeface="Roboto Medium" panose="02000000000000000000" pitchFamily="2" charset="0"/>
-              </a:rPr>
-              <a:t>Ratings model</a:t>
-            </a:r>
-            <a:endParaRPr lang="en-NZ" sz="2000" dirty="0">
-              <a:latin typeface="Roboto Medium" panose="02000000000000000000" pitchFamily="2" charset="0"/>
-              <a:ea typeface="Roboto Medium" panose="02000000000000000000" pitchFamily="2" charset="0"/>
-            </a:endParaRPr>
-          </a:p>
-        </p:txBody>
-      </p:sp>
     </p:spTree>
     <p:extLst>
       <p:ext uri="{BB962C8B-B14F-4D97-AF65-F5344CB8AC3E}">
-        <p14:creationId xmlns:p14="http://schemas.microsoft.com/office/powerpoint/2010/main" val="3053196277"/>
+        <p14:creationId xmlns:p14="http://schemas.microsoft.com/office/powerpoint/2010/main" val="360633783"/>
       </p:ext>
     </p:extLst>
   </p:cSld>
@@ -6696,6 +6655,838 @@
 </file>
 
 <file path=ppt/slides/slide2.xml><?xml version="1.0" encoding="utf-8"?>
+<p:sld xmlns:a="http://schemas.openxmlformats.org/drawingml/2006/main" xmlns:r="http://schemas.openxmlformats.org/officeDocument/2006/relationships" xmlns:p="http://schemas.openxmlformats.org/presentationml/2006/main" show="0">
+  <p:cSld>
+    <p:spTree>
+      <p:nvGrpSpPr>
+        <p:cNvPr id="1" name=""/>
+        <p:cNvGrpSpPr/>
+        <p:nvPr/>
+      </p:nvGrpSpPr>
+      <p:grpSpPr>
+        <a:xfrm>
+          <a:off x="0" y="0"/>
+          <a:ext cx="0" cy="0"/>
+          <a:chOff x="0" y="0"/>
+          <a:chExt cx="0" cy="0"/>
+        </a:xfrm>
+      </p:grpSpPr>
+      <p:sp>
+        <p:nvSpPr>
+          <p:cNvPr id="2" name="Rectangle: Rounded Corners 1">
+            <a:extLst>
+              <a:ext uri="{FF2B5EF4-FFF2-40B4-BE49-F238E27FC236}">
+                <a16:creationId xmlns:a16="http://schemas.microsoft.com/office/drawing/2014/main" id="{EDCC2EFA-58BA-4333-9B08-A1F35F212FC7}"/>
+              </a:ext>
+            </a:extLst>
+          </p:cNvPr>
+          <p:cNvSpPr/>
+          <p:nvPr/>
+        </p:nvSpPr>
+        <p:spPr>
+          <a:xfrm>
+            <a:off x="1476599" y="2103520"/>
+            <a:ext cx="1264227" cy="2650960"/>
+          </a:xfrm>
+          <a:prstGeom prst="roundRect">
+            <a:avLst/>
+          </a:prstGeom>
+          <a:noFill/>
+          <a:ln w="57150">
+            <a:solidFill>
+              <a:schemeClr val="tx1"/>
+            </a:solidFill>
+          </a:ln>
+        </p:spPr>
+        <p:style>
+          <a:lnRef idx="2">
+            <a:schemeClr val="accent1">
+              <a:shade val="50000"/>
+            </a:schemeClr>
+          </a:lnRef>
+          <a:fillRef idx="1">
+            <a:schemeClr val="accent1"/>
+          </a:fillRef>
+          <a:effectRef idx="0">
+            <a:schemeClr val="accent1"/>
+          </a:effectRef>
+          <a:fontRef idx="minor">
+            <a:schemeClr val="lt1"/>
+          </a:fontRef>
+        </p:style>
+        <p:txBody>
+          <a:bodyPr rtlCol="0" anchor="ctr"/>
+          <a:lstStyle/>
+          <a:p>
+            <a:pPr algn="ctr"/>
+            <a:endParaRPr lang="en-NZ"/>
+          </a:p>
+        </p:txBody>
+      </p:sp>
+      <p:sp>
+        <p:nvSpPr>
+          <p:cNvPr id="82" name="Rectangle: Rounded Corners 81">
+            <a:extLst>
+              <a:ext uri="{FF2B5EF4-FFF2-40B4-BE49-F238E27FC236}">
+                <a16:creationId xmlns:a16="http://schemas.microsoft.com/office/drawing/2014/main" id="{E0F92BB3-2AC8-4EE5-9213-1BD73D3ADDA7}"/>
+              </a:ext>
+            </a:extLst>
+          </p:cNvPr>
+          <p:cNvSpPr/>
+          <p:nvPr/>
+        </p:nvSpPr>
+        <p:spPr>
+          <a:xfrm>
+            <a:off x="7435513" y="332873"/>
+            <a:ext cx="2839451" cy="2650959"/>
+          </a:xfrm>
+          <a:prstGeom prst="roundRect">
+            <a:avLst/>
+          </a:prstGeom>
+          <a:noFill/>
+          <a:ln w="57150">
+            <a:solidFill>
+              <a:schemeClr val="tx1"/>
+            </a:solidFill>
+          </a:ln>
+        </p:spPr>
+        <p:style>
+          <a:lnRef idx="2">
+            <a:schemeClr val="accent1">
+              <a:shade val="50000"/>
+            </a:schemeClr>
+          </a:lnRef>
+          <a:fillRef idx="1">
+            <a:schemeClr val="accent1"/>
+          </a:fillRef>
+          <a:effectRef idx="0">
+            <a:schemeClr val="accent1"/>
+          </a:effectRef>
+          <a:fontRef idx="minor">
+            <a:schemeClr val="lt1"/>
+          </a:fontRef>
+        </p:style>
+        <p:txBody>
+          <a:bodyPr rtlCol="0" anchor="ctr"/>
+          <a:lstStyle/>
+          <a:p>
+            <a:pPr algn="ctr"/>
+            <a:r>
+              <a:rPr lang="en-NZ" dirty="0">
+                <a:solidFill>
+                  <a:schemeClr val="tx1"/>
+                </a:solidFill>
+              </a:rPr>
+              <a:t>Rating model</a:t>
+            </a:r>
+          </a:p>
+        </p:txBody>
+      </p:sp>
+      <p:sp>
+        <p:nvSpPr>
+          <p:cNvPr id="85" name="Rectangle: Rounded Corners 84">
+            <a:extLst>
+              <a:ext uri="{FF2B5EF4-FFF2-40B4-BE49-F238E27FC236}">
+                <a16:creationId xmlns:a16="http://schemas.microsoft.com/office/drawing/2014/main" id="{68AB004F-8E3D-4A6C-A4D2-7720F317A0C1}"/>
+              </a:ext>
+            </a:extLst>
+          </p:cNvPr>
+          <p:cNvSpPr/>
+          <p:nvPr/>
+        </p:nvSpPr>
+        <p:spPr>
+          <a:xfrm>
+            <a:off x="7395410" y="3874168"/>
+            <a:ext cx="2839451" cy="2650959"/>
+          </a:xfrm>
+          <a:prstGeom prst="roundRect">
+            <a:avLst/>
+          </a:prstGeom>
+          <a:noFill/>
+          <a:ln w="57150">
+            <a:solidFill>
+              <a:schemeClr val="tx1"/>
+            </a:solidFill>
+          </a:ln>
+        </p:spPr>
+        <p:style>
+          <a:lnRef idx="2">
+            <a:schemeClr val="accent1">
+              <a:shade val="50000"/>
+            </a:schemeClr>
+          </a:lnRef>
+          <a:fillRef idx="1">
+            <a:schemeClr val="accent1"/>
+          </a:fillRef>
+          <a:effectRef idx="0">
+            <a:schemeClr val="accent1"/>
+          </a:effectRef>
+          <a:fontRef idx="minor">
+            <a:schemeClr val="lt1"/>
+          </a:fontRef>
+        </p:style>
+        <p:txBody>
+          <a:bodyPr rtlCol="0" anchor="ctr"/>
+          <a:lstStyle/>
+          <a:p>
+            <a:pPr algn="ctr"/>
+            <a:r>
+              <a:rPr lang="en-NZ" dirty="0">
+                <a:solidFill>
+                  <a:schemeClr val="tx1"/>
+                </a:solidFill>
+              </a:rPr>
+              <a:t>Genre model</a:t>
+            </a:r>
+          </a:p>
+        </p:txBody>
+      </p:sp>
+      <p:sp>
+        <p:nvSpPr>
+          <p:cNvPr id="86" name="Flowchart: Connector 85">
+            <a:extLst>
+              <a:ext uri="{FF2B5EF4-FFF2-40B4-BE49-F238E27FC236}">
+                <a16:creationId xmlns:a16="http://schemas.microsoft.com/office/drawing/2014/main" id="{867A8189-9FB4-4948-B09B-81BE54587D11}"/>
+              </a:ext>
+            </a:extLst>
+          </p:cNvPr>
+          <p:cNvSpPr/>
+          <p:nvPr/>
+        </p:nvSpPr>
+        <p:spPr>
+          <a:xfrm>
+            <a:off x="1838713" y="2396416"/>
+            <a:ext cx="540000" cy="540000"/>
+          </a:xfrm>
+          <a:prstGeom prst="flowChartConnector">
+            <a:avLst/>
+          </a:prstGeom>
+        </p:spPr>
+        <p:style>
+          <a:lnRef idx="2">
+            <a:schemeClr val="accent1">
+              <a:shade val="50000"/>
+            </a:schemeClr>
+          </a:lnRef>
+          <a:fillRef idx="1">
+            <a:schemeClr val="accent1"/>
+          </a:fillRef>
+          <a:effectRef idx="0">
+            <a:schemeClr val="accent1"/>
+          </a:effectRef>
+          <a:fontRef idx="minor">
+            <a:schemeClr val="lt1"/>
+          </a:fontRef>
+        </p:style>
+        <p:txBody>
+          <a:bodyPr rtlCol="0" anchor="ctr"/>
+          <a:lstStyle/>
+          <a:p>
+            <a:pPr algn="ctr"/>
+            <a:endParaRPr lang="en-NZ"/>
+          </a:p>
+        </p:txBody>
+      </p:sp>
+      <p:sp>
+        <p:nvSpPr>
+          <p:cNvPr id="87" name="Flowchart: Connector 86">
+            <a:extLst>
+              <a:ext uri="{FF2B5EF4-FFF2-40B4-BE49-F238E27FC236}">
+                <a16:creationId xmlns:a16="http://schemas.microsoft.com/office/drawing/2014/main" id="{8A9D1DB8-5AB8-4C92-8725-EC4A3AF4ECAD}"/>
+              </a:ext>
+            </a:extLst>
+          </p:cNvPr>
+          <p:cNvSpPr/>
+          <p:nvPr/>
+        </p:nvSpPr>
+        <p:spPr>
+          <a:xfrm>
+            <a:off x="1838713" y="3921584"/>
+            <a:ext cx="540000" cy="540000"/>
+          </a:xfrm>
+          <a:prstGeom prst="flowChartConnector">
+            <a:avLst/>
+          </a:prstGeom>
+        </p:spPr>
+        <p:style>
+          <a:lnRef idx="2">
+            <a:schemeClr val="accent1">
+              <a:shade val="50000"/>
+            </a:schemeClr>
+          </a:lnRef>
+          <a:fillRef idx="1">
+            <a:schemeClr val="accent1"/>
+          </a:fillRef>
+          <a:effectRef idx="0">
+            <a:schemeClr val="accent1"/>
+          </a:effectRef>
+          <a:fontRef idx="minor">
+            <a:schemeClr val="lt1"/>
+          </a:fontRef>
+        </p:style>
+        <p:txBody>
+          <a:bodyPr rtlCol="0" anchor="ctr"/>
+          <a:lstStyle/>
+          <a:p>
+            <a:pPr algn="ctr"/>
+            <a:endParaRPr lang="en-NZ"/>
+          </a:p>
+        </p:txBody>
+      </p:sp>
+      <p:sp>
+        <p:nvSpPr>
+          <p:cNvPr id="88" name="Flowchart: Connector 87">
+            <a:extLst>
+              <a:ext uri="{FF2B5EF4-FFF2-40B4-BE49-F238E27FC236}">
+                <a16:creationId xmlns:a16="http://schemas.microsoft.com/office/drawing/2014/main" id="{2D54B7D9-0772-4635-A12B-53A3933AFB64}"/>
+              </a:ext>
+            </a:extLst>
+          </p:cNvPr>
+          <p:cNvSpPr/>
+          <p:nvPr/>
+        </p:nvSpPr>
+        <p:spPr>
+          <a:xfrm>
+            <a:off x="1838713" y="3159000"/>
+            <a:ext cx="540000" cy="540000"/>
+          </a:xfrm>
+          <a:prstGeom prst="flowChartConnector">
+            <a:avLst/>
+          </a:prstGeom>
+        </p:spPr>
+        <p:style>
+          <a:lnRef idx="2">
+            <a:schemeClr val="accent1">
+              <a:shade val="50000"/>
+            </a:schemeClr>
+          </a:lnRef>
+          <a:fillRef idx="1">
+            <a:schemeClr val="accent1"/>
+          </a:fillRef>
+          <a:effectRef idx="0">
+            <a:schemeClr val="accent1"/>
+          </a:effectRef>
+          <a:fontRef idx="minor">
+            <a:schemeClr val="lt1"/>
+          </a:fontRef>
+        </p:style>
+        <p:txBody>
+          <a:bodyPr rtlCol="0" anchor="ctr"/>
+          <a:lstStyle/>
+          <a:p>
+            <a:pPr algn="ctr"/>
+            <a:endParaRPr lang="en-NZ"/>
+          </a:p>
+        </p:txBody>
+      </p:sp>
+      <p:cxnSp>
+        <p:nvCxnSpPr>
+          <p:cNvPr id="7" name="Straight Arrow Connector 6">
+            <a:extLst>
+              <a:ext uri="{FF2B5EF4-FFF2-40B4-BE49-F238E27FC236}">
+                <a16:creationId xmlns:a16="http://schemas.microsoft.com/office/drawing/2014/main" id="{84D81D6A-5FCB-44E6-A0E3-6FD09E3D913A}"/>
+              </a:ext>
+            </a:extLst>
+          </p:cNvPr>
+          <p:cNvCxnSpPr>
+            <a:cxnSpLocks/>
+          </p:cNvCxnSpPr>
+          <p:nvPr/>
+        </p:nvCxnSpPr>
+        <p:spPr>
+          <a:xfrm flipV="1">
+            <a:off x="2943726" y="1658353"/>
+            <a:ext cx="2646948" cy="1500647"/>
+          </a:xfrm>
+          <a:prstGeom prst="straightConnector1">
+            <a:avLst/>
+          </a:prstGeom>
+          <a:ln w="57150">
+            <a:solidFill>
+              <a:schemeClr val="tx1"/>
+            </a:solidFill>
+            <a:tailEnd type="triangle"/>
+          </a:ln>
+        </p:spPr>
+        <p:style>
+          <a:lnRef idx="1">
+            <a:schemeClr val="accent1"/>
+          </a:lnRef>
+          <a:fillRef idx="0">
+            <a:schemeClr val="accent1"/>
+          </a:fillRef>
+          <a:effectRef idx="0">
+            <a:schemeClr val="accent1"/>
+          </a:effectRef>
+          <a:fontRef idx="minor">
+            <a:schemeClr val="tx1"/>
+          </a:fontRef>
+        </p:style>
+      </p:cxnSp>
+      <p:cxnSp>
+        <p:nvCxnSpPr>
+          <p:cNvPr id="99" name="Straight Arrow Connector 98">
+            <a:extLst>
+              <a:ext uri="{FF2B5EF4-FFF2-40B4-BE49-F238E27FC236}">
+                <a16:creationId xmlns:a16="http://schemas.microsoft.com/office/drawing/2014/main" id="{4D816D40-D20F-4E94-9D0A-1FC14C90C60C}"/>
+              </a:ext>
+            </a:extLst>
+          </p:cNvPr>
+          <p:cNvCxnSpPr>
+            <a:cxnSpLocks/>
+          </p:cNvCxnSpPr>
+          <p:nvPr/>
+        </p:nvCxnSpPr>
+        <p:spPr>
+          <a:xfrm>
+            <a:off x="2943726" y="3698999"/>
+            <a:ext cx="2646948" cy="1500647"/>
+          </a:xfrm>
+          <a:prstGeom prst="straightConnector1">
+            <a:avLst/>
+          </a:prstGeom>
+          <a:ln w="57150">
+            <a:solidFill>
+              <a:schemeClr val="tx1"/>
+            </a:solidFill>
+            <a:tailEnd type="triangle"/>
+          </a:ln>
+        </p:spPr>
+        <p:style>
+          <a:lnRef idx="1">
+            <a:schemeClr val="accent1"/>
+          </a:lnRef>
+          <a:fillRef idx="0">
+            <a:schemeClr val="accent1"/>
+          </a:fillRef>
+          <a:effectRef idx="0">
+            <a:schemeClr val="accent1"/>
+          </a:effectRef>
+          <a:fontRef idx="minor">
+            <a:schemeClr val="tx1"/>
+          </a:fontRef>
+        </p:style>
+      </p:cxnSp>
+      <p:sp>
+        <p:nvSpPr>
+          <p:cNvPr id="19" name="TextBox 18">
+            <a:extLst>
+              <a:ext uri="{FF2B5EF4-FFF2-40B4-BE49-F238E27FC236}">
+                <a16:creationId xmlns:a16="http://schemas.microsoft.com/office/drawing/2014/main" id="{1E8C21F1-CDC6-44D7-A59C-9BD98DDB954F}"/>
+              </a:ext>
+            </a:extLst>
+          </p:cNvPr>
+          <p:cNvSpPr txBox="1"/>
+          <p:nvPr/>
+        </p:nvSpPr>
+        <p:spPr>
+          <a:xfrm>
+            <a:off x="1398849" y="1234605"/>
+            <a:ext cx="1419726" cy="646331"/>
+          </a:xfrm>
+          <a:prstGeom prst="rect">
+            <a:avLst/>
+          </a:prstGeom>
+          <a:noFill/>
+        </p:spPr>
+        <p:txBody>
+          <a:bodyPr wrap="square" rtlCol="0">
+            <a:spAutoFit/>
+          </a:bodyPr>
+          <a:lstStyle/>
+          <a:p>
+            <a:pPr algn="ctr"/>
+            <a:r>
+              <a:rPr lang="en-NZ" dirty="0"/>
+              <a:t>Item embeddings</a:t>
+            </a:r>
+          </a:p>
+        </p:txBody>
+      </p:sp>
+      <p:sp>
+        <p:nvSpPr>
+          <p:cNvPr id="101" name="TextBox 100">
+            <a:extLst>
+              <a:ext uri="{FF2B5EF4-FFF2-40B4-BE49-F238E27FC236}">
+                <a16:creationId xmlns:a16="http://schemas.microsoft.com/office/drawing/2014/main" id="{360D5ADC-DF66-42AE-A593-E4021023B7DF}"/>
+              </a:ext>
+            </a:extLst>
+          </p:cNvPr>
+          <p:cNvSpPr txBox="1"/>
+          <p:nvPr/>
+        </p:nvSpPr>
+        <p:spPr>
+          <a:xfrm>
+            <a:off x="3525635" y="1019022"/>
+            <a:ext cx="1991639" cy="738664"/>
+          </a:xfrm>
+          <a:prstGeom prst="rect">
+            <a:avLst/>
+          </a:prstGeom>
+          <a:noFill/>
+        </p:spPr>
+        <p:txBody>
+          <a:bodyPr wrap="square" rtlCol="0">
+            <a:spAutoFit/>
+          </a:bodyPr>
+          <a:lstStyle/>
+          <a:p>
+            <a:r>
+              <a:rPr lang="en-NZ" sz="1400" dirty="0"/>
+              <a:t>1. Train embeddings using CF on user-item ratings data</a:t>
+            </a:r>
+          </a:p>
+        </p:txBody>
+      </p:sp>
+      <p:sp>
+        <p:nvSpPr>
+          <p:cNvPr id="102" name="TextBox 101">
+            <a:extLst>
+              <a:ext uri="{FF2B5EF4-FFF2-40B4-BE49-F238E27FC236}">
+                <a16:creationId xmlns:a16="http://schemas.microsoft.com/office/drawing/2014/main" id="{09C0A675-B4C9-4512-8652-D7E2BC0866CB}"/>
+              </a:ext>
+            </a:extLst>
+          </p:cNvPr>
+          <p:cNvSpPr txBox="1"/>
+          <p:nvPr/>
+        </p:nvSpPr>
+        <p:spPr>
+          <a:xfrm>
+            <a:off x="3504786" y="5199646"/>
+            <a:ext cx="2033336" cy="738664"/>
+          </a:xfrm>
+          <a:prstGeom prst="rect">
+            <a:avLst/>
+          </a:prstGeom>
+          <a:noFill/>
+        </p:spPr>
+        <p:txBody>
+          <a:bodyPr wrap="square" rtlCol="0">
+            <a:spAutoFit/>
+          </a:bodyPr>
+          <a:lstStyle/>
+          <a:p>
+            <a:r>
+              <a:rPr lang="en-NZ" sz="1400" dirty="0"/>
+              <a:t>2. Re-use trained embeddings in genre model</a:t>
+            </a:r>
+          </a:p>
+        </p:txBody>
+      </p:sp>
+      <p:sp>
+        <p:nvSpPr>
+          <p:cNvPr id="103" name="TextBox 102">
+            <a:extLst>
+              <a:ext uri="{FF2B5EF4-FFF2-40B4-BE49-F238E27FC236}">
+                <a16:creationId xmlns:a16="http://schemas.microsoft.com/office/drawing/2014/main" id="{2C57A745-D98F-4314-8E1B-5C73F8F06A63}"/>
+              </a:ext>
+            </a:extLst>
+          </p:cNvPr>
+          <p:cNvSpPr txBox="1"/>
+          <p:nvPr/>
+        </p:nvSpPr>
+        <p:spPr>
+          <a:xfrm>
+            <a:off x="5673300" y="1473686"/>
+            <a:ext cx="1679585" cy="369332"/>
+          </a:xfrm>
+          <a:prstGeom prst="rect">
+            <a:avLst/>
+          </a:prstGeom>
+          <a:noFill/>
+        </p:spPr>
+        <p:txBody>
+          <a:bodyPr wrap="square" rtlCol="0">
+            <a:spAutoFit/>
+          </a:bodyPr>
+          <a:lstStyle/>
+          <a:p>
+            <a:r>
+              <a:rPr lang="en-NZ" dirty="0" err="1"/>
+              <a:t>UserID</a:t>
+            </a:r>
+            <a:r>
+              <a:rPr lang="en-NZ" dirty="0"/>
+              <a:t> + </a:t>
+            </a:r>
+            <a:r>
+              <a:rPr lang="en-NZ" dirty="0" err="1"/>
+              <a:t>ItemID</a:t>
+            </a:r>
+            <a:endParaRPr lang="en-NZ" dirty="0"/>
+          </a:p>
+        </p:txBody>
+      </p:sp>
+      <p:sp>
+        <p:nvSpPr>
+          <p:cNvPr id="104" name="TextBox 103">
+            <a:extLst>
+              <a:ext uri="{FF2B5EF4-FFF2-40B4-BE49-F238E27FC236}">
+                <a16:creationId xmlns:a16="http://schemas.microsoft.com/office/drawing/2014/main" id="{83A29FBA-094D-443B-B6B5-FBEC94325695}"/>
+              </a:ext>
+            </a:extLst>
+          </p:cNvPr>
+          <p:cNvSpPr txBox="1"/>
+          <p:nvPr/>
+        </p:nvSpPr>
+        <p:spPr>
+          <a:xfrm>
+            <a:off x="5653249" y="5014980"/>
+            <a:ext cx="1679585" cy="369332"/>
+          </a:xfrm>
+          <a:prstGeom prst="rect">
+            <a:avLst/>
+          </a:prstGeom>
+          <a:noFill/>
+        </p:spPr>
+        <p:txBody>
+          <a:bodyPr wrap="square" rtlCol="0">
+            <a:spAutoFit/>
+          </a:bodyPr>
+          <a:lstStyle/>
+          <a:p>
+            <a:pPr algn="ctr"/>
+            <a:r>
+              <a:rPr lang="en-NZ" dirty="0" err="1"/>
+              <a:t>ItemID</a:t>
+            </a:r>
+            <a:r>
+              <a:rPr lang="en-NZ" dirty="0"/>
+              <a:t> only</a:t>
+            </a:r>
+          </a:p>
+        </p:txBody>
+      </p:sp>
+      <p:sp>
+        <p:nvSpPr>
+          <p:cNvPr id="105" name="TextBox 104">
+            <a:extLst>
+              <a:ext uri="{FF2B5EF4-FFF2-40B4-BE49-F238E27FC236}">
+                <a16:creationId xmlns:a16="http://schemas.microsoft.com/office/drawing/2014/main" id="{F8F83C98-8112-4821-A85C-1E76CD2D8C25}"/>
+              </a:ext>
+            </a:extLst>
+          </p:cNvPr>
+          <p:cNvSpPr txBox="1"/>
+          <p:nvPr/>
+        </p:nvSpPr>
+        <p:spPr>
+          <a:xfrm>
+            <a:off x="10582183" y="1473686"/>
+            <a:ext cx="831776" cy="369332"/>
+          </a:xfrm>
+          <a:prstGeom prst="rect">
+            <a:avLst/>
+          </a:prstGeom>
+          <a:noFill/>
+        </p:spPr>
+        <p:txBody>
+          <a:bodyPr wrap="square" rtlCol="0">
+            <a:spAutoFit/>
+          </a:bodyPr>
+          <a:lstStyle/>
+          <a:p>
+            <a:pPr algn="ctr"/>
+            <a:r>
+              <a:rPr lang="en-NZ" dirty="0"/>
+              <a:t>Rating</a:t>
+            </a:r>
+          </a:p>
+        </p:txBody>
+      </p:sp>
+      <p:sp>
+        <p:nvSpPr>
+          <p:cNvPr id="106" name="TextBox 105">
+            <a:extLst>
+              <a:ext uri="{FF2B5EF4-FFF2-40B4-BE49-F238E27FC236}">
+                <a16:creationId xmlns:a16="http://schemas.microsoft.com/office/drawing/2014/main" id="{2442E200-BD91-40DC-B7DA-8C985AD14E15}"/>
+              </a:ext>
+            </a:extLst>
+          </p:cNvPr>
+          <p:cNvSpPr txBox="1"/>
+          <p:nvPr/>
+        </p:nvSpPr>
+        <p:spPr>
+          <a:xfrm>
+            <a:off x="10582183" y="5014980"/>
+            <a:ext cx="831776" cy="369332"/>
+          </a:xfrm>
+          <a:prstGeom prst="rect">
+            <a:avLst/>
+          </a:prstGeom>
+          <a:noFill/>
+        </p:spPr>
+        <p:txBody>
+          <a:bodyPr wrap="square" rtlCol="0">
+            <a:spAutoFit/>
+          </a:bodyPr>
+          <a:lstStyle/>
+          <a:p>
+            <a:pPr algn="ctr"/>
+            <a:r>
+              <a:rPr lang="en-NZ" dirty="0"/>
+              <a:t>Genre</a:t>
+            </a:r>
+          </a:p>
+        </p:txBody>
+      </p:sp>
+      <p:sp>
+        <p:nvSpPr>
+          <p:cNvPr id="107" name="TextBox 106">
+            <a:extLst>
+              <a:ext uri="{FF2B5EF4-FFF2-40B4-BE49-F238E27FC236}">
+                <a16:creationId xmlns:a16="http://schemas.microsoft.com/office/drawing/2014/main" id="{8BCE4FD6-0E07-412B-86A0-826C55A1EC75}"/>
+              </a:ext>
+            </a:extLst>
+          </p:cNvPr>
+          <p:cNvSpPr txBox="1"/>
+          <p:nvPr/>
+        </p:nvSpPr>
+        <p:spPr>
+          <a:xfrm>
+            <a:off x="6147337" y="865133"/>
+            <a:ext cx="731509" cy="307777"/>
+          </a:xfrm>
+          <a:prstGeom prst="rect">
+            <a:avLst/>
+          </a:prstGeom>
+          <a:noFill/>
+        </p:spPr>
+        <p:txBody>
+          <a:bodyPr wrap="square" rtlCol="0">
+            <a:spAutoFit/>
+          </a:bodyPr>
+          <a:lstStyle/>
+          <a:p>
+            <a:pPr algn="ctr"/>
+            <a:r>
+              <a:rPr lang="en-NZ" sz="1400" dirty="0"/>
+              <a:t>Inputs:</a:t>
+            </a:r>
+          </a:p>
+        </p:txBody>
+      </p:sp>
+      <p:sp>
+        <p:nvSpPr>
+          <p:cNvPr id="108" name="TextBox 107">
+            <a:extLst>
+              <a:ext uri="{FF2B5EF4-FFF2-40B4-BE49-F238E27FC236}">
+                <a16:creationId xmlns:a16="http://schemas.microsoft.com/office/drawing/2014/main" id="{94014B8D-FD5E-4AF2-8B1D-9B22E82AFFF6}"/>
+              </a:ext>
+            </a:extLst>
+          </p:cNvPr>
+          <p:cNvSpPr txBox="1"/>
+          <p:nvPr/>
+        </p:nvSpPr>
+        <p:spPr>
+          <a:xfrm>
+            <a:off x="6127286" y="4600591"/>
+            <a:ext cx="731509" cy="307777"/>
+          </a:xfrm>
+          <a:prstGeom prst="rect">
+            <a:avLst/>
+          </a:prstGeom>
+          <a:noFill/>
+        </p:spPr>
+        <p:txBody>
+          <a:bodyPr wrap="square" rtlCol="0">
+            <a:spAutoFit/>
+          </a:bodyPr>
+          <a:lstStyle/>
+          <a:p>
+            <a:pPr algn="ctr"/>
+            <a:r>
+              <a:rPr lang="en-NZ" sz="1400" dirty="0"/>
+              <a:t>Input:</a:t>
+            </a:r>
+          </a:p>
+        </p:txBody>
+      </p:sp>
+      <p:sp>
+        <p:nvSpPr>
+          <p:cNvPr id="109" name="TextBox 108">
+            <a:extLst>
+              <a:ext uri="{FF2B5EF4-FFF2-40B4-BE49-F238E27FC236}">
+                <a16:creationId xmlns:a16="http://schemas.microsoft.com/office/drawing/2014/main" id="{2AFEEE3F-1216-4D22-BA9F-5FCAC0D79D37}"/>
+              </a:ext>
+            </a:extLst>
+          </p:cNvPr>
+          <p:cNvSpPr txBox="1"/>
+          <p:nvPr/>
+        </p:nvSpPr>
+        <p:spPr>
+          <a:xfrm>
+            <a:off x="10632316" y="865133"/>
+            <a:ext cx="781643" cy="307777"/>
+          </a:xfrm>
+          <a:prstGeom prst="rect">
+            <a:avLst/>
+          </a:prstGeom>
+          <a:noFill/>
+        </p:spPr>
+        <p:txBody>
+          <a:bodyPr wrap="square" rtlCol="0">
+            <a:spAutoFit/>
+          </a:bodyPr>
+          <a:lstStyle/>
+          <a:p>
+            <a:pPr algn="ctr"/>
+            <a:r>
+              <a:rPr lang="en-NZ" sz="1400" dirty="0"/>
+              <a:t>Output:</a:t>
+            </a:r>
+          </a:p>
+        </p:txBody>
+      </p:sp>
+      <p:sp>
+        <p:nvSpPr>
+          <p:cNvPr id="110" name="TextBox 109">
+            <a:extLst>
+              <a:ext uri="{FF2B5EF4-FFF2-40B4-BE49-F238E27FC236}">
+                <a16:creationId xmlns:a16="http://schemas.microsoft.com/office/drawing/2014/main" id="{B709BDAB-581A-4421-8E1D-7808F59897D3}"/>
+              </a:ext>
+            </a:extLst>
+          </p:cNvPr>
+          <p:cNvSpPr txBox="1"/>
+          <p:nvPr/>
+        </p:nvSpPr>
+        <p:spPr>
+          <a:xfrm>
+            <a:off x="10607249" y="4602427"/>
+            <a:ext cx="781643" cy="307777"/>
+          </a:xfrm>
+          <a:prstGeom prst="rect">
+            <a:avLst/>
+          </a:prstGeom>
+          <a:noFill/>
+        </p:spPr>
+        <p:txBody>
+          <a:bodyPr wrap="square" rtlCol="0">
+            <a:spAutoFit/>
+          </a:bodyPr>
+          <a:lstStyle/>
+          <a:p>
+            <a:pPr algn="ctr"/>
+            <a:r>
+              <a:rPr lang="en-NZ" sz="1400" dirty="0"/>
+              <a:t>Output:</a:t>
+            </a:r>
+          </a:p>
+        </p:txBody>
+      </p:sp>
+    </p:spTree>
+    <p:extLst>
+      <p:ext uri="{BB962C8B-B14F-4D97-AF65-F5344CB8AC3E}">
+        <p14:creationId xmlns:p14="http://schemas.microsoft.com/office/powerpoint/2010/main" val="3929515876"/>
+      </p:ext>
+    </p:extLst>
+  </p:cSld>
+  <p:clrMapOvr>
+    <a:masterClrMapping/>
+  </p:clrMapOvr>
+</p:sld>
+</file>
+
+<file path=ppt/slides/slide3.xml><?xml version="1.0" encoding="utf-8"?>
 <p:sld xmlns:a="http://schemas.openxmlformats.org/drawingml/2006/main" xmlns:r="http://schemas.openxmlformats.org/officeDocument/2006/relationships" xmlns:p="http://schemas.openxmlformats.org/presentationml/2006/main">
   <p:cSld>
     <p:spTree>
@@ -11825,48 +12616,6 @@
       </p:sp>
       <p:sp>
         <p:nvSpPr>
-          <p:cNvPr id="207" name="TextBox 206">
-            <a:extLst>
-              <a:ext uri="{FF2B5EF4-FFF2-40B4-BE49-F238E27FC236}">
-                <a16:creationId xmlns:a16="http://schemas.microsoft.com/office/drawing/2014/main" id="{C9B9ABE1-79FF-48BD-8FAB-E1FE7BB8423D}"/>
-              </a:ext>
-            </a:extLst>
-          </p:cNvPr>
-          <p:cNvSpPr txBox="1"/>
-          <p:nvPr/>
-        </p:nvSpPr>
-        <p:spPr>
-          <a:xfrm>
-            <a:off x="761114" y="687410"/>
-            <a:ext cx="3053686" cy="400110"/>
-          </a:xfrm>
-          <a:prstGeom prst="rect">
-            <a:avLst/>
-          </a:prstGeom>
-          <a:noFill/>
-        </p:spPr>
-        <p:txBody>
-          <a:bodyPr wrap="square" rtlCol="0">
-            <a:spAutoFit/>
-          </a:bodyPr>
-          <a:lstStyle/>
-          <a:p>
-            <a:r>
-              <a:rPr lang="en-US" sz="2000" dirty="0">
-                <a:latin typeface="Roboto Medium" panose="02000000000000000000" pitchFamily="2" charset="0"/>
-                <a:ea typeface="Roboto Medium" panose="02000000000000000000" pitchFamily="2" charset="0"/>
-              </a:rPr>
-              <a:t>Genre model</a:t>
-            </a:r>
-            <a:endParaRPr lang="en-NZ" sz="2000" dirty="0">
-              <a:latin typeface="Roboto Medium" panose="02000000000000000000" pitchFamily="2" charset="0"/>
-              <a:ea typeface="Roboto Medium" panose="02000000000000000000" pitchFamily="2" charset="0"/>
-            </a:endParaRPr>
-          </a:p>
-        </p:txBody>
-      </p:sp>
-      <p:sp>
-        <p:nvSpPr>
           <p:cNvPr id="125" name="TextBox 124">
             <a:extLst>
               <a:ext uri="{FF2B5EF4-FFF2-40B4-BE49-F238E27FC236}">

</xml_diff>

<commit_message>
added CGT concept diagram
</commit_message>
<xml_diff>
--- a/figures/drawing-board.pptx
+++ b/figures/drawing-board.pptx
@@ -2,7 +2,7 @@
 <file path=ppt/presentation.xml><?xml version="1.0" encoding="utf-8"?>
 <p:presentation xmlns:a="http://schemas.openxmlformats.org/drawingml/2006/main" xmlns:r="http://schemas.openxmlformats.org/officeDocument/2006/relationships" xmlns:p="http://schemas.openxmlformats.org/presentationml/2006/main" saveSubsetFonts="1">
   <p:sldMasterIdLst>
-    <p:sldMasterId id="2147483732" r:id="rId1"/>
+    <p:sldMasterId id="2147483744" r:id="rId1"/>
   </p:sldMasterIdLst>
   <p:sldIdLst>
     <p:sldId id="258" r:id="rId2"/>
@@ -12,8 +12,9 @@
     <p:sldId id="259" r:id="rId6"/>
     <p:sldId id="257" r:id="rId7"/>
     <p:sldId id="263" r:id="rId8"/>
+    <p:sldId id="264" r:id="rId9"/>
   </p:sldIdLst>
-  <p:sldSz cx="9144000" cy="6858000" type="screen4x3"/>
+  <p:sldSz cx="12192000" cy="6858000"/>
   <p:notesSz cx="6858000" cy="9144000"/>
   <p:defaultTextStyle>
     <a:defPPr>
@@ -118,7 +119,7 @@
             <a:srgbClr val="A4A3A4"/>
           </p15:clr>
         </p15:guide>
-        <p15:guide id="2" pos="2914" userDrawn="1">
+        <p15:guide id="2" pos="3885" userDrawn="1">
           <p15:clr>
             <a:srgbClr val="A4A3A4"/>
           </p15:clr>
@@ -158,8 +159,8 @@
         </p:nvSpPr>
         <p:spPr>
           <a:xfrm>
-            <a:off x="685800" y="1122363"/>
-            <a:ext cx="7772400" cy="2387600"/>
+            <a:off x="1524000" y="1122363"/>
+            <a:ext cx="9144000" cy="2387600"/>
           </a:xfrm>
         </p:spPr>
         <p:txBody>
@@ -190,8 +191,8 @@
         </p:nvSpPr>
         <p:spPr>
           <a:xfrm>
-            <a:off x="1143000" y="3602038"/>
-            <a:ext cx="6858000" cy="1655762"/>
+            <a:off x="1524000" y="3602038"/>
+            <a:ext cx="9144000" cy="1655762"/>
           </a:xfrm>
         </p:spPr>
         <p:txBody>
@@ -260,7 +261,7 @@
           <a:p>
             <a:fld id="{7FCAF9BE-84FA-4DCA-8252-942D07F2383A}" type="datetimeFigureOut">
               <a:rPr lang="en-NZ" smtClean="0"/>
-              <a:t>12/09/2019</a:t>
+              <a:t>23/09/2019</a:t>
             </a:fld>
             <a:endParaRPr lang="en-NZ"/>
           </a:p>
@@ -311,7 +312,7 @@
     </p:spTree>
     <p:extLst>
       <p:ext uri="{BB962C8B-B14F-4D97-AF65-F5344CB8AC3E}">
-        <p14:creationId xmlns:p14="http://schemas.microsoft.com/office/powerpoint/2010/main" val="1696168851"/>
+        <p14:creationId xmlns:p14="http://schemas.microsoft.com/office/powerpoint/2010/main" val="3089563490"/>
       </p:ext>
     </p:extLst>
   </p:cSld>
@@ -430,7 +431,7 @@
           <a:p>
             <a:fld id="{7FCAF9BE-84FA-4DCA-8252-942D07F2383A}" type="datetimeFigureOut">
               <a:rPr lang="en-NZ" smtClean="0"/>
-              <a:t>12/09/2019</a:t>
+              <a:t>23/09/2019</a:t>
             </a:fld>
             <a:endParaRPr lang="en-NZ"/>
           </a:p>
@@ -481,7 +482,7 @@
     </p:spTree>
     <p:extLst>
       <p:ext uri="{BB962C8B-B14F-4D97-AF65-F5344CB8AC3E}">
-        <p14:creationId xmlns:p14="http://schemas.microsoft.com/office/powerpoint/2010/main" val="2059505777"/>
+        <p14:creationId xmlns:p14="http://schemas.microsoft.com/office/powerpoint/2010/main" val="3758139994"/>
       </p:ext>
     </p:extLst>
   </p:cSld>
@@ -520,8 +521,8 @@
         </p:nvSpPr>
         <p:spPr>
           <a:xfrm>
-            <a:off x="6543675" y="365125"/>
-            <a:ext cx="1971675" cy="5811838"/>
+            <a:off x="8724900" y="365125"/>
+            <a:ext cx="2628900" cy="5811838"/>
           </a:xfrm>
         </p:spPr>
         <p:txBody>
@@ -548,8 +549,8 @@
         </p:nvSpPr>
         <p:spPr>
           <a:xfrm>
-            <a:off x="628650" y="365125"/>
-            <a:ext cx="5800725" cy="5811838"/>
+            <a:off x="838200" y="365125"/>
+            <a:ext cx="7734300" cy="5811838"/>
           </a:xfrm>
         </p:spPr>
         <p:txBody>
@@ -610,7 +611,7 @@
           <a:p>
             <a:fld id="{7FCAF9BE-84FA-4DCA-8252-942D07F2383A}" type="datetimeFigureOut">
               <a:rPr lang="en-NZ" smtClean="0"/>
-              <a:t>12/09/2019</a:t>
+              <a:t>23/09/2019</a:t>
             </a:fld>
             <a:endParaRPr lang="en-NZ"/>
           </a:p>
@@ -661,7 +662,7 @@
     </p:spTree>
     <p:extLst>
       <p:ext uri="{BB962C8B-B14F-4D97-AF65-F5344CB8AC3E}">
-        <p14:creationId xmlns:p14="http://schemas.microsoft.com/office/powerpoint/2010/main" val="2154194452"/>
+        <p14:creationId xmlns:p14="http://schemas.microsoft.com/office/powerpoint/2010/main" val="973810842"/>
       </p:ext>
     </p:extLst>
   </p:cSld>
@@ -780,7 +781,7 @@
           <a:p>
             <a:fld id="{7FCAF9BE-84FA-4DCA-8252-942D07F2383A}" type="datetimeFigureOut">
               <a:rPr lang="en-NZ" smtClean="0"/>
-              <a:t>12/09/2019</a:t>
+              <a:t>23/09/2019</a:t>
             </a:fld>
             <a:endParaRPr lang="en-NZ"/>
           </a:p>
@@ -831,7 +832,7 @@
     </p:spTree>
     <p:extLst>
       <p:ext uri="{BB962C8B-B14F-4D97-AF65-F5344CB8AC3E}">
-        <p14:creationId xmlns:p14="http://schemas.microsoft.com/office/powerpoint/2010/main" val="3053587209"/>
+        <p14:creationId xmlns:p14="http://schemas.microsoft.com/office/powerpoint/2010/main" val="905995784"/>
       </p:ext>
     </p:extLst>
   </p:cSld>
@@ -870,8 +871,8 @@
         </p:nvSpPr>
         <p:spPr>
           <a:xfrm>
-            <a:off x="623888" y="1709739"/>
-            <a:ext cx="7886700" cy="2852737"/>
+            <a:off x="831850" y="1709738"/>
+            <a:ext cx="10515600" cy="2852737"/>
           </a:xfrm>
         </p:spPr>
         <p:txBody>
@@ -902,8 +903,8 @@
         </p:nvSpPr>
         <p:spPr>
           <a:xfrm>
-            <a:off x="623888" y="4589464"/>
-            <a:ext cx="7886700" cy="1500187"/>
+            <a:off x="831850" y="4589463"/>
+            <a:ext cx="10515600" cy="1500187"/>
           </a:xfrm>
         </p:spPr>
         <p:txBody>
@@ -913,7 +914,9 @@
               <a:buNone/>
               <a:defRPr sz="2400">
                 <a:solidFill>
-                  <a:schemeClr val="tx1"/>
+                  <a:schemeClr val="tx1">
+                    <a:tint val="75000"/>
+                  </a:schemeClr>
                 </a:solidFill>
               </a:defRPr>
             </a:lvl1pPr>
@@ -1024,7 +1027,7 @@
           <a:p>
             <a:fld id="{7FCAF9BE-84FA-4DCA-8252-942D07F2383A}" type="datetimeFigureOut">
               <a:rPr lang="en-NZ" smtClean="0"/>
-              <a:t>12/09/2019</a:t>
+              <a:t>23/09/2019</a:t>
             </a:fld>
             <a:endParaRPr lang="en-NZ"/>
           </a:p>
@@ -1075,7 +1078,7 @@
     </p:spTree>
     <p:extLst>
       <p:ext uri="{BB962C8B-B14F-4D97-AF65-F5344CB8AC3E}">
-        <p14:creationId xmlns:p14="http://schemas.microsoft.com/office/powerpoint/2010/main" val="2596826148"/>
+        <p14:creationId xmlns:p14="http://schemas.microsoft.com/office/powerpoint/2010/main" val="2082350237"/>
       </p:ext>
     </p:extLst>
   </p:cSld>
@@ -1137,8 +1140,8 @@
         </p:nvSpPr>
         <p:spPr>
           <a:xfrm>
-            <a:off x="628650" y="1825625"/>
-            <a:ext cx="3886200" cy="4351338"/>
+            <a:off x="838200" y="1825625"/>
+            <a:ext cx="5181600" cy="4351338"/>
           </a:xfrm>
         </p:spPr>
         <p:txBody>
@@ -1194,8 +1197,8 @@
         </p:nvSpPr>
         <p:spPr>
           <a:xfrm>
-            <a:off x="4629150" y="1825625"/>
-            <a:ext cx="3886200" cy="4351338"/>
+            <a:off x="6172200" y="1825625"/>
+            <a:ext cx="5181600" cy="4351338"/>
           </a:xfrm>
         </p:spPr>
         <p:txBody>
@@ -1256,7 +1259,7 @@
           <a:p>
             <a:fld id="{7FCAF9BE-84FA-4DCA-8252-942D07F2383A}" type="datetimeFigureOut">
               <a:rPr lang="en-NZ" smtClean="0"/>
-              <a:t>12/09/2019</a:t>
+              <a:t>23/09/2019</a:t>
             </a:fld>
             <a:endParaRPr lang="en-NZ"/>
           </a:p>
@@ -1307,7 +1310,7 @@
     </p:spTree>
     <p:extLst>
       <p:ext uri="{BB962C8B-B14F-4D97-AF65-F5344CB8AC3E}">
-        <p14:creationId xmlns:p14="http://schemas.microsoft.com/office/powerpoint/2010/main" val="3018805379"/>
+        <p14:creationId xmlns:p14="http://schemas.microsoft.com/office/powerpoint/2010/main" val="1486360905"/>
       </p:ext>
     </p:extLst>
   </p:cSld>
@@ -1346,8 +1349,8 @@
         </p:nvSpPr>
         <p:spPr>
           <a:xfrm>
-            <a:off x="629841" y="365126"/>
-            <a:ext cx="7886700" cy="1325563"/>
+            <a:off x="839788" y="365125"/>
+            <a:ext cx="10515600" cy="1325563"/>
           </a:xfrm>
         </p:spPr>
         <p:txBody>
@@ -1374,8 +1377,8 @@
         </p:nvSpPr>
         <p:spPr>
           <a:xfrm>
-            <a:off x="629842" y="1681163"/>
-            <a:ext cx="3868340" cy="823912"/>
+            <a:off x="839788" y="1681163"/>
+            <a:ext cx="5157787" cy="823912"/>
           </a:xfrm>
         </p:spPr>
         <p:txBody>
@@ -1439,8 +1442,8 @@
         </p:nvSpPr>
         <p:spPr>
           <a:xfrm>
-            <a:off x="629842" y="2505075"/>
-            <a:ext cx="3868340" cy="3684588"/>
+            <a:off x="839788" y="2505075"/>
+            <a:ext cx="5157787" cy="3684588"/>
           </a:xfrm>
         </p:spPr>
         <p:txBody>
@@ -1496,8 +1499,8 @@
         </p:nvSpPr>
         <p:spPr>
           <a:xfrm>
-            <a:off x="4629150" y="1681163"/>
-            <a:ext cx="3887391" cy="823912"/>
+            <a:off x="6172200" y="1681163"/>
+            <a:ext cx="5183188" cy="823912"/>
           </a:xfrm>
         </p:spPr>
         <p:txBody>
@@ -1561,8 +1564,8 @@
         </p:nvSpPr>
         <p:spPr>
           <a:xfrm>
-            <a:off x="4629150" y="2505075"/>
-            <a:ext cx="3887391" cy="3684588"/>
+            <a:off x="6172200" y="2505075"/>
+            <a:ext cx="5183188" cy="3684588"/>
           </a:xfrm>
         </p:spPr>
         <p:txBody>
@@ -1623,7 +1626,7 @@
           <a:p>
             <a:fld id="{7FCAF9BE-84FA-4DCA-8252-942D07F2383A}" type="datetimeFigureOut">
               <a:rPr lang="en-NZ" smtClean="0"/>
-              <a:t>12/09/2019</a:t>
+              <a:t>23/09/2019</a:t>
             </a:fld>
             <a:endParaRPr lang="en-NZ"/>
           </a:p>
@@ -1674,7 +1677,7 @@
     </p:spTree>
     <p:extLst>
       <p:ext uri="{BB962C8B-B14F-4D97-AF65-F5344CB8AC3E}">
-        <p14:creationId xmlns:p14="http://schemas.microsoft.com/office/powerpoint/2010/main" val="2912523362"/>
+        <p14:creationId xmlns:p14="http://schemas.microsoft.com/office/powerpoint/2010/main" val="1045311429"/>
       </p:ext>
     </p:extLst>
   </p:cSld>
@@ -1741,7 +1744,7 @@
           <a:p>
             <a:fld id="{7FCAF9BE-84FA-4DCA-8252-942D07F2383A}" type="datetimeFigureOut">
               <a:rPr lang="en-NZ" smtClean="0"/>
-              <a:t>12/09/2019</a:t>
+              <a:t>23/09/2019</a:t>
             </a:fld>
             <a:endParaRPr lang="en-NZ"/>
           </a:p>
@@ -1792,7 +1795,7 @@
     </p:spTree>
     <p:extLst>
       <p:ext uri="{BB962C8B-B14F-4D97-AF65-F5344CB8AC3E}">
-        <p14:creationId xmlns:p14="http://schemas.microsoft.com/office/powerpoint/2010/main" val="3860181864"/>
+        <p14:creationId xmlns:p14="http://schemas.microsoft.com/office/powerpoint/2010/main" val="347327045"/>
       </p:ext>
     </p:extLst>
   </p:cSld>
@@ -1836,7 +1839,7 @@
           <a:p>
             <a:fld id="{7FCAF9BE-84FA-4DCA-8252-942D07F2383A}" type="datetimeFigureOut">
               <a:rPr lang="en-NZ" smtClean="0"/>
-              <a:t>12/09/2019</a:t>
+              <a:t>23/09/2019</a:t>
             </a:fld>
             <a:endParaRPr lang="en-NZ"/>
           </a:p>
@@ -1887,7 +1890,7 @@
     </p:spTree>
     <p:extLst>
       <p:ext uri="{BB962C8B-B14F-4D97-AF65-F5344CB8AC3E}">
-        <p14:creationId xmlns:p14="http://schemas.microsoft.com/office/powerpoint/2010/main" val="4078141391"/>
+        <p14:creationId xmlns:p14="http://schemas.microsoft.com/office/powerpoint/2010/main" val="2786892973"/>
       </p:ext>
     </p:extLst>
   </p:cSld>
@@ -1926,8 +1929,8 @@
         </p:nvSpPr>
         <p:spPr>
           <a:xfrm>
-            <a:off x="629841" y="457200"/>
-            <a:ext cx="2949178" cy="1600200"/>
+            <a:off x="839788" y="457200"/>
+            <a:ext cx="3932237" cy="1600200"/>
           </a:xfrm>
         </p:spPr>
         <p:txBody>
@@ -1958,8 +1961,8 @@
         </p:nvSpPr>
         <p:spPr>
           <a:xfrm>
-            <a:off x="3887391" y="987426"/>
-            <a:ext cx="4629150" cy="4873625"/>
+            <a:off x="5183188" y="987425"/>
+            <a:ext cx="6172200" cy="4873625"/>
           </a:xfrm>
         </p:spPr>
         <p:txBody>
@@ -2043,8 +2046,8 @@
         </p:nvSpPr>
         <p:spPr>
           <a:xfrm>
-            <a:off x="629841" y="2057400"/>
-            <a:ext cx="2949178" cy="3811588"/>
+            <a:off x="839788" y="2057400"/>
+            <a:ext cx="3932237" cy="3811588"/>
           </a:xfrm>
         </p:spPr>
         <p:txBody>
@@ -2113,7 +2116,7 @@
           <a:p>
             <a:fld id="{7FCAF9BE-84FA-4DCA-8252-942D07F2383A}" type="datetimeFigureOut">
               <a:rPr lang="en-NZ" smtClean="0"/>
-              <a:t>12/09/2019</a:t>
+              <a:t>23/09/2019</a:t>
             </a:fld>
             <a:endParaRPr lang="en-NZ"/>
           </a:p>
@@ -2164,7 +2167,7 @@
     </p:spTree>
     <p:extLst>
       <p:ext uri="{BB962C8B-B14F-4D97-AF65-F5344CB8AC3E}">
-        <p14:creationId xmlns:p14="http://schemas.microsoft.com/office/powerpoint/2010/main" val="2480269369"/>
+        <p14:creationId xmlns:p14="http://schemas.microsoft.com/office/powerpoint/2010/main" val="3474331654"/>
       </p:ext>
     </p:extLst>
   </p:cSld>
@@ -2203,8 +2206,8 @@
         </p:nvSpPr>
         <p:spPr>
           <a:xfrm>
-            <a:off x="629841" y="457200"/>
-            <a:ext cx="2949178" cy="1600200"/>
+            <a:off x="839788" y="457200"/>
+            <a:ext cx="3932237" cy="1600200"/>
           </a:xfrm>
         </p:spPr>
         <p:txBody>
@@ -2235,8 +2238,8 @@
         </p:nvSpPr>
         <p:spPr>
           <a:xfrm>
-            <a:off x="3887391" y="987426"/>
-            <a:ext cx="4629150" cy="4873625"/>
+            <a:off x="5183188" y="987425"/>
+            <a:ext cx="6172200" cy="4873625"/>
           </a:xfrm>
         </p:spPr>
         <p:txBody>
@@ -2300,8 +2303,8 @@
         </p:nvSpPr>
         <p:spPr>
           <a:xfrm>
-            <a:off x="629841" y="2057400"/>
-            <a:ext cx="2949178" cy="3811588"/>
+            <a:off x="839788" y="2057400"/>
+            <a:ext cx="3932237" cy="3811588"/>
           </a:xfrm>
         </p:spPr>
         <p:txBody>
@@ -2370,7 +2373,7 @@
           <a:p>
             <a:fld id="{7FCAF9BE-84FA-4DCA-8252-942D07F2383A}" type="datetimeFigureOut">
               <a:rPr lang="en-NZ" smtClean="0"/>
-              <a:t>12/09/2019</a:t>
+              <a:t>23/09/2019</a:t>
             </a:fld>
             <a:endParaRPr lang="en-NZ"/>
           </a:p>
@@ -2421,7 +2424,7 @@
     </p:spTree>
     <p:extLst>
       <p:ext uri="{BB962C8B-B14F-4D97-AF65-F5344CB8AC3E}">
-        <p14:creationId xmlns:p14="http://schemas.microsoft.com/office/powerpoint/2010/main" val="1504981592"/>
+        <p14:creationId xmlns:p14="http://schemas.microsoft.com/office/powerpoint/2010/main" val="2064435628"/>
       </p:ext>
     </p:extLst>
   </p:cSld>
@@ -2465,8 +2468,8 @@
         </p:nvSpPr>
         <p:spPr>
           <a:xfrm>
-            <a:off x="628650" y="365126"/>
-            <a:ext cx="7886700" cy="1325563"/>
+            <a:off x="838200" y="365125"/>
+            <a:ext cx="10515600" cy="1325563"/>
           </a:xfrm>
           <a:prstGeom prst="rect">
             <a:avLst/>
@@ -2498,8 +2501,8 @@
         </p:nvSpPr>
         <p:spPr>
           <a:xfrm>
-            <a:off x="628650" y="1825625"/>
-            <a:ext cx="7886700" cy="4351338"/>
+            <a:off x="838200" y="1825625"/>
+            <a:ext cx="10515600" cy="4351338"/>
           </a:xfrm>
           <a:prstGeom prst="rect">
             <a:avLst/>
@@ -2560,8 +2563,8 @@
         </p:nvSpPr>
         <p:spPr>
           <a:xfrm>
-            <a:off x="628650" y="6356351"/>
-            <a:ext cx="2057400" cy="365125"/>
+            <a:off x="838200" y="6356350"/>
+            <a:ext cx="2743200" cy="365125"/>
           </a:xfrm>
           <a:prstGeom prst="rect">
             <a:avLst/>
@@ -2583,7 +2586,7 @@
           <a:p>
             <a:fld id="{7FCAF9BE-84FA-4DCA-8252-942D07F2383A}" type="datetimeFigureOut">
               <a:rPr lang="en-NZ" smtClean="0"/>
-              <a:t>12/09/2019</a:t>
+              <a:t>23/09/2019</a:t>
             </a:fld>
             <a:endParaRPr lang="en-NZ"/>
           </a:p>
@@ -2601,8 +2604,8 @@
         </p:nvSpPr>
         <p:spPr>
           <a:xfrm>
-            <a:off x="3028950" y="6356351"/>
-            <a:ext cx="3086100" cy="365125"/>
+            <a:off x="4038600" y="6356350"/>
+            <a:ext cx="4114800" cy="365125"/>
           </a:xfrm>
           <a:prstGeom prst="rect">
             <a:avLst/>
@@ -2638,8 +2641,8 @@
         </p:nvSpPr>
         <p:spPr>
           <a:xfrm>
-            <a:off x="6457950" y="6356351"/>
-            <a:ext cx="2057400" cy="365125"/>
+            <a:off x="8610600" y="6356350"/>
+            <a:ext cx="2743200" cy="365125"/>
           </a:xfrm>
           <a:prstGeom prst="rect">
             <a:avLst/>
@@ -2670,23 +2673,23 @@
     </p:spTree>
     <p:extLst>
       <p:ext uri="{BB962C8B-B14F-4D97-AF65-F5344CB8AC3E}">
-        <p14:creationId xmlns:p14="http://schemas.microsoft.com/office/powerpoint/2010/main" val="314400765"/>
+        <p14:creationId xmlns:p14="http://schemas.microsoft.com/office/powerpoint/2010/main" val="3463789360"/>
       </p:ext>
     </p:extLst>
   </p:cSld>
   <p:clrMap bg1="lt1" tx1="dk1" bg2="lt2" tx2="dk2" accent1="accent1" accent2="accent2" accent3="accent3" accent4="accent4" accent5="accent5" accent6="accent6" hlink="hlink" folHlink="folHlink"/>
   <p:sldLayoutIdLst>
-    <p:sldLayoutId id="2147483733" r:id="rId1"/>
-    <p:sldLayoutId id="2147483734" r:id="rId2"/>
-    <p:sldLayoutId id="2147483735" r:id="rId3"/>
-    <p:sldLayoutId id="2147483736" r:id="rId4"/>
-    <p:sldLayoutId id="2147483737" r:id="rId5"/>
-    <p:sldLayoutId id="2147483738" r:id="rId6"/>
-    <p:sldLayoutId id="2147483739" r:id="rId7"/>
-    <p:sldLayoutId id="2147483740" r:id="rId8"/>
-    <p:sldLayoutId id="2147483741" r:id="rId9"/>
-    <p:sldLayoutId id="2147483742" r:id="rId10"/>
-    <p:sldLayoutId id="2147483743" r:id="rId11"/>
+    <p:sldLayoutId id="2147483745" r:id="rId1"/>
+    <p:sldLayoutId id="2147483746" r:id="rId2"/>
+    <p:sldLayoutId id="2147483747" r:id="rId3"/>
+    <p:sldLayoutId id="2147483748" r:id="rId4"/>
+    <p:sldLayoutId id="2147483749" r:id="rId5"/>
+    <p:sldLayoutId id="2147483750" r:id="rId6"/>
+    <p:sldLayoutId id="2147483751" r:id="rId7"/>
+    <p:sldLayoutId id="2147483752" r:id="rId8"/>
+    <p:sldLayoutId id="2147483753" r:id="rId9"/>
+    <p:sldLayoutId id="2147483754" r:id="rId10"/>
+    <p:sldLayoutId id="2147483755" r:id="rId11"/>
   </p:sldLayoutIdLst>
   <p:txStyles>
     <p:titleStyle>
@@ -3002,7 +3005,7 @@
         </p:nvSpPr>
         <p:spPr>
           <a:xfrm>
-            <a:off x="1289184" y="5077325"/>
+            <a:off x="2813184" y="5077325"/>
             <a:ext cx="540000" cy="540000"/>
           </a:xfrm>
           <a:prstGeom prst="flowChartConnector">
@@ -3054,7 +3057,7 @@
         </p:nvSpPr>
         <p:spPr>
           <a:xfrm>
-            <a:off x="658237" y="5077325"/>
+            <a:off x="2182237" y="5077325"/>
             <a:ext cx="540000" cy="540000"/>
           </a:xfrm>
           <a:prstGeom prst="flowChartConnector">
@@ -3106,7 +3109,7 @@
         </p:nvSpPr>
         <p:spPr>
           <a:xfrm>
-            <a:off x="1920131" y="5077325"/>
+            <a:off x="3444131" y="5077325"/>
             <a:ext cx="540000" cy="540000"/>
           </a:xfrm>
           <a:prstGeom prst="flowChartConnector">
@@ -3158,7 +3161,7 @@
         </p:nvSpPr>
         <p:spPr>
           <a:xfrm>
-            <a:off x="3903917" y="5077326"/>
+            <a:off x="5427917" y="5077326"/>
             <a:ext cx="540000" cy="540000"/>
           </a:xfrm>
           <a:prstGeom prst="flowChartConnector">
@@ -3210,7 +3213,7 @@
         </p:nvSpPr>
         <p:spPr>
           <a:xfrm>
-            <a:off x="5165811" y="5077326"/>
+            <a:off x="6689811" y="5077326"/>
             <a:ext cx="540000" cy="540000"/>
           </a:xfrm>
           <a:prstGeom prst="flowChartConnector">
@@ -3262,7 +3265,7 @@
         </p:nvSpPr>
         <p:spPr>
           <a:xfrm>
-            <a:off x="4534864" y="5077326"/>
+            <a:off x="6058864" y="5077326"/>
             <a:ext cx="540000" cy="540000"/>
           </a:xfrm>
           <a:prstGeom prst="flowChartConnector">
@@ -3314,7 +3317,7 @@
         </p:nvSpPr>
         <p:spPr>
           <a:xfrm>
-            <a:off x="5796758" y="5077326"/>
+            <a:off x="7320758" y="5077326"/>
             <a:ext cx="540000" cy="540000"/>
           </a:xfrm>
           <a:prstGeom prst="flowChartConnector">
@@ -3366,7 +3369,7 @@
         </p:nvSpPr>
         <p:spPr>
           <a:xfrm>
-            <a:off x="7780545" y="5077326"/>
+            <a:off x="9304545" y="5077326"/>
             <a:ext cx="540000" cy="540000"/>
           </a:xfrm>
           <a:prstGeom prst="flowChartConnector">
@@ -3418,7 +3421,7 @@
         </p:nvSpPr>
         <p:spPr>
           <a:xfrm>
-            <a:off x="2642023" y="3276601"/>
+            <a:off x="4166023" y="3276601"/>
             <a:ext cx="540000" cy="540000"/>
           </a:xfrm>
           <a:prstGeom prst="flowChartConnector">
@@ -3464,7 +3467,7 @@
         </p:nvSpPr>
         <p:spPr>
           <a:xfrm>
-            <a:off x="3272970" y="3276601"/>
+            <a:off x="4796970" y="3276601"/>
             <a:ext cx="540000" cy="540000"/>
           </a:xfrm>
           <a:prstGeom prst="flowChartConnector">
@@ -3510,7 +3513,7 @@
         </p:nvSpPr>
         <p:spPr>
           <a:xfrm>
-            <a:off x="3903917" y="3276601"/>
+            <a:off x="5427917" y="3276601"/>
             <a:ext cx="540000" cy="540000"/>
           </a:xfrm>
           <a:prstGeom prst="flowChartConnector">
@@ -3556,7 +3559,7 @@
         </p:nvSpPr>
         <p:spPr>
           <a:xfrm>
-            <a:off x="5165811" y="3276601"/>
+            <a:off x="6689811" y="3276601"/>
             <a:ext cx="540000" cy="540000"/>
           </a:xfrm>
           <a:prstGeom prst="flowChartConnector">
@@ -3602,7 +3605,7 @@
         </p:nvSpPr>
         <p:spPr>
           <a:xfrm>
-            <a:off x="4534864" y="3276601"/>
+            <a:off x="6058864" y="3276601"/>
             <a:ext cx="540000" cy="540000"/>
           </a:xfrm>
           <a:prstGeom prst="flowChartConnector">
@@ -3648,7 +3651,7 @@
         </p:nvSpPr>
         <p:spPr>
           <a:xfrm>
-            <a:off x="5796758" y="3276601"/>
+            <a:off x="7320758" y="3276601"/>
             <a:ext cx="540000" cy="540000"/>
           </a:xfrm>
           <a:prstGeom prst="flowChartConnector">
@@ -3694,7 +3697,7 @@
         </p:nvSpPr>
         <p:spPr>
           <a:xfrm>
-            <a:off x="4219390" y="1475876"/>
+            <a:off x="5743390" y="1475876"/>
             <a:ext cx="540000" cy="540000"/>
           </a:xfrm>
           <a:prstGeom prst="flowChartConnector">
@@ -3750,7 +3753,7 @@
         </p:nvCxnSpPr>
         <p:spPr>
           <a:xfrm>
-            <a:off x="6066767" y="3816610"/>
+            <a:off x="7590768" y="3816611"/>
             <a:ext cx="1983787" cy="1260725"/>
           </a:xfrm>
           <a:prstGeom prst="line">
@@ -3790,7 +3793,7 @@
         </p:nvCxnSpPr>
         <p:spPr>
           <a:xfrm>
-            <a:off x="2912023" y="3816610"/>
+            <a:off x="4436023" y="3816611"/>
             <a:ext cx="5138522" cy="1260725"/>
           </a:xfrm>
           <a:prstGeom prst="line">
@@ -3830,7 +3833,7 @@
         </p:nvCxnSpPr>
         <p:spPr>
           <a:xfrm>
-            <a:off x="3542979" y="3816610"/>
+            <a:off x="5066980" y="3816611"/>
             <a:ext cx="4507575" cy="1260725"/>
           </a:xfrm>
           <a:prstGeom prst="line">
@@ -3870,7 +3873,7 @@
         </p:nvCxnSpPr>
         <p:spPr>
           <a:xfrm>
-            <a:off x="4173917" y="3816610"/>
+            <a:off x="5697917" y="3816611"/>
             <a:ext cx="3876628" cy="1260725"/>
           </a:xfrm>
           <a:prstGeom prst="line">
@@ -3910,7 +3913,7 @@
         </p:nvCxnSpPr>
         <p:spPr>
           <a:xfrm>
-            <a:off x="4804873" y="3816610"/>
+            <a:off x="6328874" y="3816611"/>
             <a:ext cx="3245681" cy="1260725"/>
           </a:xfrm>
           <a:prstGeom prst="line">
@@ -3950,7 +3953,7 @@
         </p:nvCxnSpPr>
         <p:spPr>
           <a:xfrm>
-            <a:off x="5435811" y="3816610"/>
+            <a:off x="6959811" y="3816611"/>
             <a:ext cx="2614734" cy="1260725"/>
           </a:xfrm>
           <a:prstGeom prst="line">
@@ -3990,7 +3993,7 @@
         </p:nvCxnSpPr>
         <p:spPr>
           <a:xfrm>
-            <a:off x="2912032" y="3816610"/>
+            <a:off x="4436033" y="3816611"/>
             <a:ext cx="3154735" cy="1260725"/>
           </a:xfrm>
           <a:prstGeom prst="line">
@@ -4030,7 +4033,7 @@
         </p:nvCxnSpPr>
         <p:spPr>
           <a:xfrm>
-            <a:off x="3542970" y="3816610"/>
+            <a:off x="5066970" y="3816611"/>
             <a:ext cx="2523788" cy="1260725"/>
           </a:xfrm>
           <a:prstGeom prst="line">
@@ -4070,7 +4073,7 @@
         </p:nvCxnSpPr>
         <p:spPr>
           <a:xfrm>
-            <a:off x="4173926" y="3816610"/>
+            <a:off x="5697927" y="3816611"/>
             <a:ext cx="1892841" cy="1260725"/>
           </a:xfrm>
           <a:prstGeom prst="line">
@@ -4110,7 +4113,7 @@
         </p:nvCxnSpPr>
         <p:spPr>
           <a:xfrm>
-            <a:off x="4804864" y="3816610"/>
+            <a:off x="6328864" y="3816611"/>
             <a:ext cx="1261894" cy="1260725"/>
           </a:xfrm>
           <a:prstGeom prst="line">
@@ -4150,7 +4153,7 @@
         </p:nvCxnSpPr>
         <p:spPr>
           <a:xfrm>
-            <a:off x="5435820" y="3816610"/>
+            <a:off x="6959821" y="3816611"/>
             <a:ext cx="630947" cy="1260725"/>
           </a:xfrm>
           <a:prstGeom prst="line">
@@ -4190,7 +4193,7 @@
         </p:nvCxnSpPr>
         <p:spPr>
           <a:xfrm>
-            <a:off x="6066758" y="3816610"/>
+            <a:off x="7590758" y="3816611"/>
             <a:ext cx="0" cy="1260725"/>
           </a:xfrm>
           <a:prstGeom prst="line">
@@ -4230,7 +4233,7 @@
         </p:nvCxnSpPr>
         <p:spPr>
           <a:xfrm>
-            <a:off x="2912023" y="3816610"/>
+            <a:off x="4436023" y="3816611"/>
             <a:ext cx="2523788" cy="1260725"/>
           </a:xfrm>
           <a:prstGeom prst="line">
@@ -4270,7 +4273,7 @@
         </p:nvCxnSpPr>
         <p:spPr>
           <a:xfrm>
-            <a:off x="3542979" y="3816610"/>
+            <a:off x="5066980" y="3816611"/>
             <a:ext cx="1892841" cy="1260725"/>
           </a:xfrm>
           <a:prstGeom prst="line">
@@ -4310,7 +4313,7 @@
         </p:nvCxnSpPr>
         <p:spPr>
           <a:xfrm>
-            <a:off x="4173917" y="3816610"/>
+            <a:off x="5697917" y="3816611"/>
             <a:ext cx="1261894" cy="1260725"/>
           </a:xfrm>
           <a:prstGeom prst="line">
@@ -4350,7 +4353,7 @@
         </p:nvCxnSpPr>
         <p:spPr>
           <a:xfrm>
-            <a:off x="4804873" y="3816610"/>
+            <a:off x="6328874" y="3816611"/>
             <a:ext cx="630947" cy="1260725"/>
           </a:xfrm>
           <a:prstGeom prst="line">
@@ -4390,7 +4393,7 @@
         </p:nvCxnSpPr>
         <p:spPr>
           <a:xfrm>
-            <a:off x="5435811" y="3816610"/>
+            <a:off x="6959811" y="3816611"/>
             <a:ext cx="0" cy="1260725"/>
           </a:xfrm>
           <a:prstGeom prst="line">
@@ -4430,7 +4433,7 @@
         </p:nvCxnSpPr>
         <p:spPr>
           <a:xfrm flipH="1">
-            <a:off x="5435820" y="3816610"/>
+            <a:off x="6959821" y="3816611"/>
             <a:ext cx="630947" cy="1260725"/>
           </a:xfrm>
           <a:prstGeom prst="line">
@@ -4470,7 +4473,7 @@
         </p:nvCxnSpPr>
         <p:spPr>
           <a:xfrm>
-            <a:off x="2912032" y="3816610"/>
+            <a:off x="4436033" y="3816611"/>
             <a:ext cx="1892841" cy="1260725"/>
           </a:xfrm>
           <a:prstGeom prst="line">
@@ -4510,7 +4513,7 @@
         </p:nvCxnSpPr>
         <p:spPr>
           <a:xfrm>
-            <a:off x="3542970" y="3816610"/>
+            <a:off x="5066970" y="3816611"/>
             <a:ext cx="1261894" cy="1260725"/>
           </a:xfrm>
           <a:prstGeom prst="line">
@@ -4550,7 +4553,7 @@
         </p:nvCxnSpPr>
         <p:spPr>
           <a:xfrm>
-            <a:off x="4173926" y="3816610"/>
+            <a:off x="5697927" y="3816611"/>
             <a:ext cx="630947" cy="1260725"/>
           </a:xfrm>
           <a:prstGeom prst="line">
@@ -4590,7 +4593,7 @@
         </p:nvCxnSpPr>
         <p:spPr>
           <a:xfrm>
-            <a:off x="4804864" y="3816610"/>
+            <a:off x="6328864" y="3816611"/>
             <a:ext cx="0" cy="1260725"/>
           </a:xfrm>
           <a:prstGeom prst="line">
@@ -4630,7 +4633,7 @@
         </p:nvCxnSpPr>
         <p:spPr>
           <a:xfrm flipH="1">
-            <a:off x="4804873" y="3816610"/>
+            <a:off x="6328874" y="3816611"/>
             <a:ext cx="630947" cy="1260725"/>
           </a:xfrm>
           <a:prstGeom prst="line">
@@ -4670,7 +4673,7 @@
         </p:nvCxnSpPr>
         <p:spPr>
           <a:xfrm flipH="1">
-            <a:off x="4804864" y="3816610"/>
+            <a:off x="6328864" y="3816611"/>
             <a:ext cx="1261894" cy="1260725"/>
           </a:xfrm>
           <a:prstGeom prst="line">
@@ -4706,7 +4709,7 @@
         </p:nvSpPr>
         <p:spPr>
           <a:xfrm>
-            <a:off x="6429070" y="5077335"/>
+            <a:off x="7953071" y="5077336"/>
             <a:ext cx="1259181" cy="539999"/>
           </a:xfrm>
           <a:prstGeom prst="roundRect">
@@ -4762,7 +4765,7 @@
         </p:nvSpPr>
         <p:spPr>
           <a:xfrm>
-            <a:off x="2552442" y="5077335"/>
+            <a:off x="4076443" y="5077336"/>
             <a:ext cx="1259181" cy="539999"/>
           </a:xfrm>
           <a:prstGeom prst="roundRect">
@@ -4822,7 +4825,7 @@
         </p:nvCxnSpPr>
         <p:spPr>
           <a:xfrm>
-            <a:off x="2912023" y="3816610"/>
+            <a:off x="4436023" y="3816611"/>
             <a:ext cx="1261894" cy="1260725"/>
           </a:xfrm>
           <a:prstGeom prst="line">
@@ -4862,7 +4865,7 @@
         </p:nvCxnSpPr>
         <p:spPr>
           <a:xfrm>
-            <a:off x="3542979" y="3816610"/>
+            <a:off x="5066980" y="3816611"/>
             <a:ext cx="630947" cy="1260725"/>
           </a:xfrm>
           <a:prstGeom prst="line">
@@ -4902,7 +4905,7 @@
         </p:nvCxnSpPr>
         <p:spPr>
           <a:xfrm>
-            <a:off x="4173917" y="3816610"/>
+            <a:off x="5697917" y="3816611"/>
             <a:ext cx="0" cy="1260725"/>
           </a:xfrm>
           <a:prstGeom prst="line">
@@ -4942,7 +4945,7 @@
         </p:nvCxnSpPr>
         <p:spPr>
           <a:xfrm flipH="1">
-            <a:off x="4173926" y="3816610"/>
+            <a:off x="5697927" y="3816611"/>
             <a:ext cx="630947" cy="1260725"/>
           </a:xfrm>
           <a:prstGeom prst="line">
@@ -4982,7 +4985,7 @@
         </p:nvCxnSpPr>
         <p:spPr>
           <a:xfrm flipH="1">
-            <a:off x="4173917" y="3816610"/>
+            <a:off x="5697917" y="3816611"/>
             <a:ext cx="1261894" cy="1260725"/>
           </a:xfrm>
           <a:prstGeom prst="line">
@@ -5022,7 +5025,7 @@
         </p:nvCxnSpPr>
         <p:spPr>
           <a:xfrm flipH="1">
-            <a:off x="4173926" y="3816610"/>
+            <a:off x="5697927" y="3816611"/>
             <a:ext cx="1892841" cy="1260725"/>
           </a:xfrm>
           <a:prstGeom prst="line">
@@ -5062,7 +5065,7 @@
         </p:nvCxnSpPr>
         <p:spPr>
           <a:xfrm flipH="1">
-            <a:off x="2190131" y="3816601"/>
+            <a:off x="3714131" y="3816601"/>
             <a:ext cx="721892" cy="1260724"/>
           </a:xfrm>
           <a:prstGeom prst="line">
@@ -5102,7 +5105,7 @@
         </p:nvCxnSpPr>
         <p:spPr>
           <a:xfrm flipV="1">
-            <a:off x="2190140" y="3816601"/>
+            <a:off x="3714141" y="3816601"/>
             <a:ext cx="1352839" cy="1260724"/>
           </a:xfrm>
           <a:prstGeom prst="line">
@@ -5142,7 +5145,7 @@
         </p:nvCxnSpPr>
         <p:spPr>
           <a:xfrm flipV="1">
-            <a:off x="2190131" y="3816601"/>
+            <a:off x="3714131" y="3816601"/>
             <a:ext cx="1983786" cy="1260724"/>
           </a:xfrm>
           <a:prstGeom prst="line">
@@ -5182,7 +5185,7 @@
         </p:nvCxnSpPr>
         <p:spPr>
           <a:xfrm flipV="1">
-            <a:off x="2190140" y="3816601"/>
+            <a:off x="3714141" y="3816601"/>
             <a:ext cx="2614733" cy="1260724"/>
           </a:xfrm>
           <a:prstGeom prst="line">
@@ -5222,7 +5225,7 @@
         </p:nvCxnSpPr>
         <p:spPr>
           <a:xfrm flipV="1">
-            <a:off x="2190131" y="3816601"/>
+            <a:off x="3714131" y="3816601"/>
             <a:ext cx="3245680" cy="1260724"/>
           </a:xfrm>
           <a:prstGeom prst="line">
@@ -5262,7 +5265,7 @@
         </p:nvCxnSpPr>
         <p:spPr>
           <a:xfrm flipV="1">
-            <a:off x="2190140" y="3816601"/>
+            <a:off x="3714141" y="3816601"/>
             <a:ext cx="3876627" cy="1260724"/>
           </a:xfrm>
           <a:prstGeom prst="line">
@@ -5302,7 +5305,7 @@
         </p:nvCxnSpPr>
         <p:spPr>
           <a:xfrm flipV="1">
-            <a:off x="1559193" y="3816601"/>
+            <a:off x="3083194" y="3816601"/>
             <a:ext cx="1352839" cy="1260724"/>
           </a:xfrm>
           <a:prstGeom prst="line">
@@ -5342,7 +5345,7 @@
         </p:nvCxnSpPr>
         <p:spPr>
           <a:xfrm flipV="1">
-            <a:off x="1559184" y="3816601"/>
+            <a:off x="3083184" y="3816601"/>
             <a:ext cx="1983786" cy="1260724"/>
           </a:xfrm>
           <a:prstGeom prst="line">
@@ -5382,7 +5385,7 @@
         </p:nvCxnSpPr>
         <p:spPr>
           <a:xfrm flipV="1">
-            <a:off x="1559193" y="3816601"/>
+            <a:off x="3083194" y="3816601"/>
             <a:ext cx="2614733" cy="1260724"/>
           </a:xfrm>
           <a:prstGeom prst="line">
@@ -5422,7 +5425,7 @@
         </p:nvCxnSpPr>
         <p:spPr>
           <a:xfrm flipV="1">
-            <a:off x="1559184" y="3816601"/>
+            <a:off x="3083184" y="3816601"/>
             <a:ext cx="3245680" cy="1260724"/>
           </a:xfrm>
           <a:prstGeom prst="line">
@@ -5462,7 +5465,7 @@
         </p:nvCxnSpPr>
         <p:spPr>
           <a:xfrm flipV="1">
-            <a:off x="1559193" y="3816601"/>
+            <a:off x="3083194" y="3816601"/>
             <a:ext cx="3876627" cy="1260724"/>
           </a:xfrm>
           <a:prstGeom prst="line">
@@ -5502,7 +5505,7 @@
         </p:nvCxnSpPr>
         <p:spPr>
           <a:xfrm flipV="1">
-            <a:off x="1559184" y="3816601"/>
+            <a:off x="3083184" y="3816601"/>
             <a:ext cx="4507574" cy="1260724"/>
           </a:xfrm>
           <a:prstGeom prst="line">
@@ -5542,7 +5545,7 @@
         </p:nvCxnSpPr>
         <p:spPr>
           <a:xfrm flipV="1">
-            <a:off x="928237" y="3816601"/>
+            <a:off x="2452237" y="3816601"/>
             <a:ext cx="1983786" cy="1260724"/>
           </a:xfrm>
           <a:prstGeom prst="line">
@@ -5582,7 +5585,7 @@
         </p:nvCxnSpPr>
         <p:spPr>
           <a:xfrm flipV="1">
-            <a:off x="928246" y="3816601"/>
+            <a:off x="2452247" y="3816601"/>
             <a:ext cx="2614733" cy="1260724"/>
           </a:xfrm>
           <a:prstGeom prst="line">
@@ -5622,7 +5625,7 @@
         </p:nvCxnSpPr>
         <p:spPr>
           <a:xfrm flipV="1">
-            <a:off x="928237" y="3816601"/>
+            <a:off x="2452237" y="3816601"/>
             <a:ext cx="3245680" cy="1260724"/>
           </a:xfrm>
           <a:prstGeom prst="line">
@@ -5662,7 +5665,7 @@
         </p:nvCxnSpPr>
         <p:spPr>
           <a:xfrm flipV="1">
-            <a:off x="928246" y="3816601"/>
+            <a:off x="2452247" y="3816601"/>
             <a:ext cx="3876627" cy="1260724"/>
           </a:xfrm>
           <a:prstGeom prst="line">
@@ -5702,7 +5705,7 @@
         </p:nvCxnSpPr>
         <p:spPr>
           <a:xfrm flipV="1">
-            <a:off x="928237" y="3816601"/>
+            <a:off x="2452237" y="3816601"/>
             <a:ext cx="4507574" cy="1260724"/>
           </a:xfrm>
           <a:prstGeom prst="line">
@@ -5742,7 +5745,7 @@
         </p:nvCxnSpPr>
         <p:spPr>
           <a:xfrm flipV="1">
-            <a:off x="928246" y="3816601"/>
+            <a:off x="2452247" y="3816601"/>
             <a:ext cx="5138521" cy="1260724"/>
           </a:xfrm>
           <a:prstGeom prst="line">
@@ -5782,7 +5785,7 @@
         </p:nvCxnSpPr>
         <p:spPr>
           <a:xfrm flipV="1">
-            <a:off x="2912032" y="2015885"/>
+            <a:off x="4436033" y="2015886"/>
             <a:ext cx="1577367" cy="1260725"/>
           </a:xfrm>
           <a:prstGeom prst="line">
@@ -5822,7 +5825,7 @@
         </p:nvCxnSpPr>
         <p:spPr>
           <a:xfrm flipV="1">
-            <a:off x="3542970" y="2015885"/>
+            <a:off x="5066970" y="2015886"/>
             <a:ext cx="946420" cy="1260725"/>
           </a:xfrm>
           <a:prstGeom prst="line">
@@ -5862,7 +5865,7 @@
         </p:nvCxnSpPr>
         <p:spPr>
           <a:xfrm flipV="1">
-            <a:off x="4173926" y="2015885"/>
+            <a:off x="5697927" y="2015886"/>
             <a:ext cx="315473" cy="1260725"/>
           </a:xfrm>
           <a:prstGeom prst="line">
@@ -5902,7 +5905,7 @@
         </p:nvCxnSpPr>
         <p:spPr>
           <a:xfrm flipH="1" flipV="1">
-            <a:off x="4489390" y="2015885"/>
+            <a:off x="6013390" y="2015886"/>
             <a:ext cx="315474" cy="1260725"/>
           </a:xfrm>
           <a:prstGeom prst="line">
@@ -5942,7 +5945,7 @@
         </p:nvCxnSpPr>
         <p:spPr>
           <a:xfrm flipH="1" flipV="1">
-            <a:off x="4489399" y="2015885"/>
+            <a:off x="6013400" y="2015886"/>
             <a:ext cx="946421" cy="1260725"/>
           </a:xfrm>
           <a:prstGeom prst="line">
@@ -5982,7 +5985,7 @@
         </p:nvCxnSpPr>
         <p:spPr>
           <a:xfrm flipH="1" flipV="1">
-            <a:off x="4489390" y="2015885"/>
+            <a:off x="6013390" y="2015886"/>
             <a:ext cx="1577368" cy="1260725"/>
           </a:xfrm>
           <a:prstGeom prst="line">
@@ -6018,7 +6021,7 @@
         </p:nvSpPr>
         <p:spPr>
           <a:xfrm>
-            <a:off x="1874666" y="5951630"/>
+            <a:off x="3398667" y="5951631"/>
             <a:ext cx="1170947" cy="442575"/>
           </a:xfrm>
           <a:prstGeom prst="rect">
@@ -6074,7 +6077,7 @@
         </p:nvSpPr>
         <p:spPr>
           <a:xfrm>
-            <a:off x="5796766" y="5951629"/>
+            <a:off x="7320767" y="5951630"/>
             <a:ext cx="1170947" cy="442575"/>
           </a:xfrm>
           <a:prstGeom prst="rect">
@@ -6130,7 +6133,7 @@
         </p:nvSpPr>
         <p:spPr>
           <a:xfrm>
-            <a:off x="-804697" y="3906963"/>
+            <a:off x="719304" y="3906963"/>
             <a:ext cx="1898155" cy="540000"/>
           </a:xfrm>
           <a:prstGeom prst="wedgeRoundRectCallout">
@@ -6188,7 +6191,7 @@
         </p:nvSpPr>
         <p:spPr>
           <a:xfrm>
-            <a:off x="7983668" y="3906963"/>
+            <a:off x="9507669" y="3906963"/>
             <a:ext cx="1898155" cy="540000"/>
           </a:xfrm>
           <a:prstGeom prst="wedgeRoundRectCallout">
@@ -6246,7 +6249,7 @@
         </p:nvSpPr>
         <p:spPr>
           <a:xfrm>
-            <a:off x="743877" y="2456575"/>
+            <a:off x="2267878" y="2456575"/>
             <a:ext cx="1898155" cy="540000"/>
           </a:xfrm>
           <a:prstGeom prst="wedgeRoundRectCallout">
@@ -6304,7 +6307,7 @@
         </p:nvSpPr>
         <p:spPr>
           <a:xfrm>
-            <a:off x="3903926" y="755161"/>
+            <a:off x="5427927" y="755162"/>
             <a:ext cx="1170947" cy="442575"/>
           </a:xfrm>
           <a:prstGeom prst="rect">
@@ -6390,7 +6393,7 @@
         </p:nvSpPr>
         <p:spPr>
           <a:xfrm>
-            <a:off x="1286042" y="5187940"/>
+            <a:off x="2810043" y="5187941"/>
             <a:ext cx="1170947" cy="442575"/>
           </a:xfrm>
           <a:prstGeom prst="rect">
@@ -6446,7 +6449,7 @@
         </p:nvSpPr>
         <p:spPr>
           <a:xfrm>
-            <a:off x="1286043" y="1865045"/>
+            <a:off x="2810044" y="1865046"/>
             <a:ext cx="1170947" cy="442575"/>
           </a:xfrm>
           <a:prstGeom prst="rect">
@@ -6502,7 +6505,7 @@
         </p:nvGrpSpPr>
         <p:grpSpPr>
           <a:xfrm>
-            <a:off x="3589103" y="1042217"/>
+            <a:off x="5113103" y="1042218"/>
             <a:ext cx="2088232" cy="2088233"/>
             <a:chOff x="2880856" y="502148"/>
             <a:chExt cx="2088232" cy="2088233"/>
@@ -7943,7 +7946,7 @@
         </p:nvGrpSpPr>
         <p:grpSpPr>
           <a:xfrm>
-            <a:off x="3589103" y="4365112"/>
+            <a:off x="5113103" y="4365113"/>
             <a:ext cx="2088232" cy="2088233"/>
             <a:chOff x="2880856" y="4267619"/>
             <a:chExt cx="2088232" cy="2088233"/>
@@ -9399,7 +9402,7 @@
         </p:nvGrpSpPr>
         <p:grpSpPr>
           <a:xfrm>
-            <a:off x="7380320" y="1402249"/>
+            <a:off x="8904321" y="1402249"/>
             <a:ext cx="360041" cy="4248472"/>
             <a:chOff x="7104111" y="1268761"/>
             <a:chExt cx="360041" cy="4248472"/>
@@ -10020,7 +10023,7 @@
         </p:nvCxnSpPr>
         <p:spPr>
           <a:xfrm flipV="1">
-            <a:off x="2809623" y="1762289"/>
+            <a:off x="4333623" y="1762289"/>
             <a:ext cx="504056" cy="324034"/>
           </a:xfrm>
           <a:prstGeom prst="straightConnector1">
@@ -10064,7 +10067,7 @@
         </p:nvCxnSpPr>
         <p:spPr>
           <a:xfrm>
-            <a:off x="2809623" y="5409218"/>
+            <a:off x="4333623" y="5409218"/>
             <a:ext cx="492592" cy="0"/>
           </a:xfrm>
           <a:prstGeom prst="straightConnector1">
@@ -10106,7 +10109,7 @@
         </p:nvSpPr>
         <p:spPr>
           <a:xfrm>
-            <a:off x="6348804" y="1628800"/>
+            <a:off x="7872804" y="1628800"/>
             <a:ext cx="360040" cy="3780418"/>
           </a:xfrm>
           <a:prstGeom prst="rightBrace">
@@ -10160,7 +10163,7 @@
         </p:nvSpPr>
         <p:spPr>
           <a:xfrm>
-            <a:off x="1175163" y="163274"/>
+            <a:off x="2699164" y="163275"/>
             <a:ext cx="1392703" cy="584775"/>
           </a:xfrm>
           <a:prstGeom prst="rect">
@@ -10196,7 +10199,7 @@
         </p:nvSpPr>
         <p:spPr>
           <a:xfrm>
-            <a:off x="3852590" y="163274"/>
+            <a:off x="5376591" y="163275"/>
             <a:ext cx="1392703" cy="584775"/>
           </a:xfrm>
           <a:prstGeom prst="rect">
@@ -10232,7 +10235,7 @@
         </p:nvSpPr>
         <p:spPr>
           <a:xfrm>
-            <a:off x="6729182" y="163274"/>
+            <a:off x="8253183" y="163275"/>
             <a:ext cx="1662317" cy="584775"/>
           </a:xfrm>
           <a:prstGeom prst="rect">
@@ -10268,7 +10271,7 @@
         </p:nvCxnSpPr>
         <p:spPr>
           <a:xfrm>
-            <a:off x="3655722" y="3722569"/>
+            <a:off x="5179723" y="3722569"/>
             <a:ext cx="1991009" cy="0"/>
           </a:xfrm>
           <a:prstGeom prst="straightConnector1">
@@ -10313,7 +10316,7 @@
         </p:nvSpPr>
         <p:spPr>
           <a:xfrm>
-            <a:off x="4471206" y="3429000"/>
+            <a:off x="5995206" y="3429000"/>
             <a:ext cx="360040" cy="338554"/>
           </a:xfrm>
           <a:prstGeom prst="rect">
@@ -10349,7 +10352,7 @@
         </p:nvSpPr>
         <p:spPr>
           <a:xfrm>
-            <a:off x="5833049" y="5250690"/>
+            <a:off x="7357049" y="5250690"/>
             <a:ext cx="360040" cy="338554"/>
           </a:xfrm>
           <a:prstGeom prst="rect">
@@ -10387,7 +10390,7 @@
         </p:nvCxnSpPr>
         <p:spPr>
           <a:xfrm>
-            <a:off x="5869059" y="1126320"/>
+            <a:off x="7393059" y="1126320"/>
             <a:ext cx="0" cy="1954744"/>
           </a:xfrm>
           <a:prstGeom prst="straightConnector1">
@@ -10432,7 +10435,7 @@
         </p:nvSpPr>
         <p:spPr>
           <a:xfrm>
-            <a:off x="5833049" y="1917046"/>
+            <a:off x="7357049" y="1917046"/>
             <a:ext cx="360040" cy="338554"/>
           </a:xfrm>
           <a:prstGeom prst="rect">
@@ -10470,7 +10473,7 @@
         </p:nvCxnSpPr>
         <p:spPr>
           <a:xfrm>
-            <a:off x="5869059" y="4426584"/>
+            <a:off x="7393059" y="4426584"/>
             <a:ext cx="0" cy="1954744"/>
           </a:xfrm>
           <a:prstGeom prst="straightConnector1">
@@ -10540,7 +10543,7 @@
         </p:nvGrpSpPr>
         <p:grpSpPr>
           <a:xfrm>
-            <a:off x="2014186" y="1628800"/>
+            <a:off x="3538187" y="1628800"/>
             <a:ext cx="360041" cy="4248472"/>
             <a:chOff x="7104111" y="1268761"/>
             <a:chExt cx="360041" cy="4248472"/>
@@ -11159,7 +11162,7 @@
         </p:nvSpPr>
         <p:spPr>
           <a:xfrm>
-            <a:off x="1363048" y="703750"/>
+            <a:off x="2887049" y="703751"/>
             <a:ext cx="1662317" cy="584775"/>
           </a:xfrm>
           <a:prstGeom prst="rect">
@@ -11195,7 +11198,7 @@
         </p:nvSpPr>
         <p:spPr>
           <a:xfrm rot="5400000">
-            <a:off x="4318440" y="2708924"/>
+            <a:off x="5842440" y="2708925"/>
             <a:ext cx="360040" cy="360041"/>
           </a:xfrm>
           <a:prstGeom prst="flowChartConnector">
@@ -11253,7 +11256,7 @@
         </p:nvSpPr>
         <p:spPr>
           <a:xfrm rot="5400000">
-            <a:off x="4318440" y="3140972"/>
+            <a:off x="5842440" y="3140973"/>
             <a:ext cx="360040" cy="360041"/>
           </a:xfrm>
           <a:prstGeom prst="flowChartConnector">
@@ -11311,7 +11314,7 @@
         </p:nvSpPr>
         <p:spPr>
           <a:xfrm rot="5400000">
-            <a:off x="4318440" y="3573020"/>
+            <a:off x="5842440" y="3573021"/>
             <a:ext cx="360040" cy="360041"/>
           </a:xfrm>
           <a:prstGeom prst="flowChartConnector">
@@ -11369,7 +11372,7 @@
         </p:nvSpPr>
         <p:spPr>
           <a:xfrm rot="5400000">
-            <a:off x="4318440" y="4005068"/>
+            <a:off x="5842440" y="4005069"/>
             <a:ext cx="360040" cy="360041"/>
           </a:xfrm>
           <a:prstGeom prst="flowChartConnector">
@@ -11427,7 +11430,7 @@
         </p:nvSpPr>
         <p:spPr>
           <a:xfrm rot="5400000">
-            <a:off x="4318440" y="4437116"/>
+            <a:off x="5842440" y="4437117"/>
             <a:ext cx="360040" cy="360041"/>
           </a:xfrm>
           <a:prstGeom prst="flowChartConnector">
@@ -11489,7 +11492,7 @@
         </p:nvCxnSpPr>
         <p:spPr>
           <a:xfrm>
-            <a:off x="2374228" y="1808820"/>
+            <a:off x="3898229" y="1808820"/>
             <a:ext cx="1944215" cy="1080122"/>
           </a:xfrm>
           <a:prstGeom prst="line">
@@ -11529,7 +11532,7 @@
         </p:nvCxnSpPr>
         <p:spPr>
           <a:xfrm>
-            <a:off x="2374228" y="1808820"/>
+            <a:off x="3898229" y="1808820"/>
             <a:ext cx="1944215" cy="1512170"/>
           </a:xfrm>
           <a:prstGeom prst="line">
@@ -11569,7 +11572,7 @@
         </p:nvCxnSpPr>
         <p:spPr>
           <a:xfrm>
-            <a:off x="2374228" y="1808820"/>
+            <a:off x="3898229" y="1808820"/>
             <a:ext cx="1944215" cy="2808314"/>
           </a:xfrm>
           <a:prstGeom prst="line">
@@ -11609,7 +11612,7 @@
         </p:nvCxnSpPr>
         <p:spPr>
           <a:xfrm>
-            <a:off x="2374228" y="1808820"/>
+            <a:off x="3898229" y="1808820"/>
             <a:ext cx="1944215" cy="2376266"/>
           </a:xfrm>
           <a:prstGeom prst="line">
@@ -11649,7 +11652,7 @@
         </p:nvCxnSpPr>
         <p:spPr>
           <a:xfrm>
-            <a:off x="2374228" y="2240868"/>
+            <a:off x="3898229" y="2240868"/>
             <a:ext cx="1944215" cy="648074"/>
           </a:xfrm>
           <a:prstGeom prst="line">
@@ -11689,7 +11692,7 @@
         </p:nvCxnSpPr>
         <p:spPr>
           <a:xfrm>
-            <a:off x="2374228" y="2240868"/>
+            <a:off x="3898229" y="2240868"/>
             <a:ext cx="1944215" cy="1080122"/>
           </a:xfrm>
           <a:prstGeom prst="line">
@@ -11729,7 +11732,7 @@
         </p:nvCxnSpPr>
         <p:spPr>
           <a:xfrm>
-            <a:off x="2374228" y="2240868"/>
+            <a:off x="3898229" y="2240868"/>
             <a:ext cx="1944215" cy="1512170"/>
           </a:xfrm>
           <a:prstGeom prst="line">
@@ -11769,7 +11772,7 @@
         </p:nvCxnSpPr>
         <p:spPr>
           <a:xfrm>
-            <a:off x="2374228" y="2240868"/>
+            <a:off x="3898229" y="2240868"/>
             <a:ext cx="1944215" cy="1944218"/>
           </a:xfrm>
           <a:prstGeom prst="line">
@@ -11809,7 +11812,7 @@
         </p:nvCxnSpPr>
         <p:spPr>
           <a:xfrm>
-            <a:off x="2374228" y="2240868"/>
+            <a:off x="3898229" y="2240868"/>
             <a:ext cx="1944215" cy="2376266"/>
           </a:xfrm>
           <a:prstGeom prst="line">
@@ -11849,7 +11852,7 @@
         </p:nvCxnSpPr>
         <p:spPr>
           <a:xfrm>
-            <a:off x="2374228" y="2672916"/>
+            <a:off x="3898229" y="2672916"/>
             <a:ext cx="1944215" cy="216026"/>
           </a:xfrm>
           <a:prstGeom prst="line">
@@ -11889,7 +11892,7 @@
         </p:nvCxnSpPr>
         <p:spPr>
           <a:xfrm>
-            <a:off x="2374228" y="2672916"/>
+            <a:off x="3898229" y="2672916"/>
             <a:ext cx="1944215" cy="648074"/>
           </a:xfrm>
           <a:prstGeom prst="line">
@@ -11929,7 +11932,7 @@
         </p:nvCxnSpPr>
         <p:spPr>
           <a:xfrm>
-            <a:off x="2374228" y="2672916"/>
+            <a:off x="3898229" y="2672916"/>
             <a:ext cx="1944215" cy="1080122"/>
           </a:xfrm>
           <a:prstGeom prst="line">
@@ -11969,7 +11972,7 @@
         </p:nvCxnSpPr>
         <p:spPr>
           <a:xfrm>
-            <a:off x="2374228" y="2672916"/>
+            <a:off x="3898229" y="2672916"/>
             <a:ext cx="1944215" cy="1512170"/>
           </a:xfrm>
           <a:prstGeom prst="line">
@@ -12009,7 +12012,7 @@
         </p:nvCxnSpPr>
         <p:spPr>
           <a:xfrm>
-            <a:off x="2374228" y="1808820"/>
+            <a:off x="3898229" y="1808820"/>
             <a:ext cx="1944215" cy="1944218"/>
           </a:xfrm>
           <a:prstGeom prst="line">
@@ -12049,7 +12052,7 @@
         </p:nvCxnSpPr>
         <p:spPr>
           <a:xfrm flipV="1">
-            <a:off x="2374228" y="2888942"/>
+            <a:off x="3898229" y="2888942"/>
             <a:ext cx="1944215" cy="216022"/>
           </a:xfrm>
           <a:prstGeom prst="line">
@@ -12089,7 +12092,7 @@
         </p:nvCxnSpPr>
         <p:spPr>
           <a:xfrm>
-            <a:off x="2374228" y="3104964"/>
+            <a:off x="3898229" y="3104964"/>
             <a:ext cx="1944215" cy="216026"/>
           </a:xfrm>
           <a:prstGeom prst="line">
@@ -12129,7 +12132,7 @@
         </p:nvCxnSpPr>
         <p:spPr>
           <a:xfrm>
-            <a:off x="2374228" y="3104964"/>
+            <a:off x="3898229" y="3104964"/>
             <a:ext cx="1944215" cy="1080122"/>
           </a:xfrm>
           <a:prstGeom prst="line">
@@ -12169,7 +12172,7 @@
         </p:nvCxnSpPr>
         <p:spPr>
           <a:xfrm>
-            <a:off x="2374228" y="3104964"/>
+            <a:off x="3898229" y="3104964"/>
             <a:ext cx="1944215" cy="648074"/>
           </a:xfrm>
           <a:prstGeom prst="line">
@@ -12209,7 +12212,7 @@
         </p:nvCxnSpPr>
         <p:spPr>
           <a:xfrm>
-            <a:off x="2374228" y="3104964"/>
+            <a:off x="3898229" y="3104964"/>
             <a:ext cx="1944215" cy="1512170"/>
           </a:xfrm>
           <a:prstGeom prst="line">
@@ -12249,7 +12252,7 @@
         </p:nvCxnSpPr>
         <p:spPr>
           <a:xfrm flipV="1">
-            <a:off x="2374228" y="2888942"/>
+            <a:off x="3898229" y="2888942"/>
             <a:ext cx="1944215" cy="648070"/>
           </a:xfrm>
           <a:prstGeom prst="line">
@@ -12289,7 +12292,7 @@
         </p:nvCxnSpPr>
         <p:spPr>
           <a:xfrm flipV="1">
-            <a:off x="2374228" y="3320990"/>
+            <a:off x="3898229" y="3320990"/>
             <a:ext cx="1944215" cy="216022"/>
           </a:xfrm>
           <a:prstGeom prst="line">
@@ -12329,7 +12332,7 @@
         </p:nvCxnSpPr>
         <p:spPr>
           <a:xfrm>
-            <a:off x="2374228" y="2672916"/>
+            <a:off x="3898229" y="2672916"/>
             <a:ext cx="1944215" cy="1944218"/>
           </a:xfrm>
           <a:prstGeom prst="line">
@@ -12369,7 +12372,7 @@
         </p:nvCxnSpPr>
         <p:spPr>
           <a:xfrm>
-            <a:off x="2374228" y="3537012"/>
+            <a:off x="3898229" y="3537012"/>
             <a:ext cx="1944215" cy="648074"/>
           </a:xfrm>
           <a:prstGeom prst="line">
@@ -12409,7 +12412,7 @@
         </p:nvCxnSpPr>
         <p:spPr>
           <a:xfrm>
-            <a:off x="2374228" y="3537012"/>
+            <a:off x="3898229" y="3537012"/>
             <a:ext cx="1944215" cy="216026"/>
           </a:xfrm>
           <a:prstGeom prst="line">
@@ -12449,7 +12452,7 @@
         </p:nvCxnSpPr>
         <p:spPr>
           <a:xfrm>
-            <a:off x="2374228" y="3537012"/>
+            <a:off x="3898229" y="3537012"/>
             <a:ext cx="1944215" cy="1080122"/>
           </a:xfrm>
           <a:prstGeom prst="line">
@@ -12489,7 +12492,7 @@
         </p:nvCxnSpPr>
         <p:spPr>
           <a:xfrm flipV="1">
-            <a:off x="2374228" y="2888942"/>
+            <a:off x="3898229" y="2888942"/>
             <a:ext cx="1944215" cy="1080118"/>
           </a:xfrm>
           <a:prstGeom prst="line">
@@ -12529,7 +12532,7 @@
         </p:nvCxnSpPr>
         <p:spPr>
           <a:xfrm flipV="1">
-            <a:off x="2374228" y="3753038"/>
+            <a:off x="3898229" y="3753038"/>
             <a:ext cx="1944215" cy="216022"/>
           </a:xfrm>
           <a:prstGeom prst="line">
@@ -12569,7 +12572,7 @@
         </p:nvCxnSpPr>
         <p:spPr>
           <a:xfrm flipV="1">
-            <a:off x="2374228" y="3320990"/>
+            <a:off x="3898229" y="3320990"/>
             <a:ext cx="1944215" cy="648070"/>
           </a:xfrm>
           <a:prstGeom prst="line">
@@ -12609,7 +12612,7 @@
         </p:nvCxnSpPr>
         <p:spPr>
           <a:xfrm>
-            <a:off x="2374228" y="3969060"/>
+            <a:off x="3898229" y="3969060"/>
             <a:ext cx="1944215" cy="216026"/>
           </a:xfrm>
           <a:prstGeom prst="line">
@@ -12649,7 +12652,7 @@
         </p:nvCxnSpPr>
         <p:spPr>
           <a:xfrm flipV="1">
-            <a:off x="2374228" y="2888942"/>
+            <a:off x="3898229" y="2888942"/>
             <a:ext cx="1944215" cy="1512166"/>
           </a:xfrm>
           <a:prstGeom prst="line">
@@ -12689,7 +12692,7 @@
         </p:nvCxnSpPr>
         <p:spPr>
           <a:xfrm flipV="1">
-            <a:off x="2374228" y="3320990"/>
+            <a:off x="3898229" y="3320990"/>
             <a:ext cx="1944215" cy="1080118"/>
           </a:xfrm>
           <a:prstGeom prst="line">
@@ -12729,7 +12732,7 @@
         </p:nvCxnSpPr>
         <p:spPr>
           <a:xfrm flipV="1">
-            <a:off x="2374228" y="3753038"/>
+            <a:off x="3898229" y="3753038"/>
             <a:ext cx="1944215" cy="648070"/>
           </a:xfrm>
           <a:prstGeom prst="line">
@@ -12769,7 +12772,7 @@
         </p:nvCxnSpPr>
         <p:spPr>
           <a:xfrm flipV="1">
-            <a:off x="2374228" y="4185086"/>
+            <a:off x="3898229" y="4185086"/>
             <a:ext cx="1944215" cy="216022"/>
           </a:xfrm>
           <a:prstGeom prst="line">
@@ -12809,7 +12812,7 @@
         </p:nvCxnSpPr>
         <p:spPr>
           <a:xfrm>
-            <a:off x="2374228" y="4401108"/>
+            <a:off x="3898229" y="4401108"/>
             <a:ext cx="1944215" cy="216026"/>
           </a:xfrm>
           <a:prstGeom prst="line">
@@ -12849,7 +12852,7 @@
         </p:nvCxnSpPr>
         <p:spPr>
           <a:xfrm flipV="1">
-            <a:off x="2374228" y="2888942"/>
+            <a:off x="3898229" y="2888942"/>
             <a:ext cx="1944215" cy="1944214"/>
           </a:xfrm>
           <a:prstGeom prst="line">
@@ -12889,7 +12892,7 @@
         </p:nvCxnSpPr>
         <p:spPr>
           <a:xfrm flipV="1">
-            <a:off x="2374228" y="3320990"/>
+            <a:off x="3898229" y="3320990"/>
             <a:ext cx="1944215" cy="1512166"/>
           </a:xfrm>
           <a:prstGeom prst="line">
@@ -12929,7 +12932,7 @@
         </p:nvCxnSpPr>
         <p:spPr>
           <a:xfrm flipV="1">
-            <a:off x="2374228" y="3753038"/>
+            <a:off x="3898229" y="3753038"/>
             <a:ext cx="1944215" cy="1080118"/>
           </a:xfrm>
           <a:prstGeom prst="line">
@@ -12969,7 +12972,7 @@
         </p:nvCxnSpPr>
         <p:spPr>
           <a:xfrm flipV="1">
-            <a:off x="2374228" y="4617134"/>
+            <a:off x="3898229" y="4617134"/>
             <a:ext cx="1944215" cy="216022"/>
           </a:xfrm>
           <a:prstGeom prst="line">
@@ -13009,7 +13012,7 @@
         </p:nvCxnSpPr>
         <p:spPr>
           <a:xfrm flipV="1">
-            <a:off x="2374228" y="4185086"/>
+            <a:off x="3898229" y="4185086"/>
             <a:ext cx="1944215" cy="648070"/>
           </a:xfrm>
           <a:prstGeom prst="line">
@@ -13049,7 +13052,7 @@
         </p:nvCxnSpPr>
         <p:spPr>
           <a:xfrm>
-            <a:off x="2374228" y="3969060"/>
+            <a:off x="3898229" y="3969060"/>
             <a:ext cx="1944215" cy="648074"/>
           </a:xfrm>
           <a:prstGeom prst="line">
@@ -13089,7 +13092,7 @@
         </p:nvCxnSpPr>
         <p:spPr>
           <a:xfrm flipV="1">
-            <a:off x="2374228" y="2888942"/>
+            <a:off x="3898229" y="2888942"/>
             <a:ext cx="1944215" cy="2376262"/>
           </a:xfrm>
           <a:prstGeom prst="line">
@@ -13129,7 +13132,7 @@
         </p:nvCxnSpPr>
         <p:spPr>
           <a:xfrm flipV="1">
-            <a:off x="2374228" y="3753038"/>
+            <a:off x="3898229" y="3753038"/>
             <a:ext cx="1944215" cy="1512166"/>
           </a:xfrm>
           <a:prstGeom prst="line">
@@ -13169,7 +13172,7 @@
         </p:nvCxnSpPr>
         <p:spPr>
           <a:xfrm flipV="1">
-            <a:off x="2374228" y="4185086"/>
+            <a:off x="3898229" y="4185086"/>
             <a:ext cx="1944215" cy="1080118"/>
           </a:xfrm>
           <a:prstGeom prst="line">
@@ -13209,7 +13212,7 @@
         </p:nvCxnSpPr>
         <p:spPr>
           <a:xfrm flipV="1">
-            <a:off x="2374228" y="4617134"/>
+            <a:off x="3898229" y="4617134"/>
             <a:ext cx="1944215" cy="648070"/>
           </a:xfrm>
           <a:prstGeom prst="line">
@@ -13249,7 +13252,7 @@
         </p:nvCxnSpPr>
         <p:spPr>
           <a:xfrm flipV="1">
-            <a:off x="2374228" y="2888942"/>
+            <a:off x="3898229" y="2888942"/>
             <a:ext cx="1944215" cy="2808310"/>
           </a:xfrm>
           <a:prstGeom prst="line">
@@ -13289,7 +13292,7 @@
         </p:nvCxnSpPr>
         <p:spPr>
           <a:xfrm flipV="1">
-            <a:off x="2374228" y="3320990"/>
+            <a:off x="3898229" y="3320990"/>
             <a:ext cx="1944215" cy="2376262"/>
           </a:xfrm>
           <a:prstGeom prst="line">
@@ -13329,7 +13332,7 @@
         </p:nvCxnSpPr>
         <p:spPr>
           <a:xfrm flipV="1">
-            <a:off x="2374228" y="3753038"/>
+            <a:off x="3898229" y="3753038"/>
             <a:ext cx="1944215" cy="1944214"/>
           </a:xfrm>
           <a:prstGeom prst="line">
@@ -13369,7 +13372,7 @@
         </p:nvCxnSpPr>
         <p:spPr>
           <a:xfrm flipV="1">
-            <a:off x="2374228" y="3320990"/>
+            <a:off x="3898229" y="3320990"/>
             <a:ext cx="1944215" cy="1944214"/>
           </a:xfrm>
           <a:prstGeom prst="line">
@@ -13409,7 +13412,7 @@
         </p:nvCxnSpPr>
         <p:spPr>
           <a:xfrm flipV="1">
-            <a:off x="2374228" y="4185086"/>
+            <a:off x="3898229" y="4185086"/>
             <a:ext cx="1944215" cy="1512166"/>
           </a:xfrm>
           <a:prstGeom prst="line">
@@ -13449,7 +13452,7 @@
         </p:nvCxnSpPr>
         <p:spPr>
           <a:xfrm flipV="1">
-            <a:off x="2374228" y="4617134"/>
+            <a:off x="3898229" y="4617134"/>
             <a:ext cx="1944215" cy="1080118"/>
           </a:xfrm>
           <a:prstGeom prst="line">
@@ -13485,7 +13488,7 @@
         </p:nvSpPr>
         <p:spPr>
           <a:xfrm rot="5400000">
-            <a:off x="6334663" y="3573019"/>
+            <a:off x="7858663" y="3573020"/>
             <a:ext cx="360040" cy="360041"/>
           </a:xfrm>
           <a:prstGeom prst="flowChartConnector">
@@ -13548,7 +13551,7 @@
         </p:nvCxnSpPr>
         <p:spPr>
           <a:xfrm>
-            <a:off x="4678481" y="2888945"/>
+            <a:off x="6202481" y="2888946"/>
             <a:ext cx="1656182" cy="864095"/>
           </a:xfrm>
           <a:prstGeom prst="line">
@@ -13588,7 +13591,7 @@
         </p:nvCxnSpPr>
         <p:spPr>
           <a:xfrm flipV="1">
-            <a:off x="4678481" y="3753040"/>
+            <a:off x="6202481" y="3753041"/>
             <a:ext cx="1656182" cy="864097"/>
           </a:xfrm>
           <a:prstGeom prst="line">
@@ -13628,7 +13631,7 @@
         </p:nvCxnSpPr>
         <p:spPr>
           <a:xfrm flipV="1">
-            <a:off x="4678481" y="3753040"/>
+            <a:off x="6202481" y="3753041"/>
             <a:ext cx="1656182" cy="432049"/>
           </a:xfrm>
           <a:prstGeom prst="line">
@@ -13668,7 +13671,7 @@
         </p:nvCxnSpPr>
         <p:spPr>
           <a:xfrm flipV="1">
-            <a:off x="4678481" y="3753040"/>
+            <a:off x="6202481" y="3753041"/>
             <a:ext cx="1656182" cy="1"/>
           </a:xfrm>
           <a:prstGeom prst="line">
@@ -13708,7 +13711,7 @@
         </p:nvCxnSpPr>
         <p:spPr>
           <a:xfrm>
-            <a:off x="4678481" y="3320993"/>
+            <a:off x="6202481" y="3320994"/>
             <a:ext cx="1656182" cy="432047"/>
           </a:xfrm>
           <a:prstGeom prst="line">
@@ -13744,7 +13747,7 @@
         </p:nvSpPr>
         <p:spPr>
           <a:xfrm>
-            <a:off x="3667304" y="703750"/>
+            <a:off x="5191305" y="703751"/>
             <a:ext cx="1662317" cy="584775"/>
           </a:xfrm>
           <a:prstGeom prst="rect">
@@ -13780,7 +13783,7 @@
         </p:nvSpPr>
         <p:spPr>
           <a:xfrm>
-            <a:off x="5937086" y="703750"/>
+            <a:off x="7461086" y="703751"/>
             <a:ext cx="1155194" cy="584775"/>
           </a:xfrm>
           <a:prstGeom prst="rect">
@@ -13846,7 +13849,7 @@
         </p:nvGrpSpPr>
         <p:grpSpPr>
           <a:xfrm rot="5400000">
-            <a:off x="-137452" y="2258640"/>
+            <a:off x="1386549" y="2258641"/>
             <a:ext cx="3694735" cy="2340725"/>
             <a:chOff x="4166023" y="1475876"/>
             <a:chExt cx="3694735" cy="2340725"/>
@@ -14443,7 +14446,7 @@
         </p:nvSpPr>
         <p:spPr>
           <a:xfrm rot="5400000">
-            <a:off x="4859629" y="3158453"/>
+            <a:off x="6383629" y="3158453"/>
             <a:ext cx="540000" cy="540000"/>
           </a:xfrm>
           <a:prstGeom prst="flowChartConnector">
@@ -14503,7 +14506,7 @@
         </p:nvSpPr>
         <p:spPr>
           <a:xfrm rot="5400000">
-            <a:off x="7378986" y="3159000"/>
+            <a:off x="8902986" y="3159000"/>
             <a:ext cx="540000" cy="540000"/>
           </a:xfrm>
           <a:prstGeom prst="flowChartConnector">
@@ -14557,7 +14560,7 @@
         </p:nvCxnSpPr>
         <p:spPr>
           <a:xfrm flipV="1">
-            <a:off x="3419872" y="3429003"/>
+            <a:off x="4943872" y="3429004"/>
             <a:ext cx="792088" cy="1"/>
           </a:xfrm>
           <a:prstGeom prst="straightConnector1">
@@ -14601,7 +14604,7 @@
         </p:nvCxnSpPr>
         <p:spPr>
           <a:xfrm flipV="1">
-            <a:off x="6012160" y="3428456"/>
+            <a:off x="7536160" y="3428457"/>
             <a:ext cx="900966" cy="547"/>
           </a:xfrm>
           <a:prstGeom prst="straightConnector1">
@@ -14643,7 +14646,7 @@
         </p:nvSpPr>
         <p:spPr>
           <a:xfrm>
-            <a:off x="1913928" y="1920627"/>
+            <a:off x="3437929" y="1920628"/>
             <a:ext cx="1392703" cy="584775"/>
           </a:xfrm>
           <a:prstGeom prst="rect">
@@ -14679,7 +14682,7 @@
         </p:nvSpPr>
         <p:spPr>
           <a:xfrm>
-            <a:off x="4376194" y="1920193"/>
+            <a:off x="5900195" y="1920194"/>
             <a:ext cx="1506875" cy="584775"/>
           </a:xfrm>
           <a:prstGeom prst="rect">
@@ -14715,7 +14718,7 @@
         </p:nvSpPr>
         <p:spPr>
           <a:xfrm>
-            <a:off x="6895551" y="1920193"/>
+            <a:off x="8419552" y="1920194"/>
             <a:ext cx="1506875" cy="584775"/>
           </a:xfrm>
           <a:prstGeom prst="rect">
@@ -14753,7 +14756,7 @@
             </p:nvSpPr>
             <p:spPr>
               <a:xfrm>
-                <a:off x="2516917" y="4345046"/>
+                <a:off x="4040917" y="4345047"/>
                 <a:ext cx="186718" cy="276999"/>
               </a:xfrm>
               <a:prstGeom prst="rect">
@@ -14817,7 +14820,7 @@
             </p:nvSpPr>
             <p:spPr>
               <a:xfrm>
-                <a:off x="2516917" y="4345046"/>
+                <a:off x="4040917" y="4345047"/>
                 <a:ext cx="186718" cy="276999"/>
               </a:xfrm>
               <a:prstGeom prst="rect">
@@ -14861,7 +14864,7 @@
             </p:nvSpPr>
             <p:spPr>
               <a:xfrm>
-                <a:off x="4747731" y="4345045"/>
+                <a:off x="6271732" y="4345046"/>
                 <a:ext cx="763799" cy="276999"/>
               </a:xfrm>
               <a:prstGeom prst="rect">
@@ -14956,7 +14959,7 @@
             </p:nvSpPr>
             <p:spPr>
               <a:xfrm>
-                <a:off x="4747731" y="4345045"/>
+                <a:off x="6271732" y="4345046"/>
                 <a:ext cx="763799" cy="276999"/>
               </a:xfrm>
               <a:prstGeom prst="rect">
@@ -15000,7 +15003,7 @@
             </p:nvSpPr>
             <p:spPr>
               <a:xfrm>
-                <a:off x="7037151" y="4345044"/>
+                <a:off x="8561151" y="4345045"/>
                 <a:ext cx="1223668" cy="276999"/>
               </a:xfrm>
               <a:prstGeom prst="rect">
@@ -15107,7 +15110,7 @@
             </p:nvSpPr>
             <p:spPr>
               <a:xfrm>
-                <a:off x="7037151" y="4345044"/>
+                <a:off x="8561151" y="4345045"/>
                 <a:ext cx="1223668" cy="276999"/>
               </a:xfrm>
               <a:prstGeom prst="rect">
@@ -15179,7 +15182,7 @@
         </p:nvSpPr>
         <p:spPr>
           <a:xfrm>
-            <a:off x="-47398" y="2103520"/>
+            <a:off x="1476603" y="2103520"/>
             <a:ext cx="1264227" cy="2650960"/>
           </a:xfrm>
           <a:prstGeom prst="roundRect">
@@ -15231,7 +15234,7 @@
         </p:nvSpPr>
         <p:spPr>
           <a:xfrm>
-            <a:off x="5911522" y="332882"/>
+            <a:off x="7435523" y="332883"/>
             <a:ext cx="2839451" cy="2650959"/>
           </a:xfrm>
           <a:prstGeom prst="roundRect">
@@ -15290,7 +15293,7 @@
         </p:nvSpPr>
         <p:spPr>
           <a:xfrm>
-            <a:off x="5871419" y="3874177"/>
+            <a:off x="7395420" y="3874178"/>
             <a:ext cx="2839451" cy="2650959"/>
           </a:xfrm>
           <a:prstGeom prst="roundRect">
@@ -15349,7 +15352,7 @@
         </p:nvSpPr>
         <p:spPr>
           <a:xfrm>
-            <a:off x="314713" y="2396416"/>
+            <a:off x="1838713" y="2396416"/>
             <a:ext cx="540000" cy="540000"/>
           </a:xfrm>
           <a:prstGeom prst="flowChartConnector">
@@ -15395,7 +15398,7 @@
         </p:nvSpPr>
         <p:spPr>
           <a:xfrm>
-            <a:off x="314713" y="3921584"/>
+            <a:off x="1838713" y="3921584"/>
             <a:ext cx="540000" cy="540000"/>
           </a:xfrm>
           <a:prstGeom prst="flowChartConnector">
@@ -15441,7 +15444,7 @@
         </p:nvSpPr>
         <p:spPr>
           <a:xfrm>
-            <a:off x="314713" y="3159000"/>
+            <a:off x="1838713" y="3159000"/>
             <a:ext cx="540000" cy="540000"/>
           </a:xfrm>
           <a:prstGeom prst="flowChartConnector">
@@ -15489,7 +15492,7 @@
         </p:nvCxnSpPr>
         <p:spPr>
           <a:xfrm flipV="1">
-            <a:off x="1419726" y="1658362"/>
+            <a:off x="2943726" y="1658363"/>
             <a:ext cx="2646948" cy="1500647"/>
           </a:xfrm>
           <a:prstGeom prst="straightConnector1">
@@ -15533,7 +15536,7 @@
         </p:nvCxnSpPr>
         <p:spPr>
           <a:xfrm>
-            <a:off x="1419726" y="3699008"/>
+            <a:off x="2943726" y="3699009"/>
             <a:ext cx="2646948" cy="1500647"/>
           </a:xfrm>
           <a:prstGeom prst="straightConnector1">
@@ -15575,7 +15578,7 @@
         </p:nvSpPr>
         <p:spPr>
           <a:xfrm>
-            <a:off x="-125151" y="1234612"/>
+            <a:off x="1398849" y="1234613"/>
             <a:ext cx="1419726" cy="646331"/>
           </a:xfrm>
           <a:prstGeom prst="rect">
@@ -15611,7 +15614,7 @@
         </p:nvSpPr>
         <p:spPr>
           <a:xfrm>
-            <a:off x="2001644" y="1019022"/>
+            <a:off x="3525645" y="1019022"/>
             <a:ext cx="1991639" cy="738664"/>
           </a:xfrm>
           <a:prstGeom prst="rect">
@@ -15646,7 +15649,7 @@
         </p:nvSpPr>
         <p:spPr>
           <a:xfrm>
-            <a:off x="1980786" y="5199646"/>
+            <a:off x="3504786" y="5199646"/>
             <a:ext cx="2033336" cy="738664"/>
           </a:xfrm>
           <a:prstGeom prst="rect">
@@ -15681,7 +15684,7 @@
         </p:nvSpPr>
         <p:spPr>
           <a:xfrm>
-            <a:off x="4149309" y="1473686"/>
+            <a:off x="5673310" y="1473686"/>
             <a:ext cx="1679585" cy="369332"/>
           </a:xfrm>
           <a:prstGeom prst="rect">
@@ -15725,7 +15728,7 @@
         </p:nvSpPr>
         <p:spPr>
           <a:xfrm>
-            <a:off x="4129258" y="5014980"/>
+            <a:off x="5653259" y="5014980"/>
             <a:ext cx="1679585" cy="369332"/>
           </a:xfrm>
           <a:prstGeom prst="rect">
@@ -15765,7 +15768,7 @@
         </p:nvSpPr>
         <p:spPr>
           <a:xfrm>
-            <a:off x="9058183" y="1473686"/>
+            <a:off x="10582183" y="1473686"/>
             <a:ext cx="831776" cy="369332"/>
           </a:xfrm>
           <a:prstGeom prst="rect">
@@ -15801,7 +15804,7 @@
         </p:nvSpPr>
         <p:spPr>
           <a:xfrm>
-            <a:off x="9058183" y="5014980"/>
+            <a:off x="10582183" y="5014980"/>
             <a:ext cx="831776" cy="369332"/>
           </a:xfrm>
           <a:prstGeom prst="rect">
@@ -15837,7 +15840,7 @@
         </p:nvSpPr>
         <p:spPr>
           <a:xfrm>
-            <a:off x="4623346" y="865142"/>
+            <a:off x="6147347" y="865143"/>
             <a:ext cx="731509" cy="307777"/>
           </a:xfrm>
           <a:prstGeom prst="rect">
@@ -15873,7 +15876,7 @@
         </p:nvSpPr>
         <p:spPr>
           <a:xfrm>
-            <a:off x="4603295" y="4600600"/>
+            <a:off x="6127296" y="4600601"/>
             <a:ext cx="731509" cy="307777"/>
           </a:xfrm>
           <a:prstGeom prst="rect">
@@ -15909,7 +15912,7 @@
         </p:nvSpPr>
         <p:spPr>
           <a:xfrm>
-            <a:off x="9108325" y="865142"/>
+            <a:off x="10632326" y="865143"/>
             <a:ext cx="781643" cy="307777"/>
           </a:xfrm>
           <a:prstGeom prst="rect">
@@ -15945,7 +15948,7 @@
         </p:nvSpPr>
         <p:spPr>
           <a:xfrm>
-            <a:off x="9083258" y="4602436"/>
+            <a:off x="10607259" y="4602437"/>
             <a:ext cx="781643" cy="307777"/>
           </a:xfrm>
           <a:prstGeom prst="rect">
@@ -16011,7 +16014,7 @@
         </p:nvGrpSpPr>
         <p:grpSpPr>
           <a:xfrm>
-            <a:off x="-593365" y="3900535"/>
+            <a:off x="930635" y="3900535"/>
             <a:ext cx="3830400" cy="2070000"/>
             <a:chOff x="1123141" y="1475876"/>
             <a:chExt cx="7662308" cy="4141450"/>
@@ -19048,7 +19051,7 @@
         </p:nvSpPr>
         <p:spPr>
           <a:xfrm>
-            <a:off x="6137771" y="3908974"/>
+            <a:off x="7661771" y="3908974"/>
             <a:ext cx="540000" cy="540000"/>
           </a:xfrm>
           <a:prstGeom prst="flowChartConnector">
@@ -19100,7 +19103,7 @@
         </p:nvSpPr>
         <p:spPr>
           <a:xfrm>
-            <a:off x="5506824" y="3908974"/>
+            <a:off x="7030824" y="3908974"/>
             <a:ext cx="540000" cy="540000"/>
           </a:xfrm>
           <a:prstGeom prst="flowChartConnector">
@@ -19152,7 +19155,7 @@
         </p:nvSpPr>
         <p:spPr>
           <a:xfrm>
-            <a:off x="6768718" y="3908974"/>
+            <a:off x="8292718" y="3908974"/>
             <a:ext cx="540000" cy="540000"/>
           </a:xfrm>
           <a:prstGeom prst="flowChartConnector">
@@ -19204,7 +19207,7 @@
         </p:nvSpPr>
         <p:spPr>
           <a:xfrm>
-            <a:off x="8752505" y="3908974"/>
+            <a:off x="10276505" y="3908974"/>
             <a:ext cx="540000" cy="540000"/>
           </a:xfrm>
           <a:prstGeom prst="flowChartConnector">
@@ -19256,7 +19259,7 @@
         </p:nvSpPr>
         <p:spPr>
           <a:xfrm>
-            <a:off x="7401030" y="3908983"/>
+            <a:off x="8925031" y="3908984"/>
             <a:ext cx="1259181" cy="539999"/>
           </a:xfrm>
           <a:prstGeom prst="roundRect">
@@ -19312,7 +19315,7 @@
         </p:nvSpPr>
         <p:spPr>
           <a:xfrm>
-            <a:off x="6137771" y="2557428"/>
+            <a:off x="7661771" y="2557428"/>
             <a:ext cx="540000" cy="540000"/>
           </a:xfrm>
           <a:prstGeom prst="flowChartConnector">
@@ -19358,7 +19361,7 @@
         </p:nvSpPr>
         <p:spPr>
           <a:xfrm>
-            <a:off x="6768718" y="2557428"/>
+            <a:off x="8292718" y="2557428"/>
             <a:ext cx="540000" cy="540000"/>
           </a:xfrm>
           <a:prstGeom prst="flowChartConnector">
@@ -19404,7 +19407,7 @@
         </p:nvSpPr>
         <p:spPr>
           <a:xfrm>
-            <a:off x="7399665" y="2557428"/>
+            <a:off x="8923665" y="2557428"/>
             <a:ext cx="540000" cy="540000"/>
           </a:xfrm>
           <a:prstGeom prst="flowChartConnector">
@@ -19450,7 +19453,7 @@
         </p:nvSpPr>
         <p:spPr>
           <a:xfrm>
-            <a:off x="8030612" y="2557428"/>
+            <a:off x="9554612" y="2557428"/>
             <a:ext cx="540000" cy="540000"/>
           </a:xfrm>
           <a:prstGeom prst="flowChartConnector">
@@ -19496,7 +19499,7 @@
         </p:nvSpPr>
         <p:spPr>
           <a:xfrm>
-            <a:off x="6137771" y="1205882"/>
+            <a:off x="7661771" y="1205882"/>
             <a:ext cx="540000" cy="540000"/>
           </a:xfrm>
           <a:prstGeom prst="flowChartConnector">
@@ -19548,7 +19551,7 @@
         </p:nvSpPr>
         <p:spPr>
           <a:xfrm>
-            <a:off x="5506824" y="1205882"/>
+            <a:off x="7030824" y="1205882"/>
             <a:ext cx="540000" cy="540000"/>
           </a:xfrm>
           <a:prstGeom prst="flowChartConnector">
@@ -19600,7 +19603,7 @@
         </p:nvSpPr>
         <p:spPr>
           <a:xfrm>
-            <a:off x="6768718" y="1205882"/>
+            <a:off x="8292718" y="1205882"/>
             <a:ext cx="540000" cy="540000"/>
           </a:xfrm>
           <a:prstGeom prst="flowChartConnector">
@@ -19652,7 +19655,7 @@
         </p:nvSpPr>
         <p:spPr>
           <a:xfrm>
-            <a:off x="8752505" y="1205882"/>
+            <a:off x="10276505" y="1205882"/>
             <a:ext cx="540000" cy="540000"/>
           </a:xfrm>
           <a:prstGeom prst="flowChartConnector">
@@ -19704,7 +19707,7 @@
         </p:nvSpPr>
         <p:spPr>
           <a:xfrm>
-            <a:off x="7401030" y="1205891"/>
+            <a:off x="8925031" y="1205892"/>
             <a:ext cx="1259181" cy="539999"/>
           </a:xfrm>
           <a:prstGeom prst="roundRect">
@@ -19764,7 +19767,7 @@
         </p:nvCxnSpPr>
         <p:spPr>
           <a:xfrm flipH="1" flipV="1">
-            <a:off x="5776833" y="1745882"/>
+            <a:off x="7300834" y="1745882"/>
             <a:ext cx="630947" cy="811546"/>
           </a:xfrm>
           <a:prstGeom prst="line">
@@ -19804,7 +19807,7 @@
         </p:nvCxnSpPr>
         <p:spPr>
           <a:xfrm flipH="1" flipV="1">
-            <a:off x="5776824" y="1745882"/>
+            <a:off x="7300824" y="1745882"/>
             <a:ext cx="1261894" cy="811546"/>
           </a:xfrm>
           <a:prstGeom prst="line">
@@ -19844,7 +19847,7 @@
         </p:nvCxnSpPr>
         <p:spPr>
           <a:xfrm flipH="1" flipV="1">
-            <a:off x="5776833" y="1745882"/>
+            <a:off x="7300834" y="1745882"/>
             <a:ext cx="1892841" cy="811546"/>
           </a:xfrm>
           <a:prstGeom prst="line">
@@ -19884,7 +19887,7 @@
         </p:nvCxnSpPr>
         <p:spPr>
           <a:xfrm flipH="1" flipV="1">
-            <a:off x="5776824" y="1745882"/>
+            <a:off x="7300824" y="1745882"/>
             <a:ext cx="2523788" cy="811546"/>
           </a:xfrm>
           <a:prstGeom prst="line">
@@ -19924,7 +19927,7 @@
         </p:nvCxnSpPr>
         <p:spPr>
           <a:xfrm flipV="1">
-            <a:off x="6407771" y="1745882"/>
+            <a:off x="7931771" y="1745882"/>
             <a:ext cx="0" cy="811546"/>
           </a:xfrm>
           <a:prstGeom prst="line">
@@ -19964,7 +19967,7 @@
         </p:nvCxnSpPr>
         <p:spPr>
           <a:xfrm flipH="1" flipV="1">
-            <a:off x="6407780" y="1745882"/>
+            <a:off x="7931781" y="1745882"/>
             <a:ext cx="630947" cy="811546"/>
           </a:xfrm>
           <a:prstGeom prst="line">
@@ -20004,7 +20007,7 @@
         </p:nvCxnSpPr>
         <p:spPr>
           <a:xfrm flipH="1" flipV="1">
-            <a:off x="6407771" y="1745882"/>
+            <a:off x="7931771" y="1745882"/>
             <a:ext cx="1261894" cy="811546"/>
           </a:xfrm>
           <a:prstGeom prst="line">
@@ -20044,7 +20047,7 @@
         </p:nvCxnSpPr>
         <p:spPr>
           <a:xfrm flipH="1" flipV="1">
-            <a:off x="6407780" y="1745882"/>
+            <a:off x="7931781" y="1745882"/>
             <a:ext cx="1892841" cy="811546"/>
           </a:xfrm>
           <a:prstGeom prst="line">
@@ -20084,7 +20087,7 @@
         </p:nvCxnSpPr>
         <p:spPr>
           <a:xfrm flipV="1">
-            <a:off x="6407780" y="1745882"/>
+            <a:off x="7931781" y="1745882"/>
             <a:ext cx="630947" cy="811546"/>
           </a:xfrm>
           <a:prstGeom prst="line">
@@ -20124,7 +20127,7 @@
         </p:nvCxnSpPr>
         <p:spPr>
           <a:xfrm flipV="1">
-            <a:off x="7038718" y="1745882"/>
+            <a:off x="8562718" y="1745882"/>
             <a:ext cx="0" cy="811546"/>
           </a:xfrm>
           <a:prstGeom prst="line">
@@ -20164,7 +20167,7 @@
         </p:nvCxnSpPr>
         <p:spPr>
           <a:xfrm flipH="1" flipV="1">
-            <a:off x="7038727" y="1745882"/>
+            <a:off x="8562728" y="1745882"/>
             <a:ext cx="630947" cy="811546"/>
           </a:xfrm>
           <a:prstGeom prst="line">
@@ -20204,7 +20207,7 @@
         </p:nvCxnSpPr>
         <p:spPr>
           <a:xfrm flipH="1" flipV="1">
-            <a:off x="7038718" y="1745882"/>
+            <a:off x="8562718" y="1745882"/>
             <a:ext cx="1261894" cy="811546"/>
           </a:xfrm>
           <a:prstGeom prst="line">
@@ -20244,7 +20247,7 @@
         </p:nvCxnSpPr>
         <p:spPr>
           <a:xfrm flipV="1">
-            <a:off x="6407771" y="1745882"/>
+            <a:off x="7931771" y="1745882"/>
             <a:ext cx="2614734" cy="811546"/>
           </a:xfrm>
           <a:prstGeom prst="line">
@@ -20284,7 +20287,7 @@
         </p:nvCxnSpPr>
         <p:spPr>
           <a:xfrm flipV="1">
-            <a:off x="7038727" y="1745882"/>
+            <a:off x="8562728" y="1745882"/>
             <a:ext cx="1983787" cy="811546"/>
           </a:xfrm>
           <a:prstGeom prst="line">
@@ -20324,7 +20327,7 @@
         </p:nvCxnSpPr>
         <p:spPr>
           <a:xfrm flipV="1">
-            <a:off x="7669665" y="1745882"/>
+            <a:off x="9193665" y="1745882"/>
             <a:ext cx="1352840" cy="811546"/>
           </a:xfrm>
           <a:prstGeom prst="line">
@@ -20364,7 +20367,7 @@
         </p:nvCxnSpPr>
         <p:spPr>
           <a:xfrm flipV="1">
-            <a:off x="8300621" y="1745882"/>
+            <a:off x="9824622" y="1745882"/>
             <a:ext cx="721893" cy="811546"/>
           </a:xfrm>
           <a:prstGeom prst="line">
@@ -20404,7 +20407,7 @@
         </p:nvCxnSpPr>
         <p:spPr>
           <a:xfrm flipH="1">
-            <a:off x="5776833" y="3097428"/>
+            <a:off x="7300834" y="3097428"/>
             <a:ext cx="630947" cy="811546"/>
           </a:xfrm>
           <a:prstGeom prst="line">
@@ -20444,7 +20447,7 @@
         </p:nvCxnSpPr>
         <p:spPr>
           <a:xfrm flipH="1">
-            <a:off x="5776824" y="3097428"/>
+            <a:off x="7300824" y="3097428"/>
             <a:ext cx="1261894" cy="811546"/>
           </a:xfrm>
           <a:prstGeom prst="line">
@@ -20484,7 +20487,7 @@
         </p:nvCxnSpPr>
         <p:spPr>
           <a:xfrm flipH="1">
-            <a:off x="5776833" y="3097428"/>
+            <a:off x="7300834" y="3097428"/>
             <a:ext cx="1892841" cy="811546"/>
           </a:xfrm>
           <a:prstGeom prst="line">
@@ -20524,7 +20527,7 @@
         </p:nvCxnSpPr>
         <p:spPr>
           <a:xfrm flipH="1">
-            <a:off x="5776824" y="3097428"/>
+            <a:off x="7300824" y="3097428"/>
             <a:ext cx="2523788" cy="811546"/>
           </a:xfrm>
           <a:prstGeom prst="line">
@@ -20564,7 +20567,7 @@
         </p:nvCxnSpPr>
         <p:spPr>
           <a:xfrm>
-            <a:off x="6407771" y="3097428"/>
+            <a:off x="7931771" y="3097428"/>
             <a:ext cx="0" cy="811546"/>
           </a:xfrm>
           <a:prstGeom prst="line">
@@ -20604,7 +20607,7 @@
         </p:nvCxnSpPr>
         <p:spPr>
           <a:xfrm flipH="1">
-            <a:off x="6407771" y="3097428"/>
+            <a:off x="7931771" y="3097428"/>
             <a:ext cx="1261894" cy="811546"/>
           </a:xfrm>
           <a:prstGeom prst="line">
@@ -20644,7 +20647,7 @@
         </p:nvCxnSpPr>
         <p:spPr>
           <a:xfrm flipH="1">
-            <a:off x="6407780" y="3097428"/>
+            <a:off x="7931781" y="3097428"/>
             <a:ext cx="630947" cy="811546"/>
           </a:xfrm>
           <a:prstGeom prst="line">
@@ -20684,7 +20687,7 @@
         </p:nvCxnSpPr>
         <p:spPr>
           <a:xfrm flipH="1">
-            <a:off x="6407780" y="3097428"/>
+            <a:off x="7931781" y="3097428"/>
             <a:ext cx="1892841" cy="811546"/>
           </a:xfrm>
           <a:prstGeom prst="line">
@@ -20724,7 +20727,7 @@
         </p:nvCxnSpPr>
         <p:spPr>
           <a:xfrm>
-            <a:off x="6407780" y="3097428"/>
+            <a:off x="7931781" y="3097428"/>
             <a:ext cx="630947" cy="811546"/>
           </a:xfrm>
           <a:prstGeom prst="line">
@@ -20764,7 +20767,7 @@
         </p:nvCxnSpPr>
         <p:spPr>
           <a:xfrm>
-            <a:off x="7038718" y="3097428"/>
+            <a:off x="8562718" y="3097428"/>
             <a:ext cx="0" cy="811546"/>
           </a:xfrm>
           <a:prstGeom prst="line">
@@ -20804,7 +20807,7 @@
         </p:nvCxnSpPr>
         <p:spPr>
           <a:xfrm flipH="1">
-            <a:off x="7038727" y="3097428"/>
+            <a:off x="8562728" y="3097428"/>
             <a:ext cx="630947" cy="811546"/>
           </a:xfrm>
           <a:prstGeom prst="line">
@@ -20844,7 +20847,7 @@
         </p:nvCxnSpPr>
         <p:spPr>
           <a:xfrm flipH="1">
-            <a:off x="7038718" y="3097428"/>
+            <a:off x="8562718" y="3097428"/>
             <a:ext cx="1261894" cy="811546"/>
           </a:xfrm>
           <a:prstGeom prst="line">
@@ -20884,7 +20887,7 @@
         </p:nvCxnSpPr>
         <p:spPr>
           <a:xfrm flipH="1" flipV="1">
-            <a:off x="6407771" y="3097428"/>
+            <a:off x="7931771" y="3097428"/>
             <a:ext cx="2614734" cy="811546"/>
           </a:xfrm>
           <a:prstGeom prst="line">
@@ -20924,7 +20927,7 @@
         </p:nvCxnSpPr>
         <p:spPr>
           <a:xfrm flipH="1" flipV="1">
-            <a:off x="7038727" y="3097428"/>
+            <a:off x="8562728" y="3097428"/>
             <a:ext cx="1983787" cy="811546"/>
           </a:xfrm>
           <a:prstGeom prst="line">
@@ -20964,7 +20967,7 @@
         </p:nvCxnSpPr>
         <p:spPr>
           <a:xfrm flipH="1" flipV="1">
-            <a:off x="7669665" y="3097428"/>
+            <a:off x="9193665" y="3097428"/>
             <a:ext cx="1352840" cy="811546"/>
           </a:xfrm>
           <a:prstGeom prst="line">
@@ -21004,7 +21007,7 @@
         </p:nvCxnSpPr>
         <p:spPr>
           <a:xfrm flipH="1" flipV="1">
-            <a:off x="8300621" y="3097428"/>
+            <a:off x="9824622" y="3097428"/>
             <a:ext cx="721893" cy="811546"/>
           </a:xfrm>
           <a:prstGeom prst="line">
@@ -21040,7 +21043,7 @@
         </p:nvSpPr>
         <p:spPr>
           <a:xfrm>
-            <a:off x="1321843" y="5558589"/>
+            <a:off x="2845844" y="5558589"/>
             <a:ext cx="2006121" cy="555518"/>
           </a:xfrm>
           <a:prstGeom prst="rect">
@@ -21094,7 +21097,7 @@
         </p:nvCxnSpPr>
         <p:spPr>
           <a:xfrm flipV="1">
-            <a:off x="3398220" y="4681066"/>
+            <a:off x="4922221" y="4681067"/>
             <a:ext cx="2090985" cy="1017943"/>
           </a:xfrm>
           <a:prstGeom prst="straightConnector1">
@@ -21136,7 +21139,7 @@
         </p:nvSpPr>
         <p:spPr>
           <a:xfrm>
-            <a:off x="6814200" y="4720529"/>
+            <a:off x="8338201" y="4720530"/>
             <a:ext cx="1170947" cy="442575"/>
           </a:xfrm>
           <a:prstGeom prst="rect">
@@ -21192,7 +21195,7 @@
         </p:nvSpPr>
         <p:spPr>
           <a:xfrm>
-            <a:off x="6814199" y="444603"/>
+            <a:off x="8338200" y="444604"/>
             <a:ext cx="1170947" cy="442575"/>
           </a:xfrm>
           <a:prstGeom prst="rect">
@@ -21248,7 +21251,7 @@
         </p:nvSpPr>
         <p:spPr>
           <a:xfrm>
-            <a:off x="4555188" y="5489443"/>
+            <a:off x="6079189" y="5489444"/>
             <a:ext cx="2477591" cy="830997"/>
           </a:xfrm>
           <a:prstGeom prst="rect">
@@ -21290,7 +21293,7 @@
         </p:nvSpPr>
         <p:spPr>
           <a:xfrm>
-            <a:off x="-191589" y="3024476"/>
+            <a:off x="1332412" y="3024477"/>
             <a:ext cx="2560083" cy="584775"/>
           </a:xfrm>
           <a:prstGeom prst="rect">
@@ -21332,7 +21335,7 @@
 </file>
 
 <file path=ppt/slides/slide7.xml><?xml version="1.0" encoding="utf-8"?>
-<p:sld xmlns:a="http://schemas.openxmlformats.org/drawingml/2006/main" xmlns:r="http://schemas.openxmlformats.org/officeDocument/2006/relationships" xmlns:p="http://schemas.openxmlformats.org/presentationml/2006/main">
+<p:sld xmlns:a="http://schemas.openxmlformats.org/drawingml/2006/main" xmlns:r="http://schemas.openxmlformats.org/officeDocument/2006/relationships" xmlns:p="http://schemas.openxmlformats.org/presentationml/2006/main" show="0">
   <p:cSld>
     <p:spTree>
       <p:nvGrpSpPr>
@@ -21362,7 +21365,7 @@
         </p:nvSpPr>
         <p:spPr>
           <a:xfrm>
-            <a:off x="3399239" y="4510546"/>
+            <a:off x="4923239" y="4510546"/>
             <a:ext cx="540000" cy="540000"/>
           </a:xfrm>
           <a:prstGeom prst="flowChartConnector">
@@ -21414,7 +21417,7 @@
         </p:nvSpPr>
         <p:spPr>
           <a:xfrm>
-            <a:off x="2768292" y="4510546"/>
+            <a:off x="4292292" y="4510546"/>
             <a:ext cx="540000" cy="540000"/>
           </a:xfrm>
           <a:prstGeom prst="flowChartConnector">
@@ -21466,7 +21469,7 @@
         </p:nvSpPr>
         <p:spPr>
           <a:xfrm>
-            <a:off x="4030186" y="4510546"/>
+            <a:off x="5554186" y="4510546"/>
             <a:ext cx="540000" cy="540000"/>
           </a:xfrm>
           <a:prstGeom prst="flowChartConnector">
@@ -21518,7 +21521,7 @@
         </p:nvSpPr>
         <p:spPr>
           <a:xfrm>
-            <a:off x="6013973" y="4510546"/>
+            <a:off x="7537973" y="4510546"/>
             <a:ext cx="540000" cy="540000"/>
           </a:xfrm>
           <a:prstGeom prst="flowChartConnector">
@@ -21570,7 +21573,7 @@
         </p:nvSpPr>
         <p:spPr>
           <a:xfrm>
-            <a:off x="4662498" y="4510555"/>
+            <a:off x="6186499" y="4510556"/>
             <a:ext cx="1259181" cy="539999"/>
           </a:xfrm>
           <a:prstGeom prst="roundRect">
@@ -21626,7 +21629,7 @@
         </p:nvSpPr>
         <p:spPr>
           <a:xfrm>
-            <a:off x="3399239" y="3159000"/>
+            <a:off x="4923239" y="3159000"/>
             <a:ext cx="540000" cy="540000"/>
           </a:xfrm>
           <a:prstGeom prst="flowChartConnector">
@@ -21672,7 +21675,7 @@
         </p:nvSpPr>
         <p:spPr>
           <a:xfrm>
-            <a:off x="4030186" y="3159000"/>
+            <a:off x="5554186" y="3159000"/>
             <a:ext cx="540000" cy="540000"/>
           </a:xfrm>
           <a:prstGeom prst="flowChartConnector">
@@ -21718,7 +21721,7 @@
         </p:nvSpPr>
         <p:spPr>
           <a:xfrm>
-            <a:off x="4661133" y="3159000"/>
+            <a:off x="6185133" y="3159000"/>
             <a:ext cx="540000" cy="540000"/>
           </a:xfrm>
           <a:prstGeom prst="flowChartConnector">
@@ -21764,7 +21767,7 @@
         </p:nvSpPr>
         <p:spPr>
           <a:xfrm>
-            <a:off x="5292080" y="3159000"/>
+            <a:off x="6816080" y="3159000"/>
             <a:ext cx="540000" cy="540000"/>
           </a:xfrm>
           <a:prstGeom prst="flowChartConnector">
@@ -21810,7 +21813,7 @@
         </p:nvSpPr>
         <p:spPr>
           <a:xfrm>
-            <a:off x="3399239" y="1807454"/>
+            <a:off x="4923239" y="1807454"/>
             <a:ext cx="540000" cy="540000"/>
           </a:xfrm>
           <a:prstGeom prst="flowChartConnector">
@@ -21862,7 +21865,7 @@
         </p:nvSpPr>
         <p:spPr>
           <a:xfrm>
-            <a:off x="2768292" y="1807454"/>
+            <a:off x="4292292" y="1807454"/>
             <a:ext cx="540000" cy="540000"/>
           </a:xfrm>
           <a:prstGeom prst="flowChartConnector">
@@ -21914,7 +21917,7 @@
         </p:nvSpPr>
         <p:spPr>
           <a:xfrm>
-            <a:off x="4030186" y="1807454"/>
+            <a:off x="5554186" y="1807454"/>
             <a:ext cx="540000" cy="540000"/>
           </a:xfrm>
           <a:prstGeom prst="flowChartConnector">
@@ -21966,7 +21969,7 @@
         </p:nvSpPr>
         <p:spPr>
           <a:xfrm>
-            <a:off x="6013973" y="1807454"/>
+            <a:off x="7537973" y="1807454"/>
             <a:ext cx="540000" cy="540000"/>
           </a:xfrm>
           <a:prstGeom prst="flowChartConnector">
@@ -22018,7 +22021,7 @@
         </p:nvSpPr>
         <p:spPr>
           <a:xfrm>
-            <a:off x="4662498" y="1807463"/>
+            <a:off x="6186499" y="1807464"/>
             <a:ext cx="1259181" cy="539999"/>
           </a:xfrm>
           <a:prstGeom prst="roundRect">
@@ -22078,7 +22081,7 @@
         </p:nvCxnSpPr>
         <p:spPr>
           <a:xfrm flipH="1" flipV="1">
-            <a:off x="3038301" y="2347454"/>
+            <a:off x="4562302" y="2347454"/>
             <a:ext cx="630947" cy="811546"/>
           </a:xfrm>
           <a:prstGeom prst="line">
@@ -22118,7 +22121,7 @@
         </p:nvCxnSpPr>
         <p:spPr>
           <a:xfrm flipH="1" flipV="1">
-            <a:off x="3038292" y="2347454"/>
+            <a:off x="4562292" y="2347454"/>
             <a:ext cx="1261894" cy="811546"/>
           </a:xfrm>
           <a:prstGeom prst="line">
@@ -22158,7 +22161,7 @@
         </p:nvCxnSpPr>
         <p:spPr>
           <a:xfrm flipH="1" flipV="1">
-            <a:off x="3038301" y="2347454"/>
+            <a:off x="4562302" y="2347454"/>
             <a:ext cx="1892841" cy="811546"/>
           </a:xfrm>
           <a:prstGeom prst="line">
@@ -22198,7 +22201,7 @@
         </p:nvCxnSpPr>
         <p:spPr>
           <a:xfrm flipH="1" flipV="1">
-            <a:off x="3038292" y="2347454"/>
+            <a:off x="4562292" y="2347454"/>
             <a:ext cx="2523788" cy="811546"/>
           </a:xfrm>
           <a:prstGeom prst="line">
@@ -22238,7 +22241,7 @@
         </p:nvCxnSpPr>
         <p:spPr>
           <a:xfrm flipV="1">
-            <a:off x="3669239" y="2347454"/>
+            <a:off x="5193239" y="2347454"/>
             <a:ext cx="0" cy="811546"/>
           </a:xfrm>
           <a:prstGeom prst="line">
@@ -22278,7 +22281,7 @@
         </p:nvCxnSpPr>
         <p:spPr>
           <a:xfrm flipH="1" flipV="1">
-            <a:off x="3669248" y="2347454"/>
+            <a:off x="5193249" y="2347454"/>
             <a:ext cx="630947" cy="811546"/>
           </a:xfrm>
           <a:prstGeom prst="line">
@@ -22318,7 +22321,7 @@
         </p:nvCxnSpPr>
         <p:spPr>
           <a:xfrm flipH="1" flipV="1">
-            <a:off x="3669239" y="2347454"/>
+            <a:off x="5193239" y="2347454"/>
             <a:ext cx="1261894" cy="811546"/>
           </a:xfrm>
           <a:prstGeom prst="line">
@@ -22358,7 +22361,7 @@
         </p:nvCxnSpPr>
         <p:spPr>
           <a:xfrm flipH="1" flipV="1">
-            <a:off x="3669248" y="2347454"/>
+            <a:off x="5193249" y="2347454"/>
             <a:ext cx="1892841" cy="811546"/>
           </a:xfrm>
           <a:prstGeom prst="line">
@@ -22398,7 +22401,7 @@
         </p:nvCxnSpPr>
         <p:spPr>
           <a:xfrm flipV="1">
-            <a:off x="3669248" y="2347454"/>
+            <a:off x="5193249" y="2347454"/>
             <a:ext cx="630947" cy="811546"/>
           </a:xfrm>
           <a:prstGeom prst="line">
@@ -22438,7 +22441,7 @@
         </p:nvCxnSpPr>
         <p:spPr>
           <a:xfrm flipV="1">
-            <a:off x="4300186" y="2347454"/>
+            <a:off x="5824186" y="2347454"/>
             <a:ext cx="0" cy="811546"/>
           </a:xfrm>
           <a:prstGeom prst="line">
@@ -22478,7 +22481,7 @@
         </p:nvCxnSpPr>
         <p:spPr>
           <a:xfrm flipH="1" flipV="1">
-            <a:off x="4300195" y="2347454"/>
+            <a:off x="5824196" y="2347454"/>
             <a:ext cx="630947" cy="811546"/>
           </a:xfrm>
           <a:prstGeom prst="line">
@@ -22518,7 +22521,7 @@
         </p:nvCxnSpPr>
         <p:spPr>
           <a:xfrm flipH="1" flipV="1">
-            <a:off x="4300186" y="2347454"/>
+            <a:off x="5824186" y="2347454"/>
             <a:ext cx="1261894" cy="811546"/>
           </a:xfrm>
           <a:prstGeom prst="line">
@@ -22558,7 +22561,7 @@
         </p:nvCxnSpPr>
         <p:spPr>
           <a:xfrm flipV="1">
-            <a:off x="3669239" y="2347454"/>
+            <a:off x="5193239" y="2347454"/>
             <a:ext cx="2614734" cy="811546"/>
           </a:xfrm>
           <a:prstGeom prst="line">
@@ -22598,7 +22601,7 @@
         </p:nvCxnSpPr>
         <p:spPr>
           <a:xfrm flipV="1">
-            <a:off x="4300195" y="2347454"/>
+            <a:off x="5824196" y="2347454"/>
             <a:ext cx="1983787" cy="811546"/>
           </a:xfrm>
           <a:prstGeom prst="line">
@@ -22638,7 +22641,7 @@
         </p:nvCxnSpPr>
         <p:spPr>
           <a:xfrm flipV="1">
-            <a:off x="4931133" y="2347454"/>
+            <a:off x="6455133" y="2347454"/>
             <a:ext cx="1352840" cy="811546"/>
           </a:xfrm>
           <a:prstGeom prst="line">
@@ -22678,7 +22681,7 @@
         </p:nvCxnSpPr>
         <p:spPr>
           <a:xfrm flipV="1">
-            <a:off x="5562089" y="2347454"/>
+            <a:off x="7086090" y="2347454"/>
             <a:ext cx="721893" cy="811546"/>
           </a:xfrm>
           <a:prstGeom prst="line">
@@ -22718,7 +22721,7 @@
         </p:nvCxnSpPr>
         <p:spPr>
           <a:xfrm flipH="1">
-            <a:off x="3038301" y="3699000"/>
+            <a:off x="4562302" y="3699000"/>
             <a:ext cx="630947" cy="811546"/>
           </a:xfrm>
           <a:prstGeom prst="line">
@@ -22758,7 +22761,7 @@
         </p:nvCxnSpPr>
         <p:spPr>
           <a:xfrm flipH="1">
-            <a:off x="3038292" y="3699000"/>
+            <a:off x="4562292" y="3699000"/>
             <a:ext cx="1261894" cy="811546"/>
           </a:xfrm>
           <a:prstGeom prst="line">
@@ -22798,7 +22801,7 @@
         </p:nvCxnSpPr>
         <p:spPr>
           <a:xfrm flipH="1">
-            <a:off x="3038301" y="3699000"/>
+            <a:off x="4562302" y="3699000"/>
             <a:ext cx="1892841" cy="811546"/>
           </a:xfrm>
           <a:prstGeom prst="line">
@@ -22838,7 +22841,7 @@
         </p:nvCxnSpPr>
         <p:spPr>
           <a:xfrm flipH="1">
-            <a:off x="3038292" y="3699000"/>
+            <a:off x="4562292" y="3699000"/>
             <a:ext cx="2523788" cy="811546"/>
           </a:xfrm>
           <a:prstGeom prst="line">
@@ -22878,7 +22881,7 @@
         </p:nvCxnSpPr>
         <p:spPr>
           <a:xfrm>
-            <a:off x="3669239" y="3699000"/>
+            <a:off x="5193239" y="3699000"/>
             <a:ext cx="0" cy="811546"/>
           </a:xfrm>
           <a:prstGeom prst="line">
@@ -22918,7 +22921,7 @@
         </p:nvCxnSpPr>
         <p:spPr>
           <a:xfrm flipH="1">
-            <a:off x="3669239" y="3699000"/>
+            <a:off x="5193239" y="3699000"/>
             <a:ext cx="1261894" cy="811546"/>
           </a:xfrm>
           <a:prstGeom prst="line">
@@ -22958,7 +22961,7 @@
         </p:nvCxnSpPr>
         <p:spPr>
           <a:xfrm flipH="1">
-            <a:off x="3669248" y="3699000"/>
+            <a:off x="5193249" y="3699000"/>
             <a:ext cx="630947" cy="811546"/>
           </a:xfrm>
           <a:prstGeom prst="line">
@@ -22998,7 +23001,7 @@
         </p:nvCxnSpPr>
         <p:spPr>
           <a:xfrm flipH="1">
-            <a:off x="3669248" y="3699000"/>
+            <a:off x="5193249" y="3699000"/>
             <a:ext cx="1892841" cy="811546"/>
           </a:xfrm>
           <a:prstGeom prst="line">
@@ -23038,7 +23041,7 @@
         </p:nvCxnSpPr>
         <p:spPr>
           <a:xfrm>
-            <a:off x="3669248" y="3699000"/>
+            <a:off x="5193249" y="3699000"/>
             <a:ext cx="630947" cy="811546"/>
           </a:xfrm>
           <a:prstGeom prst="line">
@@ -23078,7 +23081,7 @@
         </p:nvCxnSpPr>
         <p:spPr>
           <a:xfrm>
-            <a:off x="4300186" y="3699000"/>
+            <a:off x="5824186" y="3699000"/>
             <a:ext cx="0" cy="811546"/>
           </a:xfrm>
           <a:prstGeom prst="line">
@@ -23118,7 +23121,7 @@
         </p:nvCxnSpPr>
         <p:spPr>
           <a:xfrm flipH="1">
-            <a:off x="4300195" y="3699000"/>
+            <a:off x="5824196" y="3699000"/>
             <a:ext cx="630947" cy="811546"/>
           </a:xfrm>
           <a:prstGeom prst="line">
@@ -23158,7 +23161,7 @@
         </p:nvCxnSpPr>
         <p:spPr>
           <a:xfrm flipH="1">
-            <a:off x="4300186" y="3699000"/>
+            <a:off x="5824186" y="3699000"/>
             <a:ext cx="1261894" cy="811546"/>
           </a:xfrm>
           <a:prstGeom prst="line">
@@ -23198,7 +23201,7 @@
         </p:nvCxnSpPr>
         <p:spPr>
           <a:xfrm flipH="1" flipV="1">
-            <a:off x="3669239" y="3699000"/>
+            <a:off x="5193239" y="3699000"/>
             <a:ext cx="2614734" cy="811546"/>
           </a:xfrm>
           <a:prstGeom prst="line">
@@ -23238,7 +23241,7 @@
         </p:nvCxnSpPr>
         <p:spPr>
           <a:xfrm flipH="1" flipV="1">
-            <a:off x="4300195" y="3699000"/>
+            <a:off x="5824196" y="3699000"/>
             <a:ext cx="1983787" cy="811546"/>
           </a:xfrm>
           <a:prstGeom prst="line">
@@ -23278,7 +23281,7 @@
         </p:nvCxnSpPr>
         <p:spPr>
           <a:xfrm flipH="1" flipV="1">
-            <a:off x="4931133" y="3699000"/>
+            <a:off x="6455133" y="3699000"/>
             <a:ext cx="1352840" cy="811546"/>
           </a:xfrm>
           <a:prstGeom prst="line">
@@ -23318,7 +23321,7 @@
         </p:nvCxnSpPr>
         <p:spPr>
           <a:xfrm flipH="1" flipV="1">
-            <a:off x="5562089" y="3699000"/>
+            <a:off x="7086090" y="3699000"/>
             <a:ext cx="721893" cy="811546"/>
           </a:xfrm>
           <a:prstGeom prst="line">
@@ -23354,7 +23357,7 @@
         </p:nvSpPr>
         <p:spPr>
           <a:xfrm>
-            <a:off x="4030185" y="5419517"/>
+            <a:off x="5554186" y="5419518"/>
             <a:ext cx="1170947" cy="442575"/>
           </a:xfrm>
           <a:prstGeom prst="rect">
@@ -23410,7 +23413,7 @@
         </p:nvSpPr>
         <p:spPr>
           <a:xfrm>
-            <a:off x="4030186" y="995424"/>
+            <a:off x="5554187" y="995425"/>
             <a:ext cx="1170947" cy="442575"/>
           </a:xfrm>
           <a:prstGeom prst="rect">
@@ -23466,7 +23469,7 @@
         </p:nvSpPr>
         <p:spPr>
           <a:xfrm>
-            <a:off x="858355" y="4365047"/>
+            <a:off x="2382355" y="4365048"/>
             <a:ext cx="1547634" cy="830997"/>
           </a:xfrm>
           <a:prstGeom prst="rect">
@@ -23502,7 +23505,7 @@
         </p:nvSpPr>
         <p:spPr>
           <a:xfrm>
-            <a:off x="859702" y="3259723"/>
+            <a:off x="2383702" y="3259723"/>
             <a:ext cx="1547634" cy="338554"/>
           </a:xfrm>
           <a:prstGeom prst="rect">
@@ -23538,7 +23541,7 @@
         </p:nvSpPr>
         <p:spPr>
           <a:xfrm>
-            <a:off x="858355" y="1785066"/>
+            <a:off x="2382355" y="1785067"/>
             <a:ext cx="1547634" cy="584775"/>
           </a:xfrm>
           <a:prstGeom prst="rect">
@@ -23564,6 +23567,546 @@
     <p:extLst>
       <p:ext uri="{BB962C8B-B14F-4D97-AF65-F5344CB8AC3E}">
         <p14:creationId xmlns:p14="http://schemas.microsoft.com/office/powerpoint/2010/main" val="3230882003"/>
+      </p:ext>
+    </p:extLst>
+  </p:cSld>
+  <p:clrMapOvr>
+    <a:masterClrMapping/>
+  </p:clrMapOvr>
+</p:sld>
+</file>
+
+<file path=ppt/slides/slide8.xml><?xml version="1.0" encoding="utf-8"?>
+<p:sld xmlns:a="http://schemas.openxmlformats.org/drawingml/2006/main" xmlns:r="http://schemas.openxmlformats.org/officeDocument/2006/relationships" xmlns:p="http://schemas.openxmlformats.org/presentationml/2006/main">
+  <p:cSld>
+    <p:spTree>
+      <p:nvGrpSpPr>
+        <p:cNvPr id="1" name=""/>
+        <p:cNvGrpSpPr/>
+        <p:nvPr/>
+      </p:nvGrpSpPr>
+      <p:grpSpPr>
+        <a:xfrm>
+          <a:off x="0" y="0"/>
+          <a:ext cx="0" cy="0"/>
+          <a:chOff x="0" y="0"/>
+          <a:chExt cx="0" cy="0"/>
+        </a:xfrm>
+      </p:grpSpPr>
+      <p:pic>
+        <p:nvPicPr>
+          <p:cNvPr id="5" name="Graphic 4" descr="Male profile">
+            <a:extLst>
+              <a:ext uri="{FF2B5EF4-FFF2-40B4-BE49-F238E27FC236}">
+                <a16:creationId xmlns:a16="http://schemas.microsoft.com/office/drawing/2014/main" id="{7DF62D3E-F55D-4A96-94B6-90944A680CBD}"/>
+              </a:ext>
+            </a:extLst>
+          </p:cNvPr>
+          <p:cNvPicPr>
+            <a:picLocks noChangeAspect="1"/>
+          </p:cNvPicPr>
+          <p:nvPr/>
+        </p:nvPicPr>
+        <p:blipFill>
+          <a:blip r:embed="rId2">
+            <a:extLst>
+              <a:ext uri="{28A0092B-C50C-407E-A947-70E740481C1C}">
+                <a14:useLocalDpi xmlns:a14="http://schemas.microsoft.com/office/drawing/2010/main" val="0"/>
+              </a:ext>
+              <a:ext uri="{96DAC541-7B7A-43D3-8B79-37D633B846F1}">
+                <asvg:svgBlip xmlns:asvg="http://schemas.microsoft.com/office/drawing/2016/SVG/main" r:embed="rId3"/>
+              </a:ext>
+            </a:extLst>
+          </a:blip>
+          <a:stretch>
+            <a:fillRect/>
+          </a:stretch>
+        </p:blipFill>
+        <p:spPr>
+          <a:xfrm>
+            <a:off x="2207567" y="82080"/>
+            <a:ext cx="2016224" cy="2016224"/>
+          </a:xfrm>
+          <a:prstGeom prst="rect">
+            <a:avLst/>
+          </a:prstGeom>
+        </p:spPr>
+      </p:pic>
+      <p:pic>
+        <p:nvPicPr>
+          <p:cNvPr id="7" name="Graphic 6" descr="Female Profile">
+            <a:extLst>
+              <a:ext uri="{FF2B5EF4-FFF2-40B4-BE49-F238E27FC236}">
+                <a16:creationId xmlns:a16="http://schemas.microsoft.com/office/drawing/2014/main" id="{B2CE4A65-2601-4B0E-A0E2-53ECF9558681}"/>
+              </a:ext>
+            </a:extLst>
+          </p:cNvPr>
+          <p:cNvPicPr>
+            <a:picLocks noChangeAspect="1"/>
+          </p:cNvPicPr>
+          <p:nvPr/>
+        </p:nvPicPr>
+        <p:blipFill>
+          <a:blip r:embed="rId4">
+            <a:extLst>
+              <a:ext uri="{28A0092B-C50C-407E-A947-70E740481C1C}">
+                <a14:useLocalDpi xmlns:a14="http://schemas.microsoft.com/office/drawing/2010/main" val="0"/>
+              </a:ext>
+              <a:ext uri="{96DAC541-7B7A-43D3-8B79-37D633B846F1}">
+                <asvg:svgBlip xmlns:asvg="http://schemas.microsoft.com/office/drawing/2016/SVG/main" r:embed="rId5"/>
+              </a:ext>
+            </a:extLst>
+          </a:blip>
+          <a:stretch>
+            <a:fillRect/>
+          </a:stretch>
+        </p:blipFill>
+        <p:spPr>
+          <a:xfrm>
+            <a:off x="2207567" y="3251885"/>
+            <a:ext cx="2016224" cy="2016224"/>
+          </a:xfrm>
+          <a:prstGeom prst="rect">
+            <a:avLst/>
+          </a:prstGeom>
+        </p:spPr>
+      </p:pic>
+      <p:sp>
+        <p:nvSpPr>
+          <p:cNvPr id="59" name="TextBox 58">
+            <a:extLst>
+              <a:ext uri="{FF2B5EF4-FFF2-40B4-BE49-F238E27FC236}">
+                <a16:creationId xmlns:a16="http://schemas.microsoft.com/office/drawing/2014/main" id="{D8384758-BD92-4FDA-A4FC-6B0A2CFC2075}"/>
+              </a:ext>
+            </a:extLst>
+          </p:cNvPr>
+          <p:cNvSpPr txBox="1"/>
+          <p:nvPr/>
+        </p:nvSpPr>
+        <p:spPr>
+          <a:xfrm>
+            <a:off x="2298062" y="1844824"/>
+            <a:ext cx="1827071" cy="1200329"/>
+          </a:xfrm>
+          <a:prstGeom prst="rect">
+            <a:avLst/>
+          </a:prstGeom>
+          <a:noFill/>
+        </p:spPr>
+        <p:txBody>
+          <a:bodyPr wrap="square" rtlCol="0">
+            <a:spAutoFit/>
+          </a:bodyPr>
+          <a:lstStyle/>
+          <a:p>
+            <a:pPr algn="ctr"/>
+            <a:r>
+              <a:rPr lang="en-NZ" b="1" dirty="0"/>
+              <a:t>User A:</a:t>
+            </a:r>
+          </a:p>
+          <a:p>
+            <a:pPr algn="ctr"/>
+            <a:r>
+              <a:rPr lang="en-NZ" dirty="0">
+                <a:solidFill>
+                  <a:schemeClr val="accent6">
+                    <a:lumMod val="75000"/>
+                  </a:schemeClr>
+                </a:solidFill>
+              </a:rPr>
+              <a:t>+ Likes comedy </a:t>
+            </a:r>
+          </a:p>
+          <a:p>
+            <a:pPr algn="ctr"/>
+            <a:r>
+              <a:rPr lang="en-NZ" dirty="0">
+                <a:solidFill>
+                  <a:schemeClr val="accent6">
+                    <a:lumMod val="75000"/>
+                  </a:schemeClr>
+                </a:solidFill>
+              </a:rPr>
+              <a:t>+ Likes animation</a:t>
+            </a:r>
+          </a:p>
+          <a:p>
+            <a:pPr algn="ctr"/>
+            <a:r>
+              <a:rPr lang="en-NZ" dirty="0">
+                <a:solidFill>
+                  <a:srgbClr val="C00000"/>
+                </a:solidFill>
+              </a:rPr>
+              <a:t>- Dislikes horror</a:t>
+            </a:r>
+          </a:p>
+        </p:txBody>
+      </p:sp>
+      <p:sp>
+        <p:nvSpPr>
+          <p:cNvPr id="60" name="TextBox 59">
+            <a:extLst>
+              <a:ext uri="{FF2B5EF4-FFF2-40B4-BE49-F238E27FC236}">
+                <a16:creationId xmlns:a16="http://schemas.microsoft.com/office/drawing/2014/main" id="{49D73F56-F6E2-444E-AEED-0E9F779E1040}"/>
+              </a:ext>
+            </a:extLst>
+          </p:cNvPr>
+          <p:cNvSpPr txBox="1"/>
+          <p:nvPr/>
+        </p:nvSpPr>
+        <p:spPr>
+          <a:xfrm>
+            <a:off x="2207564" y="4971750"/>
+            <a:ext cx="2016223" cy="1200329"/>
+          </a:xfrm>
+          <a:prstGeom prst="rect">
+            <a:avLst/>
+          </a:prstGeom>
+          <a:noFill/>
+        </p:spPr>
+        <p:txBody>
+          <a:bodyPr wrap="square" rtlCol="0">
+            <a:spAutoFit/>
+          </a:bodyPr>
+          <a:lstStyle/>
+          <a:p>
+            <a:pPr algn="ctr"/>
+            <a:r>
+              <a:rPr lang="en-NZ" b="1" dirty="0"/>
+              <a:t>User B:</a:t>
+            </a:r>
+          </a:p>
+          <a:p>
+            <a:pPr algn="ctr"/>
+            <a:r>
+              <a:rPr lang="en-NZ" dirty="0">
+                <a:solidFill>
+                  <a:schemeClr val="accent6">
+                    <a:lumMod val="75000"/>
+                  </a:schemeClr>
+                </a:solidFill>
+              </a:rPr>
+              <a:t>+ Likes comedy</a:t>
+            </a:r>
+          </a:p>
+          <a:p>
+            <a:pPr algn="ctr"/>
+            <a:r>
+              <a:rPr lang="en-NZ" dirty="0">
+                <a:solidFill>
+                  <a:schemeClr val="accent6">
+                    <a:lumMod val="75000"/>
+                  </a:schemeClr>
+                </a:solidFill>
+              </a:rPr>
+              <a:t>+ Likes horror</a:t>
+            </a:r>
+          </a:p>
+          <a:p>
+            <a:pPr algn="ctr"/>
+            <a:r>
+              <a:rPr lang="en-NZ" dirty="0">
+                <a:solidFill>
+                  <a:srgbClr val="C00000"/>
+                </a:solidFill>
+              </a:rPr>
+              <a:t>- Dislikes animation</a:t>
+            </a:r>
+          </a:p>
+        </p:txBody>
+      </p:sp>
+      <p:pic>
+        <p:nvPicPr>
+          <p:cNvPr id="9" name="Graphic 8" descr="Clapper board">
+            <a:extLst>
+              <a:ext uri="{FF2B5EF4-FFF2-40B4-BE49-F238E27FC236}">
+                <a16:creationId xmlns:a16="http://schemas.microsoft.com/office/drawing/2014/main" id="{EB6E77E2-C130-4073-81CD-7AB34B57CADA}"/>
+              </a:ext>
+            </a:extLst>
+          </p:cNvPr>
+          <p:cNvPicPr>
+            <a:picLocks noChangeAspect="1"/>
+          </p:cNvPicPr>
+          <p:nvPr/>
+        </p:nvPicPr>
+        <p:blipFill>
+          <a:blip r:embed="rId6">
+            <a:extLst>
+              <a:ext uri="{28A0092B-C50C-407E-A947-70E740481C1C}">
+                <a14:useLocalDpi xmlns:a14="http://schemas.microsoft.com/office/drawing/2010/main" val="0"/>
+              </a:ext>
+              <a:ext uri="{96DAC541-7B7A-43D3-8B79-37D633B846F1}">
+                <asvg:svgBlip xmlns:asvg="http://schemas.microsoft.com/office/drawing/2016/SVG/main" r:embed="rId7"/>
+              </a:ext>
+            </a:extLst>
+          </a:blip>
+          <a:stretch>
+            <a:fillRect/>
+          </a:stretch>
+        </p:blipFill>
+        <p:spPr>
+          <a:xfrm>
+            <a:off x="7968210" y="1268760"/>
+            <a:ext cx="1152128" cy="1152128"/>
+          </a:xfrm>
+          <a:prstGeom prst="rect">
+            <a:avLst/>
+          </a:prstGeom>
+        </p:spPr>
+      </p:pic>
+      <p:sp>
+        <p:nvSpPr>
+          <p:cNvPr id="63" name="TextBox 62">
+            <a:extLst>
+              <a:ext uri="{FF2B5EF4-FFF2-40B4-BE49-F238E27FC236}">
+                <a16:creationId xmlns:a16="http://schemas.microsoft.com/office/drawing/2014/main" id="{E555A035-9B2B-4198-B331-666ED677A8A6}"/>
+              </a:ext>
+            </a:extLst>
+          </p:cNvPr>
+          <p:cNvSpPr txBox="1"/>
+          <p:nvPr/>
+        </p:nvSpPr>
+        <p:spPr>
+          <a:xfrm>
+            <a:off x="7608168" y="2420888"/>
+            <a:ext cx="1781929" cy="923330"/>
+          </a:xfrm>
+          <a:prstGeom prst="rect">
+            <a:avLst/>
+          </a:prstGeom>
+          <a:noFill/>
+          <a:ln>
+            <a:noFill/>
+          </a:ln>
+        </p:spPr>
+        <p:txBody>
+          <a:bodyPr wrap="square" rtlCol="0">
+            <a:spAutoFit/>
+          </a:bodyPr>
+          <a:lstStyle/>
+          <a:p>
+            <a:pPr algn="ctr"/>
+            <a:r>
+              <a:rPr lang="en-NZ" b="1" dirty="0"/>
+              <a:t>Movie A:</a:t>
+            </a:r>
+          </a:p>
+          <a:p>
+            <a:pPr algn="ctr"/>
+            <a:r>
+              <a:rPr lang="en-NZ" dirty="0">
+                <a:solidFill>
+                  <a:schemeClr val="accent6">
+                    <a:lumMod val="75000"/>
+                  </a:schemeClr>
+                </a:solidFill>
+              </a:rPr>
+              <a:t>+ Liked by user A</a:t>
+            </a:r>
+          </a:p>
+          <a:p>
+            <a:pPr algn="ctr"/>
+            <a:r>
+              <a:rPr lang="en-NZ" dirty="0">
+                <a:solidFill>
+                  <a:schemeClr val="accent6">
+                    <a:lumMod val="75000"/>
+                  </a:schemeClr>
+                </a:solidFill>
+              </a:rPr>
+              <a:t>+ Liked by user B</a:t>
+            </a:r>
+          </a:p>
+        </p:txBody>
+      </p:sp>
+      <p:cxnSp>
+        <p:nvCxnSpPr>
+          <p:cNvPr id="64" name="Straight Arrow Connector 63">
+            <a:extLst>
+              <a:ext uri="{FF2B5EF4-FFF2-40B4-BE49-F238E27FC236}">
+                <a16:creationId xmlns:a16="http://schemas.microsoft.com/office/drawing/2014/main" id="{F1F8D546-969D-43EE-B30F-B50E18E40B9A}"/>
+              </a:ext>
+            </a:extLst>
+          </p:cNvPr>
+          <p:cNvCxnSpPr>
+            <a:cxnSpLocks/>
+            <a:stCxn id="7" idx="3"/>
+          </p:cNvCxnSpPr>
+          <p:nvPr/>
+        </p:nvCxnSpPr>
+        <p:spPr>
+          <a:xfrm flipV="1">
+            <a:off x="4223791" y="2436714"/>
+            <a:ext cx="3312369" cy="1823283"/>
+          </a:xfrm>
+          <a:prstGeom prst="straightConnector1">
+            <a:avLst/>
+          </a:prstGeom>
+          <a:ln w="57150">
+            <a:solidFill>
+              <a:schemeClr val="accent6">
+                <a:lumMod val="75000"/>
+              </a:schemeClr>
+            </a:solidFill>
+            <a:tailEnd type="triangle"/>
+          </a:ln>
+        </p:spPr>
+        <p:style>
+          <a:lnRef idx="1">
+            <a:schemeClr val="accent1"/>
+          </a:lnRef>
+          <a:fillRef idx="0">
+            <a:schemeClr val="accent1"/>
+          </a:fillRef>
+          <a:effectRef idx="0">
+            <a:schemeClr val="accent1"/>
+          </a:effectRef>
+          <a:fontRef idx="minor">
+            <a:schemeClr val="tx1"/>
+          </a:fontRef>
+        </p:style>
+      </p:cxnSp>
+      <p:cxnSp>
+        <p:nvCxnSpPr>
+          <p:cNvPr id="67" name="Straight Arrow Connector 66">
+            <a:extLst>
+              <a:ext uri="{FF2B5EF4-FFF2-40B4-BE49-F238E27FC236}">
+                <a16:creationId xmlns:a16="http://schemas.microsoft.com/office/drawing/2014/main" id="{26167FF4-FB1C-4334-9325-4102590B1E17}"/>
+              </a:ext>
+            </a:extLst>
+          </p:cNvPr>
+          <p:cNvCxnSpPr>
+            <a:cxnSpLocks/>
+            <a:stCxn id="5" idx="3"/>
+          </p:cNvCxnSpPr>
+          <p:nvPr/>
+        </p:nvCxnSpPr>
+        <p:spPr>
+          <a:xfrm>
+            <a:off x="4223791" y="1090192"/>
+            <a:ext cx="3384376" cy="663391"/>
+          </a:xfrm>
+          <a:prstGeom prst="straightConnector1">
+            <a:avLst/>
+          </a:prstGeom>
+          <a:ln w="57150">
+            <a:solidFill>
+              <a:schemeClr val="accent6">
+                <a:lumMod val="75000"/>
+              </a:schemeClr>
+            </a:solidFill>
+            <a:tailEnd type="triangle"/>
+          </a:ln>
+        </p:spPr>
+        <p:style>
+          <a:lnRef idx="1">
+            <a:schemeClr val="accent1"/>
+          </a:lnRef>
+          <a:fillRef idx="0">
+            <a:schemeClr val="accent1"/>
+          </a:fillRef>
+          <a:effectRef idx="0">
+            <a:schemeClr val="accent1"/>
+          </a:effectRef>
+          <a:fontRef idx="minor">
+            <a:schemeClr val="tx1"/>
+          </a:fontRef>
+        </p:style>
+      </p:cxnSp>
+      <p:cxnSp>
+        <p:nvCxnSpPr>
+          <p:cNvPr id="70" name="Straight Arrow Connector 69">
+            <a:extLst>
+              <a:ext uri="{FF2B5EF4-FFF2-40B4-BE49-F238E27FC236}">
+                <a16:creationId xmlns:a16="http://schemas.microsoft.com/office/drawing/2014/main" id="{63D95D20-A6F2-49BD-9F6F-C964A130717F}"/>
+              </a:ext>
+            </a:extLst>
+          </p:cNvPr>
+          <p:cNvCxnSpPr>
+            <a:cxnSpLocks/>
+          </p:cNvCxnSpPr>
+          <p:nvPr/>
+        </p:nvCxnSpPr>
+        <p:spPr>
+          <a:xfrm>
+            <a:off x="8544274" y="3429000"/>
+            <a:ext cx="0" cy="1164902"/>
+          </a:xfrm>
+          <a:prstGeom prst="straightConnector1">
+            <a:avLst/>
+          </a:prstGeom>
+          <a:ln w="57150">
+            <a:solidFill>
+              <a:schemeClr val="tx1">
+                <a:lumMod val="95000"/>
+                <a:lumOff val="5000"/>
+              </a:schemeClr>
+            </a:solidFill>
+            <a:tailEnd type="triangle"/>
+          </a:ln>
+        </p:spPr>
+        <p:style>
+          <a:lnRef idx="1">
+            <a:schemeClr val="accent1"/>
+          </a:lnRef>
+          <a:fillRef idx="0">
+            <a:schemeClr val="accent1"/>
+          </a:fillRef>
+          <a:effectRef idx="0">
+            <a:schemeClr val="accent1"/>
+          </a:effectRef>
+          <a:fontRef idx="minor">
+            <a:schemeClr val="tx1"/>
+          </a:fontRef>
+        </p:style>
+      </p:cxnSp>
+      <p:sp>
+        <p:nvSpPr>
+          <p:cNvPr id="75" name="TextBox 74">
+            <a:extLst>
+              <a:ext uri="{FF2B5EF4-FFF2-40B4-BE49-F238E27FC236}">
+                <a16:creationId xmlns:a16="http://schemas.microsoft.com/office/drawing/2014/main" id="{AA4F63A5-8D10-49A4-82E2-06C96763F2F0}"/>
+              </a:ext>
+            </a:extLst>
+          </p:cNvPr>
+          <p:cNvSpPr txBox="1"/>
+          <p:nvPr/>
+        </p:nvSpPr>
+        <p:spPr>
+          <a:xfrm>
+            <a:off x="7653309" y="4678684"/>
+            <a:ext cx="1781929" cy="400110"/>
+          </a:xfrm>
+          <a:prstGeom prst="rect">
+            <a:avLst/>
+          </a:prstGeom>
+          <a:noFill/>
+        </p:spPr>
+        <p:txBody>
+          <a:bodyPr wrap="square" rtlCol="0">
+            <a:spAutoFit/>
+          </a:bodyPr>
+          <a:lstStyle/>
+          <a:p>
+            <a:pPr algn="ctr"/>
+            <a:r>
+              <a:rPr lang="en-NZ" sz="2000" b="1" dirty="0"/>
+              <a:t>Comedy</a:t>
+            </a:r>
+            <a:endParaRPr lang="en-NZ" sz="2000" dirty="0">
+              <a:solidFill>
+                <a:srgbClr val="C00000"/>
+              </a:solidFill>
+            </a:endParaRPr>
+          </a:p>
+        </p:txBody>
+      </p:sp>
+    </p:spTree>
+    <p:extLst>
+      <p:ext uri="{BB962C8B-B14F-4D97-AF65-F5344CB8AC3E}">
+        <p14:creationId xmlns:p14="http://schemas.microsoft.com/office/powerpoint/2010/main" val="765299857"/>
       </p:ext>
     </p:extLst>
   </p:cSld>

</xml_diff>

<commit_message>
added cross validation diagrams
</commit_message>
<xml_diff>
--- a/figures/drawing-board.pptx
+++ b/figures/drawing-board.pptx
@@ -13,6 +13,8 @@
     <p:sldId id="257" r:id="rId7"/>
     <p:sldId id="263" r:id="rId8"/>
     <p:sldId id="264" r:id="rId9"/>
+    <p:sldId id="265" r:id="rId10"/>
+    <p:sldId id="266" r:id="rId11"/>
   </p:sldIdLst>
   <p:sldSz cx="12192000" cy="6858000"/>
   <p:notesSz cx="6858000" cy="9144000"/>
@@ -261,7 +263,7 @@
           <a:p>
             <a:fld id="{7FCAF9BE-84FA-4DCA-8252-942D07F2383A}" type="datetimeFigureOut">
               <a:rPr lang="en-NZ" smtClean="0"/>
-              <a:t>23/09/2019</a:t>
+              <a:t>3/10/2019</a:t>
             </a:fld>
             <a:endParaRPr lang="en-NZ"/>
           </a:p>
@@ -431,7 +433,7 @@
           <a:p>
             <a:fld id="{7FCAF9BE-84FA-4DCA-8252-942D07F2383A}" type="datetimeFigureOut">
               <a:rPr lang="en-NZ" smtClean="0"/>
-              <a:t>23/09/2019</a:t>
+              <a:t>3/10/2019</a:t>
             </a:fld>
             <a:endParaRPr lang="en-NZ"/>
           </a:p>
@@ -611,7 +613,7 @@
           <a:p>
             <a:fld id="{7FCAF9BE-84FA-4DCA-8252-942D07F2383A}" type="datetimeFigureOut">
               <a:rPr lang="en-NZ" smtClean="0"/>
-              <a:t>23/09/2019</a:t>
+              <a:t>3/10/2019</a:t>
             </a:fld>
             <a:endParaRPr lang="en-NZ"/>
           </a:p>
@@ -781,7 +783,7 @@
           <a:p>
             <a:fld id="{7FCAF9BE-84FA-4DCA-8252-942D07F2383A}" type="datetimeFigureOut">
               <a:rPr lang="en-NZ" smtClean="0"/>
-              <a:t>23/09/2019</a:t>
+              <a:t>3/10/2019</a:t>
             </a:fld>
             <a:endParaRPr lang="en-NZ"/>
           </a:p>
@@ -1027,7 +1029,7 @@
           <a:p>
             <a:fld id="{7FCAF9BE-84FA-4DCA-8252-942D07F2383A}" type="datetimeFigureOut">
               <a:rPr lang="en-NZ" smtClean="0"/>
-              <a:t>23/09/2019</a:t>
+              <a:t>3/10/2019</a:t>
             </a:fld>
             <a:endParaRPr lang="en-NZ"/>
           </a:p>
@@ -1259,7 +1261,7 @@
           <a:p>
             <a:fld id="{7FCAF9BE-84FA-4DCA-8252-942D07F2383A}" type="datetimeFigureOut">
               <a:rPr lang="en-NZ" smtClean="0"/>
-              <a:t>23/09/2019</a:t>
+              <a:t>3/10/2019</a:t>
             </a:fld>
             <a:endParaRPr lang="en-NZ"/>
           </a:p>
@@ -1626,7 +1628,7 @@
           <a:p>
             <a:fld id="{7FCAF9BE-84FA-4DCA-8252-942D07F2383A}" type="datetimeFigureOut">
               <a:rPr lang="en-NZ" smtClean="0"/>
-              <a:t>23/09/2019</a:t>
+              <a:t>3/10/2019</a:t>
             </a:fld>
             <a:endParaRPr lang="en-NZ"/>
           </a:p>
@@ -1744,7 +1746,7 @@
           <a:p>
             <a:fld id="{7FCAF9BE-84FA-4DCA-8252-942D07F2383A}" type="datetimeFigureOut">
               <a:rPr lang="en-NZ" smtClean="0"/>
-              <a:t>23/09/2019</a:t>
+              <a:t>3/10/2019</a:t>
             </a:fld>
             <a:endParaRPr lang="en-NZ"/>
           </a:p>
@@ -1839,7 +1841,7 @@
           <a:p>
             <a:fld id="{7FCAF9BE-84FA-4DCA-8252-942D07F2383A}" type="datetimeFigureOut">
               <a:rPr lang="en-NZ" smtClean="0"/>
-              <a:t>23/09/2019</a:t>
+              <a:t>3/10/2019</a:t>
             </a:fld>
             <a:endParaRPr lang="en-NZ"/>
           </a:p>
@@ -2116,7 +2118,7 @@
           <a:p>
             <a:fld id="{7FCAF9BE-84FA-4DCA-8252-942D07F2383A}" type="datetimeFigureOut">
               <a:rPr lang="en-NZ" smtClean="0"/>
-              <a:t>23/09/2019</a:t>
+              <a:t>3/10/2019</a:t>
             </a:fld>
             <a:endParaRPr lang="en-NZ"/>
           </a:p>
@@ -2373,7 +2375,7 @@
           <a:p>
             <a:fld id="{7FCAF9BE-84FA-4DCA-8252-942D07F2383A}" type="datetimeFigureOut">
               <a:rPr lang="en-NZ" smtClean="0"/>
-              <a:t>23/09/2019</a:t>
+              <a:t>3/10/2019</a:t>
             </a:fld>
             <a:endParaRPr lang="en-NZ"/>
           </a:p>
@@ -2586,7 +2588,7 @@
           <a:p>
             <a:fld id="{7FCAF9BE-84FA-4DCA-8252-942D07F2383A}" type="datetimeFigureOut">
               <a:rPr lang="en-NZ" smtClean="0"/>
-              <a:t>23/09/2019</a:t>
+              <a:t>3/10/2019</a:t>
             </a:fld>
             <a:endParaRPr lang="en-NZ"/>
           </a:p>
@@ -6353,6 +6355,990 @@
     <p:extLst>
       <p:ext uri="{BB962C8B-B14F-4D97-AF65-F5344CB8AC3E}">
         <p14:creationId xmlns:p14="http://schemas.microsoft.com/office/powerpoint/2010/main" val="360633783"/>
+      </p:ext>
+    </p:extLst>
+  </p:cSld>
+  <p:clrMapOvr>
+    <a:masterClrMapping/>
+  </p:clrMapOvr>
+</p:sld>
+</file>
+
+<file path=ppt/slides/slide10.xml><?xml version="1.0" encoding="utf-8"?>
+<p:sld xmlns:a="http://schemas.openxmlformats.org/drawingml/2006/main" xmlns:r="http://schemas.openxmlformats.org/officeDocument/2006/relationships" xmlns:p="http://schemas.openxmlformats.org/presentationml/2006/main">
+  <p:cSld>
+    <p:spTree>
+      <p:nvGrpSpPr>
+        <p:cNvPr id="1" name=""/>
+        <p:cNvGrpSpPr/>
+        <p:nvPr/>
+      </p:nvGrpSpPr>
+      <p:grpSpPr>
+        <a:xfrm>
+          <a:off x="0" y="0"/>
+          <a:ext cx="0" cy="0"/>
+          <a:chOff x="0" y="0"/>
+          <a:chExt cx="0" cy="0"/>
+        </a:xfrm>
+      </p:grpSpPr>
+      <p:sp>
+        <p:nvSpPr>
+          <p:cNvPr id="5" name="Rectangle 4">
+            <a:extLst>
+              <a:ext uri="{FF2B5EF4-FFF2-40B4-BE49-F238E27FC236}">
+                <a16:creationId xmlns:a16="http://schemas.microsoft.com/office/drawing/2014/main" id="{9852D65D-5CED-45EF-846B-87148B475D28}"/>
+              </a:ext>
+            </a:extLst>
+          </p:cNvPr>
+          <p:cNvSpPr/>
+          <p:nvPr/>
+        </p:nvSpPr>
+        <p:spPr>
+          <a:xfrm>
+            <a:off x="620420" y="969292"/>
+            <a:ext cx="9000000" cy="576064"/>
+          </a:xfrm>
+          <a:prstGeom prst="rect">
+            <a:avLst/>
+          </a:prstGeom>
+          <a:noFill/>
+          <a:ln w="38100">
+            <a:solidFill>
+              <a:schemeClr val="tx1"/>
+            </a:solidFill>
+          </a:ln>
+        </p:spPr>
+        <p:style>
+          <a:lnRef idx="2">
+            <a:schemeClr val="accent1">
+              <a:shade val="50000"/>
+            </a:schemeClr>
+          </a:lnRef>
+          <a:fillRef idx="1">
+            <a:schemeClr val="accent1"/>
+          </a:fillRef>
+          <a:effectRef idx="0">
+            <a:schemeClr val="accent1"/>
+          </a:effectRef>
+          <a:fontRef idx="minor">
+            <a:schemeClr val="lt1"/>
+          </a:fontRef>
+        </p:style>
+        <p:txBody>
+          <a:bodyPr rtlCol="0" anchor="ctr"/>
+          <a:lstStyle/>
+          <a:p>
+            <a:pPr algn="ctr"/>
+            <a:endParaRPr lang="en-NZ"/>
+          </a:p>
+        </p:txBody>
+      </p:sp>
+      <p:sp>
+        <p:nvSpPr>
+          <p:cNvPr id="7" name="Rectangle 6">
+            <a:extLst>
+              <a:ext uri="{FF2B5EF4-FFF2-40B4-BE49-F238E27FC236}">
+                <a16:creationId xmlns:a16="http://schemas.microsoft.com/office/drawing/2014/main" id="{DA7274BB-2A40-4E68-A1AE-01A5956FFDD6}"/>
+              </a:ext>
+            </a:extLst>
+          </p:cNvPr>
+          <p:cNvSpPr/>
+          <p:nvPr/>
+        </p:nvSpPr>
+        <p:spPr>
+          <a:xfrm>
+            <a:off x="620419" y="2193428"/>
+            <a:ext cx="8100000" cy="576064"/>
+          </a:xfrm>
+          <a:prstGeom prst="rect">
+            <a:avLst/>
+          </a:prstGeom>
+          <a:solidFill>
+            <a:schemeClr val="accent6">
+              <a:lumMod val="40000"/>
+              <a:lumOff val="60000"/>
+            </a:schemeClr>
+          </a:solidFill>
+          <a:ln w="38100">
+            <a:solidFill>
+              <a:schemeClr val="accent6">
+                <a:lumMod val="75000"/>
+              </a:schemeClr>
+            </a:solidFill>
+          </a:ln>
+        </p:spPr>
+        <p:style>
+          <a:lnRef idx="2">
+            <a:schemeClr val="accent1">
+              <a:shade val="50000"/>
+            </a:schemeClr>
+          </a:lnRef>
+          <a:fillRef idx="1">
+            <a:schemeClr val="accent1"/>
+          </a:fillRef>
+          <a:effectRef idx="0">
+            <a:schemeClr val="accent1"/>
+          </a:effectRef>
+          <a:fontRef idx="minor">
+            <a:schemeClr val="lt1"/>
+          </a:fontRef>
+        </p:style>
+        <p:txBody>
+          <a:bodyPr rtlCol="0" anchor="ctr"/>
+          <a:lstStyle/>
+          <a:p>
+            <a:pPr algn="ctr"/>
+            <a:endParaRPr lang="en-NZ"/>
+          </a:p>
+        </p:txBody>
+      </p:sp>
+      <p:sp>
+        <p:nvSpPr>
+          <p:cNvPr id="11" name="Right Brace 10">
+            <a:extLst>
+              <a:ext uri="{FF2B5EF4-FFF2-40B4-BE49-F238E27FC236}">
+                <a16:creationId xmlns:a16="http://schemas.microsoft.com/office/drawing/2014/main" id="{38CA8665-2E42-417B-890E-AF80755A8BD0}"/>
+              </a:ext>
+            </a:extLst>
+          </p:cNvPr>
+          <p:cNvSpPr/>
+          <p:nvPr/>
+        </p:nvSpPr>
+        <p:spPr>
+          <a:xfrm rot="16200000">
+            <a:off x="4976403" y="-3747232"/>
+            <a:ext cx="288032" cy="8784977"/>
+          </a:xfrm>
+          <a:prstGeom prst="rightBrace">
+            <a:avLst/>
+          </a:prstGeom>
+          <a:ln>
+            <a:solidFill>
+              <a:schemeClr val="tx1">
+                <a:lumMod val="95000"/>
+                <a:lumOff val="5000"/>
+              </a:schemeClr>
+            </a:solidFill>
+          </a:ln>
+        </p:spPr>
+        <p:style>
+          <a:lnRef idx="1">
+            <a:schemeClr val="accent1"/>
+          </a:lnRef>
+          <a:fillRef idx="0">
+            <a:schemeClr val="accent1"/>
+          </a:fillRef>
+          <a:effectRef idx="0">
+            <a:schemeClr val="accent1"/>
+          </a:effectRef>
+          <a:fontRef idx="minor">
+            <a:schemeClr val="tx1"/>
+          </a:fontRef>
+        </p:style>
+        <p:txBody>
+          <a:bodyPr rtlCol="0" anchor="ctr"/>
+          <a:lstStyle/>
+          <a:p>
+            <a:pPr algn="ctr"/>
+            <a:endParaRPr lang="en-NZ"/>
+          </a:p>
+        </p:txBody>
+      </p:sp>
+      <p:sp>
+        <p:nvSpPr>
+          <p:cNvPr id="12" name="TextBox 11">
+            <a:extLst>
+              <a:ext uri="{FF2B5EF4-FFF2-40B4-BE49-F238E27FC236}">
+                <a16:creationId xmlns:a16="http://schemas.microsoft.com/office/drawing/2014/main" id="{8B10F358-C525-46C1-AAC9-CFAF03C514BE}"/>
+              </a:ext>
+            </a:extLst>
+          </p:cNvPr>
+          <p:cNvSpPr txBox="1"/>
+          <p:nvPr/>
+        </p:nvSpPr>
+        <p:spPr>
+          <a:xfrm>
+            <a:off x="4346602" y="116632"/>
+            <a:ext cx="1547634" cy="338554"/>
+          </a:xfrm>
+          <a:prstGeom prst="rect">
+            <a:avLst/>
+          </a:prstGeom>
+          <a:noFill/>
+        </p:spPr>
+        <p:txBody>
+          <a:bodyPr wrap="square" rtlCol="0">
+            <a:spAutoFit/>
+          </a:bodyPr>
+          <a:lstStyle/>
+          <a:p>
+            <a:pPr algn="ctr"/>
+            <a:r>
+              <a:rPr lang="en-NZ" sz="1600" dirty="0"/>
+              <a:t>Genre dataset</a:t>
+            </a:r>
+          </a:p>
+        </p:txBody>
+      </p:sp>
+      <p:sp>
+        <p:nvSpPr>
+          <p:cNvPr id="13" name="Rectangle 12">
+            <a:extLst>
+              <a:ext uri="{FF2B5EF4-FFF2-40B4-BE49-F238E27FC236}">
+                <a16:creationId xmlns:a16="http://schemas.microsoft.com/office/drawing/2014/main" id="{766D9B6A-E0BC-4AD2-8D07-AB6B2AE11C65}"/>
+              </a:ext>
+            </a:extLst>
+          </p:cNvPr>
+          <p:cNvSpPr/>
+          <p:nvPr/>
+        </p:nvSpPr>
+        <p:spPr>
+          <a:xfrm>
+            <a:off x="620420" y="2193428"/>
+            <a:ext cx="1620000" cy="576064"/>
+          </a:xfrm>
+          <a:prstGeom prst="rect">
+            <a:avLst/>
+          </a:prstGeom>
+          <a:solidFill>
+            <a:schemeClr val="accent2">
+              <a:lumMod val="40000"/>
+              <a:lumOff val="60000"/>
+            </a:schemeClr>
+          </a:solidFill>
+          <a:ln w="38100">
+            <a:solidFill>
+              <a:schemeClr val="accent2">
+                <a:lumMod val="75000"/>
+              </a:schemeClr>
+            </a:solidFill>
+          </a:ln>
+        </p:spPr>
+        <p:style>
+          <a:lnRef idx="2">
+            <a:schemeClr val="accent1">
+              <a:shade val="50000"/>
+            </a:schemeClr>
+          </a:lnRef>
+          <a:fillRef idx="1">
+            <a:schemeClr val="accent1"/>
+          </a:fillRef>
+          <a:effectRef idx="0">
+            <a:schemeClr val="accent1"/>
+          </a:effectRef>
+          <a:fontRef idx="minor">
+            <a:schemeClr val="lt1"/>
+          </a:fontRef>
+        </p:style>
+        <p:txBody>
+          <a:bodyPr rtlCol="0" anchor="ctr"/>
+          <a:lstStyle/>
+          <a:p>
+            <a:pPr algn="ctr"/>
+            <a:endParaRPr lang="en-NZ"/>
+          </a:p>
+        </p:txBody>
+      </p:sp>
+      <p:sp>
+        <p:nvSpPr>
+          <p:cNvPr id="14" name="Rectangle 13">
+            <a:extLst>
+              <a:ext uri="{FF2B5EF4-FFF2-40B4-BE49-F238E27FC236}">
+                <a16:creationId xmlns:a16="http://schemas.microsoft.com/office/drawing/2014/main" id="{B77EADB4-525E-43E2-BDE9-0EB110C7AFB8}"/>
+              </a:ext>
+            </a:extLst>
+          </p:cNvPr>
+          <p:cNvSpPr/>
+          <p:nvPr/>
+        </p:nvSpPr>
+        <p:spPr>
+          <a:xfrm>
+            <a:off x="620419" y="3105456"/>
+            <a:ext cx="8100000" cy="576064"/>
+          </a:xfrm>
+          <a:prstGeom prst="rect">
+            <a:avLst/>
+          </a:prstGeom>
+          <a:solidFill>
+            <a:schemeClr val="accent6">
+              <a:lumMod val="40000"/>
+              <a:lumOff val="60000"/>
+            </a:schemeClr>
+          </a:solidFill>
+          <a:ln w="38100">
+            <a:solidFill>
+              <a:schemeClr val="accent6">
+                <a:lumMod val="75000"/>
+              </a:schemeClr>
+            </a:solidFill>
+          </a:ln>
+        </p:spPr>
+        <p:style>
+          <a:lnRef idx="2">
+            <a:schemeClr val="accent1">
+              <a:shade val="50000"/>
+            </a:schemeClr>
+          </a:lnRef>
+          <a:fillRef idx="1">
+            <a:schemeClr val="accent1"/>
+          </a:fillRef>
+          <a:effectRef idx="0">
+            <a:schemeClr val="accent1"/>
+          </a:effectRef>
+          <a:fontRef idx="minor">
+            <a:schemeClr val="lt1"/>
+          </a:fontRef>
+        </p:style>
+        <p:txBody>
+          <a:bodyPr rtlCol="0" anchor="ctr"/>
+          <a:lstStyle/>
+          <a:p>
+            <a:pPr algn="ctr"/>
+            <a:endParaRPr lang="en-NZ" dirty="0"/>
+          </a:p>
+        </p:txBody>
+      </p:sp>
+      <p:sp>
+        <p:nvSpPr>
+          <p:cNvPr id="16" name="Rectangle 15">
+            <a:extLst>
+              <a:ext uri="{FF2B5EF4-FFF2-40B4-BE49-F238E27FC236}">
+                <a16:creationId xmlns:a16="http://schemas.microsoft.com/office/drawing/2014/main" id="{DF7DD2D0-0CFA-4F16-8315-BC7210C1375A}"/>
+              </a:ext>
+            </a:extLst>
+          </p:cNvPr>
+          <p:cNvSpPr/>
+          <p:nvPr/>
+        </p:nvSpPr>
+        <p:spPr>
+          <a:xfrm>
+            <a:off x="620419" y="4017484"/>
+            <a:ext cx="8100000" cy="576064"/>
+          </a:xfrm>
+          <a:prstGeom prst="rect">
+            <a:avLst/>
+          </a:prstGeom>
+          <a:solidFill>
+            <a:schemeClr val="accent6">
+              <a:lumMod val="40000"/>
+              <a:lumOff val="60000"/>
+            </a:schemeClr>
+          </a:solidFill>
+          <a:ln w="38100">
+            <a:solidFill>
+              <a:schemeClr val="accent6">
+                <a:lumMod val="75000"/>
+              </a:schemeClr>
+            </a:solidFill>
+          </a:ln>
+        </p:spPr>
+        <p:style>
+          <a:lnRef idx="2">
+            <a:schemeClr val="accent1">
+              <a:shade val="50000"/>
+            </a:schemeClr>
+          </a:lnRef>
+          <a:fillRef idx="1">
+            <a:schemeClr val="accent1"/>
+          </a:fillRef>
+          <a:effectRef idx="0">
+            <a:schemeClr val="accent1"/>
+          </a:effectRef>
+          <a:fontRef idx="minor">
+            <a:schemeClr val="lt1"/>
+          </a:fontRef>
+        </p:style>
+        <p:txBody>
+          <a:bodyPr rtlCol="0" anchor="ctr"/>
+          <a:lstStyle/>
+          <a:p>
+            <a:pPr algn="ctr"/>
+            <a:endParaRPr lang="en-NZ"/>
+          </a:p>
+        </p:txBody>
+      </p:sp>
+      <p:sp>
+        <p:nvSpPr>
+          <p:cNvPr id="17" name="Rectangle 16">
+            <a:extLst>
+              <a:ext uri="{FF2B5EF4-FFF2-40B4-BE49-F238E27FC236}">
+                <a16:creationId xmlns:a16="http://schemas.microsoft.com/office/drawing/2014/main" id="{EFAC7260-55AA-4F6B-8B7D-5C898910307D}"/>
+              </a:ext>
+            </a:extLst>
+          </p:cNvPr>
+          <p:cNvSpPr/>
+          <p:nvPr/>
+        </p:nvSpPr>
+        <p:spPr>
+          <a:xfrm>
+            <a:off x="620419" y="4929512"/>
+            <a:ext cx="8100000" cy="576064"/>
+          </a:xfrm>
+          <a:prstGeom prst="rect">
+            <a:avLst/>
+          </a:prstGeom>
+          <a:solidFill>
+            <a:schemeClr val="accent6">
+              <a:lumMod val="40000"/>
+              <a:lumOff val="60000"/>
+            </a:schemeClr>
+          </a:solidFill>
+          <a:ln w="38100">
+            <a:solidFill>
+              <a:schemeClr val="accent6">
+                <a:lumMod val="75000"/>
+              </a:schemeClr>
+            </a:solidFill>
+          </a:ln>
+        </p:spPr>
+        <p:style>
+          <a:lnRef idx="2">
+            <a:schemeClr val="accent1">
+              <a:shade val="50000"/>
+            </a:schemeClr>
+          </a:lnRef>
+          <a:fillRef idx="1">
+            <a:schemeClr val="accent1"/>
+          </a:fillRef>
+          <a:effectRef idx="0">
+            <a:schemeClr val="accent1"/>
+          </a:effectRef>
+          <a:fontRef idx="minor">
+            <a:schemeClr val="lt1"/>
+          </a:fontRef>
+        </p:style>
+        <p:txBody>
+          <a:bodyPr rtlCol="0" anchor="ctr"/>
+          <a:lstStyle/>
+          <a:p>
+            <a:pPr algn="ctr"/>
+            <a:endParaRPr lang="en-NZ"/>
+          </a:p>
+        </p:txBody>
+      </p:sp>
+      <p:sp>
+        <p:nvSpPr>
+          <p:cNvPr id="18" name="Rectangle 17">
+            <a:extLst>
+              <a:ext uri="{FF2B5EF4-FFF2-40B4-BE49-F238E27FC236}">
+                <a16:creationId xmlns:a16="http://schemas.microsoft.com/office/drawing/2014/main" id="{9FEEB0E2-1326-46C5-8989-327031944DA0}"/>
+              </a:ext>
+            </a:extLst>
+          </p:cNvPr>
+          <p:cNvSpPr/>
+          <p:nvPr/>
+        </p:nvSpPr>
+        <p:spPr>
+          <a:xfrm>
+            <a:off x="620419" y="5841540"/>
+            <a:ext cx="8100000" cy="576064"/>
+          </a:xfrm>
+          <a:prstGeom prst="rect">
+            <a:avLst/>
+          </a:prstGeom>
+          <a:solidFill>
+            <a:schemeClr val="accent6">
+              <a:lumMod val="40000"/>
+              <a:lumOff val="60000"/>
+            </a:schemeClr>
+          </a:solidFill>
+          <a:ln w="38100">
+            <a:solidFill>
+              <a:schemeClr val="accent6">
+                <a:lumMod val="75000"/>
+              </a:schemeClr>
+            </a:solidFill>
+          </a:ln>
+        </p:spPr>
+        <p:style>
+          <a:lnRef idx="2">
+            <a:schemeClr val="accent1">
+              <a:shade val="50000"/>
+            </a:schemeClr>
+          </a:lnRef>
+          <a:fillRef idx="1">
+            <a:schemeClr val="accent1"/>
+          </a:fillRef>
+          <a:effectRef idx="0">
+            <a:schemeClr val="accent1"/>
+          </a:effectRef>
+          <a:fontRef idx="minor">
+            <a:schemeClr val="lt1"/>
+          </a:fontRef>
+        </p:style>
+        <p:txBody>
+          <a:bodyPr rtlCol="0" anchor="ctr"/>
+          <a:lstStyle/>
+          <a:p>
+            <a:pPr algn="ctr"/>
+            <a:endParaRPr lang="en-NZ"/>
+          </a:p>
+        </p:txBody>
+      </p:sp>
+      <p:sp>
+        <p:nvSpPr>
+          <p:cNvPr id="22" name="Right Brace 21">
+            <a:extLst>
+              <a:ext uri="{FF2B5EF4-FFF2-40B4-BE49-F238E27FC236}">
+                <a16:creationId xmlns:a16="http://schemas.microsoft.com/office/drawing/2014/main" id="{19165035-DE11-46FC-8BBC-B9D1462B9A22}"/>
+              </a:ext>
+            </a:extLst>
+          </p:cNvPr>
+          <p:cNvSpPr/>
+          <p:nvPr/>
+        </p:nvSpPr>
+        <p:spPr>
+          <a:xfrm>
+            <a:off x="9062407" y="2193428"/>
+            <a:ext cx="216024" cy="4222561"/>
+          </a:xfrm>
+          <a:prstGeom prst="rightBrace">
+            <a:avLst/>
+          </a:prstGeom>
+          <a:ln>
+            <a:solidFill>
+              <a:schemeClr val="tx1">
+                <a:lumMod val="95000"/>
+                <a:lumOff val="5000"/>
+              </a:schemeClr>
+            </a:solidFill>
+          </a:ln>
+        </p:spPr>
+        <p:style>
+          <a:lnRef idx="1">
+            <a:schemeClr val="accent1"/>
+          </a:lnRef>
+          <a:fillRef idx="0">
+            <a:schemeClr val="accent1"/>
+          </a:fillRef>
+          <a:effectRef idx="0">
+            <a:schemeClr val="accent1"/>
+          </a:effectRef>
+          <a:fontRef idx="minor">
+            <a:schemeClr val="tx1"/>
+          </a:fontRef>
+        </p:style>
+        <p:txBody>
+          <a:bodyPr rtlCol="0" anchor="ctr"/>
+          <a:lstStyle/>
+          <a:p>
+            <a:pPr algn="ctr"/>
+            <a:endParaRPr lang="en-NZ"/>
+          </a:p>
+        </p:txBody>
+      </p:sp>
+      <p:sp>
+        <p:nvSpPr>
+          <p:cNvPr id="23" name="TextBox 22">
+            <a:extLst>
+              <a:ext uri="{FF2B5EF4-FFF2-40B4-BE49-F238E27FC236}">
+                <a16:creationId xmlns:a16="http://schemas.microsoft.com/office/drawing/2014/main" id="{F4D403E8-B268-4F7A-8FFC-2B631721BBBC}"/>
+              </a:ext>
+            </a:extLst>
+          </p:cNvPr>
+          <p:cNvSpPr txBox="1"/>
+          <p:nvPr/>
+        </p:nvSpPr>
+        <p:spPr>
+          <a:xfrm>
+            <a:off x="9584234" y="3889209"/>
+            <a:ext cx="1656184" cy="830997"/>
+          </a:xfrm>
+          <a:prstGeom prst="rect">
+            <a:avLst/>
+          </a:prstGeom>
+          <a:noFill/>
+        </p:spPr>
+        <p:txBody>
+          <a:bodyPr wrap="square" rtlCol="0">
+            <a:spAutoFit/>
+          </a:bodyPr>
+          <a:lstStyle/>
+          <a:p>
+            <a:pPr algn="ctr"/>
+            <a:r>
+              <a:rPr lang="en-NZ" sz="1600" dirty="0"/>
+              <a:t>2. Split remaining 90% into 5 cross validation folds</a:t>
+            </a:r>
+          </a:p>
+        </p:txBody>
+      </p:sp>
+      <p:sp>
+        <p:nvSpPr>
+          <p:cNvPr id="24" name="Rectangle 23">
+            <a:extLst>
+              <a:ext uri="{FF2B5EF4-FFF2-40B4-BE49-F238E27FC236}">
+                <a16:creationId xmlns:a16="http://schemas.microsoft.com/office/drawing/2014/main" id="{2DCD4564-D60B-4226-835D-5AFCFE2B951E}"/>
+              </a:ext>
+            </a:extLst>
+          </p:cNvPr>
+          <p:cNvSpPr/>
+          <p:nvPr/>
+        </p:nvSpPr>
+        <p:spPr>
+          <a:xfrm>
+            <a:off x="2240420" y="3105456"/>
+            <a:ext cx="1620000" cy="576064"/>
+          </a:xfrm>
+          <a:prstGeom prst="rect">
+            <a:avLst/>
+          </a:prstGeom>
+          <a:solidFill>
+            <a:schemeClr val="accent2">
+              <a:lumMod val="40000"/>
+              <a:lumOff val="60000"/>
+            </a:schemeClr>
+          </a:solidFill>
+          <a:ln w="38100">
+            <a:solidFill>
+              <a:schemeClr val="accent2">
+                <a:lumMod val="75000"/>
+              </a:schemeClr>
+            </a:solidFill>
+          </a:ln>
+        </p:spPr>
+        <p:style>
+          <a:lnRef idx="2">
+            <a:schemeClr val="accent1">
+              <a:shade val="50000"/>
+            </a:schemeClr>
+          </a:lnRef>
+          <a:fillRef idx="1">
+            <a:schemeClr val="accent1"/>
+          </a:fillRef>
+          <a:effectRef idx="0">
+            <a:schemeClr val="accent1"/>
+          </a:effectRef>
+          <a:fontRef idx="minor">
+            <a:schemeClr val="lt1"/>
+          </a:fontRef>
+        </p:style>
+        <p:txBody>
+          <a:bodyPr rtlCol="0" anchor="ctr"/>
+          <a:lstStyle/>
+          <a:p>
+            <a:pPr algn="ctr"/>
+            <a:endParaRPr lang="en-NZ"/>
+          </a:p>
+        </p:txBody>
+      </p:sp>
+      <p:sp>
+        <p:nvSpPr>
+          <p:cNvPr id="25" name="Rectangle 24">
+            <a:extLst>
+              <a:ext uri="{FF2B5EF4-FFF2-40B4-BE49-F238E27FC236}">
+                <a16:creationId xmlns:a16="http://schemas.microsoft.com/office/drawing/2014/main" id="{2E155CCE-C165-4B5C-985C-88113B9203E6}"/>
+              </a:ext>
+            </a:extLst>
+          </p:cNvPr>
+          <p:cNvSpPr/>
+          <p:nvPr/>
+        </p:nvSpPr>
+        <p:spPr>
+          <a:xfrm>
+            <a:off x="3860420" y="4016675"/>
+            <a:ext cx="1620000" cy="576064"/>
+          </a:xfrm>
+          <a:prstGeom prst="rect">
+            <a:avLst/>
+          </a:prstGeom>
+          <a:solidFill>
+            <a:schemeClr val="accent2">
+              <a:lumMod val="40000"/>
+              <a:lumOff val="60000"/>
+            </a:schemeClr>
+          </a:solidFill>
+          <a:ln w="38100">
+            <a:solidFill>
+              <a:schemeClr val="accent2">
+                <a:lumMod val="75000"/>
+              </a:schemeClr>
+            </a:solidFill>
+          </a:ln>
+        </p:spPr>
+        <p:style>
+          <a:lnRef idx="2">
+            <a:schemeClr val="accent1">
+              <a:shade val="50000"/>
+            </a:schemeClr>
+          </a:lnRef>
+          <a:fillRef idx="1">
+            <a:schemeClr val="accent1"/>
+          </a:fillRef>
+          <a:effectRef idx="0">
+            <a:schemeClr val="accent1"/>
+          </a:effectRef>
+          <a:fontRef idx="minor">
+            <a:schemeClr val="lt1"/>
+          </a:fontRef>
+        </p:style>
+        <p:txBody>
+          <a:bodyPr rtlCol="0" anchor="ctr"/>
+          <a:lstStyle/>
+          <a:p>
+            <a:pPr algn="ctr"/>
+            <a:endParaRPr lang="en-NZ"/>
+          </a:p>
+        </p:txBody>
+      </p:sp>
+      <p:sp>
+        <p:nvSpPr>
+          <p:cNvPr id="26" name="Rectangle 25">
+            <a:extLst>
+              <a:ext uri="{FF2B5EF4-FFF2-40B4-BE49-F238E27FC236}">
+                <a16:creationId xmlns:a16="http://schemas.microsoft.com/office/drawing/2014/main" id="{76D61EC4-A3AE-4703-BF62-A4100E3AE0C8}"/>
+              </a:ext>
+            </a:extLst>
+          </p:cNvPr>
+          <p:cNvSpPr/>
+          <p:nvPr/>
+        </p:nvSpPr>
+        <p:spPr>
+          <a:xfrm>
+            <a:off x="5480420" y="4929512"/>
+            <a:ext cx="1620000" cy="576064"/>
+          </a:xfrm>
+          <a:prstGeom prst="rect">
+            <a:avLst/>
+          </a:prstGeom>
+          <a:solidFill>
+            <a:schemeClr val="accent2">
+              <a:lumMod val="40000"/>
+              <a:lumOff val="60000"/>
+            </a:schemeClr>
+          </a:solidFill>
+          <a:ln w="38100">
+            <a:solidFill>
+              <a:schemeClr val="accent2">
+                <a:lumMod val="75000"/>
+              </a:schemeClr>
+            </a:solidFill>
+          </a:ln>
+        </p:spPr>
+        <p:style>
+          <a:lnRef idx="2">
+            <a:schemeClr val="accent1">
+              <a:shade val="50000"/>
+            </a:schemeClr>
+          </a:lnRef>
+          <a:fillRef idx="1">
+            <a:schemeClr val="accent1"/>
+          </a:fillRef>
+          <a:effectRef idx="0">
+            <a:schemeClr val="accent1"/>
+          </a:effectRef>
+          <a:fontRef idx="minor">
+            <a:schemeClr val="lt1"/>
+          </a:fontRef>
+        </p:style>
+        <p:txBody>
+          <a:bodyPr rtlCol="0" anchor="ctr"/>
+          <a:lstStyle/>
+          <a:p>
+            <a:pPr algn="ctr"/>
+            <a:endParaRPr lang="en-NZ"/>
+          </a:p>
+        </p:txBody>
+      </p:sp>
+      <p:sp>
+        <p:nvSpPr>
+          <p:cNvPr id="27" name="Rectangle 26">
+            <a:extLst>
+              <a:ext uri="{FF2B5EF4-FFF2-40B4-BE49-F238E27FC236}">
+                <a16:creationId xmlns:a16="http://schemas.microsoft.com/office/drawing/2014/main" id="{2CB5A05B-1185-46CB-8955-09BC1769741B}"/>
+              </a:ext>
+            </a:extLst>
+          </p:cNvPr>
+          <p:cNvSpPr/>
+          <p:nvPr/>
+        </p:nvSpPr>
+        <p:spPr>
+          <a:xfrm>
+            <a:off x="7100420" y="5841540"/>
+            <a:ext cx="1620000" cy="576064"/>
+          </a:xfrm>
+          <a:prstGeom prst="rect">
+            <a:avLst/>
+          </a:prstGeom>
+          <a:solidFill>
+            <a:schemeClr val="accent2">
+              <a:lumMod val="40000"/>
+              <a:lumOff val="60000"/>
+            </a:schemeClr>
+          </a:solidFill>
+          <a:ln w="38100">
+            <a:solidFill>
+              <a:schemeClr val="accent2">
+                <a:lumMod val="75000"/>
+              </a:schemeClr>
+            </a:solidFill>
+          </a:ln>
+        </p:spPr>
+        <p:style>
+          <a:lnRef idx="2">
+            <a:schemeClr val="accent1">
+              <a:shade val="50000"/>
+            </a:schemeClr>
+          </a:lnRef>
+          <a:fillRef idx="1">
+            <a:schemeClr val="accent1"/>
+          </a:fillRef>
+          <a:effectRef idx="0">
+            <a:schemeClr val="accent1"/>
+          </a:effectRef>
+          <a:fontRef idx="minor">
+            <a:schemeClr val="lt1"/>
+          </a:fontRef>
+        </p:style>
+        <p:txBody>
+          <a:bodyPr rtlCol="0" anchor="ctr"/>
+          <a:lstStyle/>
+          <a:p>
+            <a:pPr algn="ctr"/>
+            <a:endParaRPr lang="en-NZ"/>
+          </a:p>
+        </p:txBody>
+      </p:sp>
+      <p:sp>
+        <p:nvSpPr>
+          <p:cNvPr id="28" name="Rectangle 27">
+            <a:extLst>
+              <a:ext uri="{FF2B5EF4-FFF2-40B4-BE49-F238E27FC236}">
+                <a16:creationId xmlns:a16="http://schemas.microsoft.com/office/drawing/2014/main" id="{85532550-0FC7-45CB-9D54-663EE92E4E39}"/>
+              </a:ext>
+            </a:extLst>
+          </p:cNvPr>
+          <p:cNvSpPr/>
+          <p:nvPr/>
+        </p:nvSpPr>
+        <p:spPr>
+          <a:xfrm>
+            <a:off x="8720419" y="969292"/>
+            <a:ext cx="900001" cy="576064"/>
+          </a:xfrm>
+          <a:prstGeom prst="rect">
+            <a:avLst/>
+          </a:prstGeom>
+          <a:solidFill>
+            <a:schemeClr val="accent5">
+              <a:lumMod val="60000"/>
+              <a:lumOff val="40000"/>
+            </a:schemeClr>
+          </a:solidFill>
+          <a:ln w="38100">
+            <a:solidFill>
+              <a:schemeClr val="accent1">
+                <a:lumMod val="75000"/>
+              </a:schemeClr>
+            </a:solidFill>
+          </a:ln>
+        </p:spPr>
+        <p:style>
+          <a:lnRef idx="2">
+            <a:schemeClr val="accent1">
+              <a:shade val="50000"/>
+            </a:schemeClr>
+          </a:lnRef>
+          <a:fillRef idx="1">
+            <a:schemeClr val="accent1"/>
+          </a:fillRef>
+          <a:effectRef idx="0">
+            <a:schemeClr val="accent1"/>
+          </a:effectRef>
+          <a:fontRef idx="minor">
+            <a:schemeClr val="lt1"/>
+          </a:fontRef>
+        </p:style>
+        <p:txBody>
+          <a:bodyPr rtlCol="0" anchor="ctr"/>
+          <a:lstStyle/>
+          <a:p>
+            <a:pPr algn="ctr"/>
+            <a:endParaRPr lang="en-NZ"/>
+          </a:p>
+        </p:txBody>
+      </p:sp>
+      <p:sp>
+        <p:nvSpPr>
+          <p:cNvPr id="29" name="TextBox 28">
+            <a:extLst>
+              <a:ext uri="{FF2B5EF4-FFF2-40B4-BE49-F238E27FC236}">
+                <a16:creationId xmlns:a16="http://schemas.microsoft.com/office/drawing/2014/main" id="{C817A30C-21BE-418F-97AA-C748E7DD79A1}"/>
+              </a:ext>
+            </a:extLst>
+          </p:cNvPr>
+          <p:cNvSpPr txBox="1"/>
+          <p:nvPr/>
+        </p:nvSpPr>
+        <p:spPr>
+          <a:xfrm>
+            <a:off x="10056440" y="2137795"/>
+            <a:ext cx="1547634" cy="830997"/>
+          </a:xfrm>
+          <a:prstGeom prst="rect">
+            <a:avLst/>
+          </a:prstGeom>
+          <a:noFill/>
+        </p:spPr>
+        <p:txBody>
+          <a:bodyPr wrap="square" rtlCol="0">
+            <a:spAutoFit/>
+          </a:bodyPr>
+          <a:lstStyle/>
+          <a:p>
+            <a:pPr algn="ctr"/>
+            <a:r>
+              <a:rPr lang="en-NZ" sz="1600" dirty="0"/>
+              <a:t>1. Hold 10% of items out for testing</a:t>
+            </a:r>
+          </a:p>
+        </p:txBody>
+      </p:sp>
+      <p:cxnSp>
+        <p:nvCxnSpPr>
+          <p:cNvPr id="3" name="Straight Arrow Connector 2">
+            <a:extLst>
+              <a:ext uri="{FF2B5EF4-FFF2-40B4-BE49-F238E27FC236}">
+                <a16:creationId xmlns:a16="http://schemas.microsoft.com/office/drawing/2014/main" id="{8A5B3F5E-E606-4DB9-ADA9-93ACD78BA619}"/>
+              </a:ext>
+            </a:extLst>
+          </p:cNvPr>
+          <p:cNvCxnSpPr>
+            <a:cxnSpLocks/>
+          </p:cNvCxnSpPr>
+          <p:nvPr/>
+        </p:nvCxnSpPr>
+        <p:spPr>
+          <a:xfrm flipH="1" flipV="1">
+            <a:off x="9840416" y="1484784"/>
+            <a:ext cx="764380" cy="524505"/>
+          </a:xfrm>
+          <a:prstGeom prst="straightConnector1">
+            <a:avLst/>
+          </a:prstGeom>
+          <a:ln>
+            <a:tailEnd type="triangle"/>
+          </a:ln>
+        </p:spPr>
+        <p:style>
+          <a:lnRef idx="1">
+            <a:schemeClr val="accent1"/>
+          </a:lnRef>
+          <a:fillRef idx="0">
+            <a:schemeClr val="accent1"/>
+          </a:fillRef>
+          <a:effectRef idx="0">
+            <a:schemeClr val="accent1"/>
+          </a:effectRef>
+          <a:fontRef idx="minor">
+            <a:schemeClr val="tx1"/>
+          </a:fontRef>
+        </p:style>
+      </p:cxnSp>
+    </p:spTree>
+    <p:extLst>
+      <p:ext uri="{BB962C8B-B14F-4D97-AF65-F5344CB8AC3E}">
+        <p14:creationId xmlns:p14="http://schemas.microsoft.com/office/powerpoint/2010/main" val="1374799005"/>
       </p:ext>
     </p:extLst>
   </p:cSld>
@@ -14740,8 +15726,8 @@
           </a:p>
         </p:txBody>
       </p:sp>
-      <mc:AlternateContent xmlns:mc="http://schemas.openxmlformats.org/markup-compatibility/2006">
-        <mc:Choice xmlns:a14="http://schemas.microsoft.com/office/drawing/2010/main" Requires="a14">
+      <mc:AlternateContent xmlns:mc="http://schemas.openxmlformats.org/markup-compatibility/2006" xmlns:a14="http://schemas.microsoft.com/office/drawing/2010/main">
+        <mc:Choice Requires="a14">
           <p:sp>
             <p:nvSpPr>
               <p:cNvPr id="17" name="TextBox 16">
@@ -14803,7 +15789,7 @@
             </p:txBody>
           </p:sp>
         </mc:Choice>
-        <mc:Fallback>
+        <mc:Fallback xmlns="">
           <p:sp>
             <p:nvSpPr>
               <p:cNvPr id="17" name="TextBox 16">
@@ -14848,8 +15834,8 @@
           </p:sp>
         </mc:Fallback>
       </mc:AlternateContent>
-      <mc:AlternateContent xmlns:mc="http://schemas.openxmlformats.org/markup-compatibility/2006">
-        <mc:Choice xmlns:a14="http://schemas.microsoft.com/office/drawing/2010/main" Requires="a14">
+      <mc:AlternateContent xmlns:mc="http://schemas.openxmlformats.org/markup-compatibility/2006" xmlns:a14="http://schemas.microsoft.com/office/drawing/2010/main">
+        <mc:Choice Requires="a14">
           <p:sp>
             <p:nvSpPr>
               <p:cNvPr id="156" name="TextBox 155">
@@ -14942,7 +15928,7 @@
             </p:txBody>
           </p:sp>
         </mc:Choice>
-        <mc:Fallback>
+        <mc:Fallback xmlns="">
           <p:sp>
             <p:nvSpPr>
               <p:cNvPr id="156" name="TextBox 155">
@@ -14987,8 +15973,8 @@
           </p:sp>
         </mc:Fallback>
       </mc:AlternateContent>
-      <mc:AlternateContent xmlns:mc="http://schemas.openxmlformats.org/markup-compatibility/2006">
-        <mc:Choice xmlns:a14="http://schemas.microsoft.com/office/drawing/2010/main" Requires="a14">
+      <mc:AlternateContent xmlns:mc="http://schemas.openxmlformats.org/markup-compatibility/2006" xmlns:a14="http://schemas.microsoft.com/office/drawing/2010/main">
+        <mc:Choice Requires="a14">
           <p:sp>
             <p:nvSpPr>
               <p:cNvPr id="159" name="TextBox 158">
@@ -15093,7 +16079,7 @@
             </p:txBody>
           </p:sp>
         </mc:Choice>
-        <mc:Fallback>
+        <mc:Fallback xmlns="">
           <p:sp>
             <p:nvSpPr>
               <p:cNvPr id="159" name="TextBox 158">
@@ -23577,7 +24563,7 @@
 </file>
 
 <file path=ppt/slides/slide8.xml><?xml version="1.0" encoding="utf-8"?>
-<p:sld xmlns:a="http://schemas.openxmlformats.org/drawingml/2006/main" xmlns:r="http://schemas.openxmlformats.org/officeDocument/2006/relationships" xmlns:p="http://schemas.openxmlformats.org/presentationml/2006/main">
+<p:sld xmlns:a="http://schemas.openxmlformats.org/drawingml/2006/main" xmlns:r="http://schemas.openxmlformats.org/officeDocument/2006/relationships" xmlns:p="http://schemas.openxmlformats.org/presentationml/2006/main" show="0">
   <p:cSld>
     <p:spTree>
       <p:nvGrpSpPr>
@@ -24107,6 +25093,854 @@
     <p:extLst>
       <p:ext uri="{BB962C8B-B14F-4D97-AF65-F5344CB8AC3E}">
         <p14:creationId xmlns:p14="http://schemas.microsoft.com/office/powerpoint/2010/main" val="765299857"/>
+      </p:ext>
+    </p:extLst>
+  </p:cSld>
+  <p:clrMapOvr>
+    <a:masterClrMapping/>
+  </p:clrMapOvr>
+</p:sld>
+</file>
+
+<file path=ppt/slides/slide9.xml><?xml version="1.0" encoding="utf-8"?>
+<p:sld xmlns:a="http://schemas.openxmlformats.org/drawingml/2006/main" xmlns:r="http://schemas.openxmlformats.org/officeDocument/2006/relationships" xmlns:p="http://schemas.openxmlformats.org/presentationml/2006/main" show="0">
+  <p:cSld>
+    <p:spTree>
+      <p:nvGrpSpPr>
+        <p:cNvPr id="1" name=""/>
+        <p:cNvGrpSpPr/>
+        <p:nvPr/>
+      </p:nvGrpSpPr>
+      <p:grpSpPr>
+        <a:xfrm>
+          <a:off x="0" y="0"/>
+          <a:ext cx="0" cy="0"/>
+          <a:chOff x="0" y="0"/>
+          <a:chExt cx="0" cy="0"/>
+        </a:xfrm>
+      </p:grpSpPr>
+      <p:sp>
+        <p:nvSpPr>
+          <p:cNvPr id="5" name="Rectangle 4">
+            <a:extLst>
+              <a:ext uri="{FF2B5EF4-FFF2-40B4-BE49-F238E27FC236}">
+                <a16:creationId xmlns:a16="http://schemas.microsoft.com/office/drawing/2014/main" id="{9852D65D-5CED-45EF-846B-87148B475D28}"/>
+              </a:ext>
+            </a:extLst>
+          </p:cNvPr>
+          <p:cNvSpPr/>
+          <p:nvPr/>
+        </p:nvSpPr>
+        <p:spPr>
+          <a:xfrm>
+            <a:off x="620420" y="969292"/>
+            <a:ext cx="9000000" cy="576064"/>
+          </a:xfrm>
+          <a:prstGeom prst="rect">
+            <a:avLst/>
+          </a:prstGeom>
+          <a:noFill/>
+          <a:ln w="38100">
+            <a:solidFill>
+              <a:schemeClr val="tx1"/>
+            </a:solidFill>
+          </a:ln>
+        </p:spPr>
+        <p:style>
+          <a:lnRef idx="2">
+            <a:schemeClr val="accent1">
+              <a:shade val="50000"/>
+            </a:schemeClr>
+          </a:lnRef>
+          <a:fillRef idx="1">
+            <a:schemeClr val="accent1"/>
+          </a:fillRef>
+          <a:effectRef idx="0">
+            <a:schemeClr val="accent1"/>
+          </a:effectRef>
+          <a:fontRef idx="minor">
+            <a:schemeClr val="lt1"/>
+          </a:fontRef>
+        </p:style>
+        <p:txBody>
+          <a:bodyPr rtlCol="0" anchor="ctr"/>
+          <a:lstStyle/>
+          <a:p>
+            <a:pPr algn="ctr"/>
+            <a:endParaRPr lang="en-NZ"/>
+          </a:p>
+        </p:txBody>
+      </p:sp>
+      <p:sp>
+        <p:nvSpPr>
+          <p:cNvPr id="7" name="Rectangle 6">
+            <a:extLst>
+              <a:ext uri="{FF2B5EF4-FFF2-40B4-BE49-F238E27FC236}">
+                <a16:creationId xmlns:a16="http://schemas.microsoft.com/office/drawing/2014/main" id="{DA7274BB-2A40-4E68-A1AE-01A5956FFDD6}"/>
+              </a:ext>
+            </a:extLst>
+          </p:cNvPr>
+          <p:cNvSpPr/>
+          <p:nvPr/>
+        </p:nvSpPr>
+        <p:spPr>
+          <a:xfrm>
+            <a:off x="620419" y="2193428"/>
+            <a:ext cx="9000001" cy="576064"/>
+          </a:xfrm>
+          <a:prstGeom prst="rect">
+            <a:avLst/>
+          </a:prstGeom>
+          <a:solidFill>
+            <a:schemeClr val="accent6">
+              <a:lumMod val="40000"/>
+              <a:lumOff val="60000"/>
+            </a:schemeClr>
+          </a:solidFill>
+          <a:ln w="38100">
+            <a:solidFill>
+              <a:schemeClr val="accent6">
+                <a:lumMod val="75000"/>
+              </a:schemeClr>
+            </a:solidFill>
+          </a:ln>
+        </p:spPr>
+        <p:style>
+          <a:lnRef idx="2">
+            <a:schemeClr val="accent1">
+              <a:shade val="50000"/>
+            </a:schemeClr>
+          </a:lnRef>
+          <a:fillRef idx="1">
+            <a:schemeClr val="accent1"/>
+          </a:fillRef>
+          <a:effectRef idx="0">
+            <a:schemeClr val="accent1"/>
+          </a:effectRef>
+          <a:fontRef idx="minor">
+            <a:schemeClr val="lt1"/>
+          </a:fontRef>
+        </p:style>
+        <p:txBody>
+          <a:bodyPr rtlCol="0" anchor="ctr"/>
+          <a:lstStyle/>
+          <a:p>
+            <a:pPr algn="ctr"/>
+            <a:endParaRPr lang="en-NZ"/>
+          </a:p>
+        </p:txBody>
+      </p:sp>
+      <p:sp>
+        <p:nvSpPr>
+          <p:cNvPr id="11" name="Right Brace 10">
+            <a:extLst>
+              <a:ext uri="{FF2B5EF4-FFF2-40B4-BE49-F238E27FC236}">
+                <a16:creationId xmlns:a16="http://schemas.microsoft.com/office/drawing/2014/main" id="{38CA8665-2E42-417B-890E-AF80755A8BD0}"/>
+              </a:ext>
+            </a:extLst>
+          </p:cNvPr>
+          <p:cNvSpPr/>
+          <p:nvPr/>
+        </p:nvSpPr>
+        <p:spPr>
+          <a:xfrm rot="16200000">
+            <a:off x="4976403" y="-3747232"/>
+            <a:ext cx="288032" cy="8784977"/>
+          </a:xfrm>
+          <a:prstGeom prst="rightBrace">
+            <a:avLst/>
+          </a:prstGeom>
+          <a:ln>
+            <a:solidFill>
+              <a:schemeClr val="tx1">
+                <a:lumMod val="95000"/>
+                <a:lumOff val="5000"/>
+              </a:schemeClr>
+            </a:solidFill>
+          </a:ln>
+        </p:spPr>
+        <p:style>
+          <a:lnRef idx="1">
+            <a:schemeClr val="accent1"/>
+          </a:lnRef>
+          <a:fillRef idx="0">
+            <a:schemeClr val="accent1"/>
+          </a:fillRef>
+          <a:effectRef idx="0">
+            <a:schemeClr val="accent1"/>
+          </a:effectRef>
+          <a:fontRef idx="minor">
+            <a:schemeClr val="tx1"/>
+          </a:fontRef>
+        </p:style>
+        <p:txBody>
+          <a:bodyPr rtlCol="0" anchor="ctr"/>
+          <a:lstStyle/>
+          <a:p>
+            <a:pPr algn="ctr"/>
+            <a:endParaRPr lang="en-NZ"/>
+          </a:p>
+        </p:txBody>
+      </p:sp>
+      <p:sp>
+        <p:nvSpPr>
+          <p:cNvPr id="12" name="TextBox 11">
+            <a:extLst>
+              <a:ext uri="{FF2B5EF4-FFF2-40B4-BE49-F238E27FC236}">
+                <a16:creationId xmlns:a16="http://schemas.microsoft.com/office/drawing/2014/main" id="{8B10F358-C525-46C1-AAC9-CFAF03C514BE}"/>
+              </a:ext>
+            </a:extLst>
+          </p:cNvPr>
+          <p:cNvSpPr txBox="1"/>
+          <p:nvPr/>
+        </p:nvSpPr>
+        <p:spPr>
+          <a:xfrm>
+            <a:off x="4346602" y="116632"/>
+            <a:ext cx="1547634" cy="338554"/>
+          </a:xfrm>
+          <a:prstGeom prst="rect">
+            <a:avLst/>
+          </a:prstGeom>
+          <a:noFill/>
+        </p:spPr>
+        <p:txBody>
+          <a:bodyPr wrap="square" rtlCol="0">
+            <a:spAutoFit/>
+          </a:bodyPr>
+          <a:lstStyle/>
+          <a:p>
+            <a:pPr algn="ctr"/>
+            <a:r>
+              <a:rPr lang="en-NZ" sz="1600" dirty="0"/>
+              <a:t>Ratings dataset</a:t>
+            </a:r>
+          </a:p>
+        </p:txBody>
+      </p:sp>
+      <p:sp>
+        <p:nvSpPr>
+          <p:cNvPr id="13" name="Rectangle 12">
+            <a:extLst>
+              <a:ext uri="{FF2B5EF4-FFF2-40B4-BE49-F238E27FC236}">
+                <a16:creationId xmlns:a16="http://schemas.microsoft.com/office/drawing/2014/main" id="{766D9B6A-E0BC-4AD2-8D07-AB6B2AE11C65}"/>
+              </a:ext>
+            </a:extLst>
+          </p:cNvPr>
+          <p:cNvSpPr/>
+          <p:nvPr/>
+        </p:nvSpPr>
+        <p:spPr>
+          <a:xfrm>
+            <a:off x="620420" y="2193428"/>
+            <a:ext cx="1800000" cy="576064"/>
+          </a:xfrm>
+          <a:prstGeom prst="rect">
+            <a:avLst/>
+          </a:prstGeom>
+          <a:solidFill>
+            <a:schemeClr val="accent2">
+              <a:lumMod val="40000"/>
+              <a:lumOff val="60000"/>
+            </a:schemeClr>
+          </a:solidFill>
+          <a:ln w="38100">
+            <a:solidFill>
+              <a:schemeClr val="accent2">
+                <a:lumMod val="75000"/>
+              </a:schemeClr>
+            </a:solidFill>
+          </a:ln>
+        </p:spPr>
+        <p:style>
+          <a:lnRef idx="2">
+            <a:schemeClr val="accent1">
+              <a:shade val="50000"/>
+            </a:schemeClr>
+          </a:lnRef>
+          <a:fillRef idx="1">
+            <a:schemeClr val="accent1"/>
+          </a:fillRef>
+          <a:effectRef idx="0">
+            <a:schemeClr val="accent1"/>
+          </a:effectRef>
+          <a:fontRef idx="minor">
+            <a:schemeClr val="lt1"/>
+          </a:fontRef>
+        </p:style>
+        <p:txBody>
+          <a:bodyPr rtlCol="0" anchor="ctr"/>
+          <a:lstStyle/>
+          <a:p>
+            <a:pPr algn="ctr"/>
+            <a:endParaRPr lang="en-NZ"/>
+          </a:p>
+        </p:txBody>
+      </p:sp>
+      <p:sp>
+        <p:nvSpPr>
+          <p:cNvPr id="14" name="Rectangle 13">
+            <a:extLst>
+              <a:ext uri="{FF2B5EF4-FFF2-40B4-BE49-F238E27FC236}">
+                <a16:creationId xmlns:a16="http://schemas.microsoft.com/office/drawing/2014/main" id="{B77EADB4-525E-43E2-BDE9-0EB110C7AFB8}"/>
+              </a:ext>
+            </a:extLst>
+          </p:cNvPr>
+          <p:cNvSpPr/>
+          <p:nvPr/>
+        </p:nvSpPr>
+        <p:spPr>
+          <a:xfrm>
+            <a:off x="620419" y="3105456"/>
+            <a:ext cx="9000000" cy="576064"/>
+          </a:xfrm>
+          <a:prstGeom prst="rect">
+            <a:avLst/>
+          </a:prstGeom>
+          <a:solidFill>
+            <a:schemeClr val="accent6">
+              <a:lumMod val="40000"/>
+              <a:lumOff val="60000"/>
+            </a:schemeClr>
+          </a:solidFill>
+          <a:ln w="38100">
+            <a:solidFill>
+              <a:schemeClr val="accent6">
+                <a:lumMod val="75000"/>
+              </a:schemeClr>
+            </a:solidFill>
+          </a:ln>
+        </p:spPr>
+        <p:style>
+          <a:lnRef idx="2">
+            <a:schemeClr val="accent1">
+              <a:shade val="50000"/>
+            </a:schemeClr>
+          </a:lnRef>
+          <a:fillRef idx="1">
+            <a:schemeClr val="accent1"/>
+          </a:fillRef>
+          <a:effectRef idx="0">
+            <a:schemeClr val="accent1"/>
+          </a:effectRef>
+          <a:fontRef idx="minor">
+            <a:schemeClr val="lt1"/>
+          </a:fontRef>
+        </p:style>
+        <p:txBody>
+          <a:bodyPr rtlCol="0" anchor="ctr"/>
+          <a:lstStyle/>
+          <a:p>
+            <a:pPr algn="ctr"/>
+            <a:endParaRPr lang="en-NZ" dirty="0"/>
+          </a:p>
+        </p:txBody>
+      </p:sp>
+      <p:sp>
+        <p:nvSpPr>
+          <p:cNvPr id="15" name="Rectangle 14">
+            <a:extLst>
+              <a:ext uri="{FF2B5EF4-FFF2-40B4-BE49-F238E27FC236}">
+                <a16:creationId xmlns:a16="http://schemas.microsoft.com/office/drawing/2014/main" id="{2ADB12B7-0FD1-4FAC-8EA8-867F78EF492A}"/>
+              </a:ext>
+            </a:extLst>
+          </p:cNvPr>
+          <p:cNvSpPr/>
+          <p:nvPr/>
+        </p:nvSpPr>
+        <p:spPr>
+          <a:xfrm>
+            <a:off x="2420420" y="3105456"/>
+            <a:ext cx="1800000" cy="576064"/>
+          </a:xfrm>
+          <a:prstGeom prst="rect">
+            <a:avLst/>
+          </a:prstGeom>
+          <a:solidFill>
+            <a:schemeClr val="accent2">
+              <a:lumMod val="40000"/>
+              <a:lumOff val="60000"/>
+            </a:schemeClr>
+          </a:solidFill>
+          <a:ln w="38100">
+            <a:solidFill>
+              <a:schemeClr val="accent2">
+                <a:lumMod val="75000"/>
+              </a:schemeClr>
+            </a:solidFill>
+          </a:ln>
+        </p:spPr>
+        <p:style>
+          <a:lnRef idx="2">
+            <a:schemeClr val="accent1">
+              <a:shade val="50000"/>
+            </a:schemeClr>
+          </a:lnRef>
+          <a:fillRef idx="1">
+            <a:schemeClr val="accent1"/>
+          </a:fillRef>
+          <a:effectRef idx="0">
+            <a:schemeClr val="accent1"/>
+          </a:effectRef>
+          <a:fontRef idx="minor">
+            <a:schemeClr val="lt1"/>
+          </a:fontRef>
+        </p:style>
+        <p:txBody>
+          <a:bodyPr rtlCol="0" anchor="ctr"/>
+          <a:lstStyle/>
+          <a:p>
+            <a:pPr algn="ctr"/>
+            <a:endParaRPr lang="en-NZ"/>
+          </a:p>
+        </p:txBody>
+      </p:sp>
+      <p:sp>
+        <p:nvSpPr>
+          <p:cNvPr id="16" name="Rectangle 15">
+            <a:extLst>
+              <a:ext uri="{FF2B5EF4-FFF2-40B4-BE49-F238E27FC236}">
+                <a16:creationId xmlns:a16="http://schemas.microsoft.com/office/drawing/2014/main" id="{DF7DD2D0-0CFA-4F16-8315-BC7210C1375A}"/>
+              </a:ext>
+            </a:extLst>
+          </p:cNvPr>
+          <p:cNvSpPr/>
+          <p:nvPr/>
+        </p:nvSpPr>
+        <p:spPr>
+          <a:xfrm>
+            <a:off x="620419" y="4017484"/>
+            <a:ext cx="9000000" cy="576064"/>
+          </a:xfrm>
+          <a:prstGeom prst="rect">
+            <a:avLst/>
+          </a:prstGeom>
+          <a:solidFill>
+            <a:schemeClr val="accent6">
+              <a:lumMod val="40000"/>
+              <a:lumOff val="60000"/>
+            </a:schemeClr>
+          </a:solidFill>
+          <a:ln w="38100">
+            <a:solidFill>
+              <a:schemeClr val="accent6">
+                <a:lumMod val="75000"/>
+              </a:schemeClr>
+            </a:solidFill>
+          </a:ln>
+        </p:spPr>
+        <p:style>
+          <a:lnRef idx="2">
+            <a:schemeClr val="accent1">
+              <a:shade val="50000"/>
+            </a:schemeClr>
+          </a:lnRef>
+          <a:fillRef idx="1">
+            <a:schemeClr val="accent1"/>
+          </a:fillRef>
+          <a:effectRef idx="0">
+            <a:schemeClr val="accent1"/>
+          </a:effectRef>
+          <a:fontRef idx="minor">
+            <a:schemeClr val="lt1"/>
+          </a:fontRef>
+        </p:style>
+        <p:txBody>
+          <a:bodyPr rtlCol="0" anchor="ctr"/>
+          <a:lstStyle/>
+          <a:p>
+            <a:pPr algn="ctr"/>
+            <a:endParaRPr lang="en-NZ"/>
+          </a:p>
+        </p:txBody>
+      </p:sp>
+      <p:sp>
+        <p:nvSpPr>
+          <p:cNvPr id="17" name="Rectangle 16">
+            <a:extLst>
+              <a:ext uri="{FF2B5EF4-FFF2-40B4-BE49-F238E27FC236}">
+                <a16:creationId xmlns:a16="http://schemas.microsoft.com/office/drawing/2014/main" id="{EFAC7260-55AA-4F6B-8B7D-5C898910307D}"/>
+              </a:ext>
+            </a:extLst>
+          </p:cNvPr>
+          <p:cNvSpPr/>
+          <p:nvPr/>
+        </p:nvSpPr>
+        <p:spPr>
+          <a:xfrm>
+            <a:off x="620419" y="4929512"/>
+            <a:ext cx="9000000" cy="576064"/>
+          </a:xfrm>
+          <a:prstGeom prst="rect">
+            <a:avLst/>
+          </a:prstGeom>
+          <a:solidFill>
+            <a:schemeClr val="accent6">
+              <a:lumMod val="40000"/>
+              <a:lumOff val="60000"/>
+            </a:schemeClr>
+          </a:solidFill>
+          <a:ln w="38100">
+            <a:solidFill>
+              <a:schemeClr val="accent6">
+                <a:lumMod val="75000"/>
+              </a:schemeClr>
+            </a:solidFill>
+          </a:ln>
+        </p:spPr>
+        <p:style>
+          <a:lnRef idx="2">
+            <a:schemeClr val="accent1">
+              <a:shade val="50000"/>
+            </a:schemeClr>
+          </a:lnRef>
+          <a:fillRef idx="1">
+            <a:schemeClr val="accent1"/>
+          </a:fillRef>
+          <a:effectRef idx="0">
+            <a:schemeClr val="accent1"/>
+          </a:effectRef>
+          <a:fontRef idx="minor">
+            <a:schemeClr val="lt1"/>
+          </a:fontRef>
+        </p:style>
+        <p:txBody>
+          <a:bodyPr rtlCol="0" anchor="ctr"/>
+          <a:lstStyle/>
+          <a:p>
+            <a:pPr algn="ctr"/>
+            <a:endParaRPr lang="en-NZ"/>
+          </a:p>
+        </p:txBody>
+      </p:sp>
+      <p:sp>
+        <p:nvSpPr>
+          <p:cNvPr id="18" name="Rectangle 17">
+            <a:extLst>
+              <a:ext uri="{FF2B5EF4-FFF2-40B4-BE49-F238E27FC236}">
+                <a16:creationId xmlns:a16="http://schemas.microsoft.com/office/drawing/2014/main" id="{9FEEB0E2-1326-46C5-8989-327031944DA0}"/>
+              </a:ext>
+            </a:extLst>
+          </p:cNvPr>
+          <p:cNvSpPr/>
+          <p:nvPr/>
+        </p:nvSpPr>
+        <p:spPr>
+          <a:xfrm>
+            <a:off x="620419" y="5841540"/>
+            <a:ext cx="9000000" cy="576064"/>
+          </a:xfrm>
+          <a:prstGeom prst="rect">
+            <a:avLst/>
+          </a:prstGeom>
+          <a:solidFill>
+            <a:schemeClr val="accent6">
+              <a:lumMod val="40000"/>
+              <a:lumOff val="60000"/>
+            </a:schemeClr>
+          </a:solidFill>
+          <a:ln w="38100">
+            <a:solidFill>
+              <a:schemeClr val="accent6">
+                <a:lumMod val="75000"/>
+              </a:schemeClr>
+            </a:solidFill>
+          </a:ln>
+        </p:spPr>
+        <p:style>
+          <a:lnRef idx="2">
+            <a:schemeClr val="accent1">
+              <a:shade val="50000"/>
+            </a:schemeClr>
+          </a:lnRef>
+          <a:fillRef idx="1">
+            <a:schemeClr val="accent1"/>
+          </a:fillRef>
+          <a:effectRef idx="0">
+            <a:schemeClr val="accent1"/>
+          </a:effectRef>
+          <a:fontRef idx="minor">
+            <a:schemeClr val="lt1"/>
+          </a:fontRef>
+        </p:style>
+        <p:txBody>
+          <a:bodyPr rtlCol="0" anchor="ctr"/>
+          <a:lstStyle/>
+          <a:p>
+            <a:pPr algn="ctr"/>
+            <a:endParaRPr lang="en-NZ"/>
+          </a:p>
+        </p:txBody>
+      </p:sp>
+      <p:sp>
+        <p:nvSpPr>
+          <p:cNvPr id="19" name="Rectangle 18">
+            <a:extLst>
+              <a:ext uri="{FF2B5EF4-FFF2-40B4-BE49-F238E27FC236}">
+                <a16:creationId xmlns:a16="http://schemas.microsoft.com/office/drawing/2014/main" id="{42F11DE5-33C2-4255-B673-2AC86CE3FAF9}"/>
+              </a:ext>
+            </a:extLst>
+          </p:cNvPr>
+          <p:cNvSpPr/>
+          <p:nvPr/>
+        </p:nvSpPr>
+        <p:spPr>
+          <a:xfrm>
+            <a:off x="4220419" y="4017484"/>
+            <a:ext cx="1800000" cy="576064"/>
+          </a:xfrm>
+          <a:prstGeom prst="rect">
+            <a:avLst/>
+          </a:prstGeom>
+          <a:solidFill>
+            <a:schemeClr val="accent2">
+              <a:lumMod val="40000"/>
+              <a:lumOff val="60000"/>
+            </a:schemeClr>
+          </a:solidFill>
+          <a:ln w="38100">
+            <a:solidFill>
+              <a:schemeClr val="accent2">
+                <a:lumMod val="75000"/>
+              </a:schemeClr>
+            </a:solidFill>
+          </a:ln>
+        </p:spPr>
+        <p:style>
+          <a:lnRef idx="2">
+            <a:schemeClr val="accent1">
+              <a:shade val="50000"/>
+            </a:schemeClr>
+          </a:lnRef>
+          <a:fillRef idx="1">
+            <a:schemeClr val="accent1"/>
+          </a:fillRef>
+          <a:effectRef idx="0">
+            <a:schemeClr val="accent1"/>
+          </a:effectRef>
+          <a:fontRef idx="minor">
+            <a:schemeClr val="lt1"/>
+          </a:fontRef>
+        </p:style>
+        <p:txBody>
+          <a:bodyPr rtlCol="0" anchor="ctr"/>
+          <a:lstStyle/>
+          <a:p>
+            <a:pPr algn="ctr"/>
+            <a:endParaRPr lang="en-NZ"/>
+          </a:p>
+        </p:txBody>
+      </p:sp>
+      <p:sp>
+        <p:nvSpPr>
+          <p:cNvPr id="20" name="Rectangle 19">
+            <a:extLst>
+              <a:ext uri="{FF2B5EF4-FFF2-40B4-BE49-F238E27FC236}">
+                <a16:creationId xmlns:a16="http://schemas.microsoft.com/office/drawing/2014/main" id="{16E6D355-A864-4D96-B231-9CB28D2911D7}"/>
+              </a:ext>
+            </a:extLst>
+          </p:cNvPr>
+          <p:cNvSpPr/>
+          <p:nvPr/>
+        </p:nvSpPr>
+        <p:spPr>
+          <a:xfrm>
+            <a:off x="6020419" y="4929512"/>
+            <a:ext cx="1800000" cy="576064"/>
+          </a:xfrm>
+          <a:prstGeom prst="rect">
+            <a:avLst/>
+          </a:prstGeom>
+          <a:solidFill>
+            <a:schemeClr val="accent2">
+              <a:lumMod val="40000"/>
+              <a:lumOff val="60000"/>
+            </a:schemeClr>
+          </a:solidFill>
+          <a:ln w="38100">
+            <a:solidFill>
+              <a:schemeClr val="accent2">
+                <a:lumMod val="75000"/>
+              </a:schemeClr>
+            </a:solidFill>
+          </a:ln>
+        </p:spPr>
+        <p:style>
+          <a:lnRef idx="2">
+            <a:schemeClr val="accent1">
+              <a:shade val="50000"/>
+            </a:schemeClr>
+          </a:lnRef>
+          <a:fillRef idx="1">
+            <a:schemeClr val="accent1"/>
+          </a:fillRef>
+          <a:effectRef idx="0">
+            <a:schemeClr val="accent1"/>
+          </a:effectRef>
+          <a:fontRef idx="minor">
+            <a:schemeClr val="lt1"/>
+          </a:fontRef>
+        </p:style>
+        <p:txBody>
+          <a:bodyPr rtlCol="0" anchor="ctr"/>
+          <a:lstStyle/>
+          <a:p>
+            <a:pPr algn="ctr"/>
+            <a:endParaRPr lang="en-NZ"/>
+          </a:p>
+        </p:txBody>
+      </p:sp>
+      <p:sp>
+        <p:nvSpPr>
+          <p:cNvPr id="21" name="Rectangle 20">
+            <a:extLst>
+              <a:ext uri="{FF2B5EF4-FFF2-40B4-BE49-F238E27FC236}">
+                <a16:creationId xmlns:a16="http://schemas.microsoft.com/office/drawing/2014/main" id="{256FA82D-0B7B-4174-8173-EBD152900B56}"/>
+              </a:ext>
+            </a:extLst>
+          </p:cNvPr>
+          <p:cNvSpPr/>
+          <p:nvPr/>
+        </p:nvSpPr>
+        <p:spPr>
+          <a:xfrm>
+            <a:off x="7820419" y="5839925"/>
+            <a:ext cx="1800000" cy="576064"/>
+          </a:xfrm>
+          <a:prstGeom prst="rect">
+            <a:avLst/>
+          </a:prstGeom>
+          <a:solidFill>
+            <a:schemeClr val="accent2">
+              <a:lumMod val="40000"/>
+              <a:lumOff val="60000"/>
+            </a:schemeClr>
+          </a:solidFill>
+          <a:ln w="38100">
+            <a:solidFill>
+              <a:schemeClr val="accent2">
+                <a:lumMod val="75000"/>
+              </a:schemeClr>
+            </a:solidFill>
+          </a:ln>
+        </p:spPr>
+        <p:style>
+          <a:lnRef idx="2">
+            <a:schemeClr val="accent1">
+              <a:shade val="50000"/>
+            </a:schemeClr>
+          </a:lnRef>
+          <a:fillRef idx="1">
+            <a:schemeClr val="accent1"/>
+          </a:fillRef>
+          <a:effectRef idx="0">
+            <a:schemeClr val="accent1"/>
+          </a:effectRef>
+          <a:fontRef idx="minor">
+            <a:schemeClr val="lt1"/>
+          </a:fontRef>
+        </p:style>
+        <p:txBody>
+          <a:bodyPr rtlCol="0" anchor="ctr"/>
+          <a:lstStyle/>
+          <a:p>
+            <a:pPr algn="ctr"/>
+            <a:endParaRPr lang="en-NZ"/>
+          </a:p>
+        </p:txBody>
+      </p:sp>
+      <p:sp>
+        <p:nvSpPr>
+          <p:cNvPr id="22" name="Right Brace 21">
+            <a:extLst>
+              <a:ext uri="{FF2B5EF4-FFF2-40B4-BE49-F238E27FC236}">
+                <a16:creationId xmlns:a16="http://schemas.microsoft.com/office/drawing/2014/main" id="{19165035-DE11-46FC-8BBC-B9D1462B9A22}"/>
+              </a:ext>
+            </a:extLst>
+          </p:cNvPr>
+          <p:cNvSpPr/>
+          <p:nvPr/>
+        </p:nvSpPr>
+        <p:spPr>
+          <a:xfrm>
+            <a:off x="10128448" y="2193428"/>
+            <a:ext cx="216024" cy="4222561"/>
+          </a:xfrm>
+          <a:prstGeom prst="rightBrace">
+            <a:avLst/>
+          </a:prstGeom>
+          <a:ln>
+            <a:solidFill>
+              <a:schemeClr val="tx1">
+                <a:lumMod val="95000"/>
+                <a:lumOff val="5000"/>
+              </a:schemeClr>
+            </a:solidFill>
+          </a:ln>
+        </p:spPr>
+        <p:style>
+          <a:lnRef idx="1">
+            <a:schemeClr val="accent1"/>
+          </a:lnRef>
+          <a:fillRef idx="0">
+            <a:schemeClr val="accent1"/>
+          </a:fillRef>
+          <a:effectRef idx="0">
+            <a:schemeClr val="accent1"/>
+          </a:effectRef>
+          <a:fontRef idx="minor">
+            <a:schemeClr val="tx1"/>
+          </a:fontRef>
+        </p:style>
+        <p:txBody>
+          <a:bodyPr rtlCol="0" anchor="ctr"/>
+          <a:lstStyle/>
+          <a:p>
+            <a:pPr algn="ctr"/>
+            <a:endParaRPr lang="en-NZ"/>
+          </a:p>
+        </p:txBody>
+      </p:sp>
+      <p:sp>
+        <p:nvSpPr>
+          <p:cNvPr id="23" name="TextBox 22">
+            <a:extLst>
+              <a:ext uri="{FF2B5EF4-FFF2-40B4-BE49-F238E27FC236}">
+                <a16:creationId xmlns:a16="http://schemas.microsoft.com/office/drawing/2014/main" id="{F4D403E8-B268-4F7A-8FFC-2B631721BBBC}"/>
+              </a:ext>
+            </a:extLst>
+          </p:cNvPr>
+          <p:cNvSpPr txBox="1"/>
+          <p:nvPr/>
+        </p:nvSpPr>
+        <p:spPr>
+          <a:xfrm>
+            <a:off x="10418120" y="3889209"/>
+            <a:ext cx="1547634" cy="830997"/>
+          </a:xfrm>
+          <a:prstGeom prst="rect">
+            <a:avLst/>
+          </a:prstGeom>
+          <a:noFill/>
+        </p:spPr>
+        <p:txBody>
+          <a:bodyPr wrap="square" rtlCol="0">
+            <a:spAutoFit/>
+          </a:bodyPr>
+          <a:lstStyle/>
+          <a:p>
+            <a:pPr algn="ctr"/>
+            <a:r>
+              <a:rPr lang="en-NZ" sz="1600" dirty="0"/>
+              <a:t>Split dataset into 5 cross validation folds</a:t>
+            </a:r>
+          </a:p>
+        </p:txBody>
+      </p:sp>
+    </p:spTree>
+    <p:extLst>
+      <p:ext uri="{BB962C8B-B14F-4D97-AF65-F5344CB8AC3E}">
+        <p14:creationId xmlns:p14="http://schemas.microsoft.com/office/powerpoint/2010/main" val="1679529145"/>
       </p:ext>
     </p:extLst>
   </p:cSld>

</xml_diff>

<commit_message>
updated network diagrams to show ID-embedding connection
</commit_message>
<xml_diff>
--- a/figures/drawing-board.pptx
+++ b/figures/drawing-board.pptx
@@ -263,7 +263,7 @@
           <a:p>
             <a:fld id="{7FCAF9BE-84FA-4DCA-8252-942D07F2383A}" type="datetimeFigureOut">
               <a:rPr lang="en-NZ" smtClean="0"/>
-              <a:t>3/10/2019</a:t>
+              <a:t>19/11/2019</a:t>
             </a:fld>
             <a:endParaRPr lang="en-NZ"/>
           </a:p>
@@ -433,7 +433,7 @@
           <a:p>
             <a:fld id="{7FCAF9BE-84FA-4DCA-8252-942D07F2383A}" type="datetimeFigureOut">
               <a:rPr lang="en-NZ" smtClean="0"/>
-              <a:t>3/10/2019</a:t>
+              <a:t>19/11/2019</a:t>
             </a:fld>
             <a:endParaRPr lang="en-NZ"/>
           </a:p>
@@ -613,7 +613,7 @@
           <a:p>
             <a:fld id="{7FCAF9BE-84FA-4DCA-8252-942D07F2383A}" type="datetimeFigureOut">
               <a:rPr lang="en-NZ" smtClean="0"/>
-              <a:t>3/10/2019</a:t>
+              <a:t>19/11/2019</a:t>
             </a:fld>
             <a:endParaRPr lang="en-NZ"/>
           </a:p>
@@ -783,7 +783,7 @@
           <a:p>
             <a:fld id="{7FCAF9BE-84FA-4DCA-8252-942D07F2383A}" type="datetimeFigureOut">
               <a:rPr lang="en-NZ" smtClean="0"/>
-              <a:t>3/10/2019</a:t>
+              <a:t>19/11/2019</a:t>
             </a:fld>
             <a:endParaRPr lang="en-NZ"/>
           </a:p>
@@ -1029,7 +1029,7 @@
           <a:p>
             <a:fld id="{7FCAF9BE-84FA-4DCA-8252-942D07F2383A}" type="datetimeFigureOut">
               <a:rPr lang="en-NZ" smtClean="0"/>
-              <a:t>3/10/2019</a:t>
+              <a:t>19/11/2019</a:t>
             </a:fld>
             <a:endParaRPr lang="en-NZ"/>
           </a:p>
@@ -1261,7 +1261,7 @@
           <a:p>
             <a:fld id="{7FCAF9BE-84FA-4DCA-8252-942D07F2383A}" type="datetimeFigureOut">
               <a:rPr lang="en-NZ" smtClean="0"/>
-              <a:t>3/10/2019</a:t>
+              <a:t>19/11/2019</a:t>
             </a:fld>
             <a:endParaRPr lang="en-NZ"/>
           </a:p>
@@ -1628,7 +1628,7 @@
           <a:p>
             <a:fld id="{7FCAF9BE-84FA-4DCA-8252-942D07F2383A}" type="datetimeFigureOut">
               <a:rPr lang="en-NZ" smtClean="0"/>
-              <a:t>3/10/2019</a:t>
+              <a:t>19/11/2019</a:t>
             </a:fld>
             <a:endParaRPr lang="en-NZ"/>
           </a:p>
@@ -1746,7 +1746,7 @@
           <a:p>
             <a:fld id="{7FCAF9BE-84FA-4DCA-8252-942D07F2383A}" type="datetimeFigureOut">
               <a:rPr lang="en-NZ" smtClean="0"/>
-              <a:t>3/10/2019</a:t>
+              <a:t>19/11/2019</a:t>
             </a:fld>
             <a:endParaRPr lang="en-NZ"/>
           </a:p>
@@ -1841,7 +1841,7 @@
           <a:p>
             <a:fld id="{7FCAF9BE-84FA-4DCA-8252-942D07F2383A}" type="datetimeFigureOut">
               <a:rPr lang="en-NZ" smtClean="0"/>
-              <a:t>3/10/2019</a:t>
+              <a:t>19/11/2019</a:t>
             </a:fld>
             <a:endParaRPr lang="en-NZ"/>
           </a:p>
@@ -2118,7 +2118,7 @@
           <a:p>
             <a:fld id="{7FCAF9BE-84FA-4DCA-8252-942D07F2383A}" type="datetimeFigureOut">
               <a:rPr lang="en-NZ" smtClean="0"/>
-              <a:t>3/10/2019</a:t>
+              <a:t>19/11/2019</a:t>
             </a:fld>
             <a:endParaRPr lang="en-NZ"/>
           </a:p>
@@ -2375,7 +2375,7 @@
           <a:p>
             <a:fld id="{7FCAF9BE-84FA-4DCA-8252-942D07F2383A}" type="datetimeFigureOut">
               <a:rPr lang="en-NZ" smtClean="0"/>
-              <a:t>3/10/2019</a:t>
+              <a:t>19/11/2019</a:t>
             </a:fld>
             <a:endParaRPr lang="en-NZ"/>
           </a:p>
@@ -2588,7 +2588,7 @@
           <a:p>
             <a:fld id="{7FCAF9BE-84FA-4DCA-8252-942D07F2383A}" type="datetimeFigureOut">
               <a:rPr lang="en-NZ" smtClean="0"/>
-              <a:t>3/10/2019</a:t>
+              <a:t>19/11/2019</a:t>
             </a:fld>
             <a:endParaRPr lang="en-NZ"/>
           </a:p>
@@ -2977,7 +2977,7 @@
 </file>
 
 <file path=ppt/slides/slide1.xml><?xml version="1.0" encoding="utf-8"?>
-<p:sld xmlns:a="http://schemas.openxmlformats.org/drawingml/2006/main" xmlns:r="http://schemas.openxmlformats.org/officeDocument/2006/relationships" xmlns:p="http://schemas.openxmlformats.org/presentationml/2006/main" show="0">
+<p:sld xmlns:a="http://schemas.openxmlformats.org/drawingml/2006/main" xmlns:r="http://schemas.openxmlformats.org/officeDocument/2006/relationships" xmlns:p="http://schemas.openxmlformats.org/presentationml/2006/main">
   <p:cSld>
     <p:spTree>
       <p:nvGrpSpPr>
@@ -2993,6 +2993,48 @@
           <a:chExt cx="0" cy="0"/>
         </a:xfrm>
       </p:grpSpPr>
+      <p:cxnSp>
+        <p:nvCxnSpPr>
+          <p:cNvPr id="23" name="Straight Arrow Connector 22">
+            <a:extLst>
+              <a:ext uri="{FF2B5EF4-FFF2-40B4-BE49-F238E27FC236}">
+                <a16:creationId xmlns:a16="http://schemas.microsoft.com/office/drawing/2014/main" id="{28C569AD-5B26-4762-A354-A580A6EE8A4D}"/>
+              </a:ext>
+            </a:extLst>
+          </p:cNvPr>
+          <p:cNvCxnSpPr>
+            <a:cxnSpLocks/>
+            <a:stCxn id="272" idx="0"/>
+          </p:cNvCxnSpPr>
+          <p:nvPr/>
+        </p:nvCxnSpPr>
+        <p:spPr>
+          <a:xfrm flipV="1">
+            <a:off x="3984141" y="5733256"/>
+            <a:ext cx="0" cy="218375"/>
+          </a:xfrm>
+          <a:prstGeom prst="straightConnector1">
+            <a:avLst/>
+          </a:prstGeom>
+          <a:ln>
+            <a:tailEnd type="triangle"/>
+          </a:ln>
+        </p:spPr>
+        <p:style>
+          <a:lnRef idx="1">
+            <a:schemeClr val="dk1"/>
+          </a:lnRef>
+          <a:fillRef idx="0">
+            <a:schemeClr val="dk1"/>
+          </a:fillRef>
+          <a:effectRef idx="0">
+            <a:schemeClr val="dk1"/>
+          </a:effectRef>
+          <a:fontRef idx="minor">
+            <a:schemeClr val="tx1"/>
+          </a:fontRef>
+        </p:style>
+      </p:cxnSp>
       <p:sp>
         <p:nvSpPr>
           <p:cNvPr id="4" name="Flowchart: Connector 3">
@@ -6351,6 +6393,48 @@
           </a:p>
         </p:txBody>
       </p:sp>
+      <p:cxnSp>
+        <p:nvCxnSpPr>
+          <p:cNvPr id="103" name="Straight Arrow Connector 102">
+            <a:extLst>
+              <a:ext uri="{FF2B5EF4-FFF2-40B4-BE49-F238E27FC236}">
+                <a16:creationId xmlns:a16="http://schemas.microsoft.com/office/drawing/2014/main" id="{0C02EAAD-9967-4931-AA77-ABB88FCE1529}"/>
+              </a:ext>
+            </a:extLst>
+          </p:cNvPr>
+          <p:cNvCxnSpPr>
+            <a:cxnSpLocks/>
+            <a:stCxn id="273" idx="0"/>
+          </p:cNvCxnSpPr>
+          <p:nvPr/>
+        </p:nvCxnSpPr>
+        <p:spPr>
+          <a:xfrm flipV="1">
+            <a:off x="7906241" y="5733256"/>
+            <a:ext cx="0" cy="218374"/>
+          </a:xfrm>
+          <a:prstGeom prst="straightConnector1">
+            <a:avLst/>
+          </a:prstGeom>
+          <a:ln>
+            <a:tailEnd type="triangle"/>
+          </a:ln>
+        </p:spPr>
+        <p:style>
+          <a:lnRef idx="1">
+            <a:schemeClr val="dk1"/>
+          </a:lnRef>
+          <a:fillRef idx="0">
+            <a:schemeClr val="dk1"/>
+          </a:fillRef>
+          <a:effectRef idx="0">
+            <a:schemeClr val="dk1"/>
+          </a:effectRef>
+          <a:fontRef idx="minor">
+            <a:schemeClr val="tx1"/>
+          </a:fontRef>
+        </p:style>
+      </p:cxnSp>
     </p:spTree>
     <p:extLst>
       <p:ext uri="{BB962C8B-B14F-4D97-AF65-F5344CB8AC3E}">
@@ -6365,7 +6449,7 @@
 </file>
 
 <file path=ppt/slides/slide10.xml><?xml version="1.0" encoding="utf-8"?>
-<p:sld xmlns:a="http://schemas.openxmlformats.org/drawingml/2006/main" xmlns:r="http://schemas.openxmlformats.org/officeDocument/2006/relationships" xmlns:p="http://schemas.openxmlformats.org/presentationml/2006/main">
+<p:sld xmlns:a="http://schemas.openxmlformats.org/drawingml/2006/main" xmlns:r="http://schemas.openxmlformats.org/officeDocument/2006/relationships" xmlns:p="http://schemas.openxmlformats.org/presentationml/2006/main" show="0">
   <p:cSld>
     <p:spTree>
       <p:nvGrpSpPr>
@@ -22307,6 +22391,47 @@
           </a:p>
         </p:txBody>
       </p:sp>
+      <p:cxnSp>
+        <p:nvCxnSpPr>
+          <p:cNvPr id="131" name="Straight Arrow Connector 130">
+            <a:extLst>
+              <a:ext uri="{FF2B5EF4-FFF2-40B4-BE49-F238E27FC236}">
+                <a16:creationId xmlns:a16="http://schemas.microsoft.com/office/drawing/2014/main" id="{63B1FAC2-11A1-4FC7-BE1E-4636EF4C4CBB}"/>
+              </a:ext>
+            </a:extLst>
+          </p:cNvPr>
+          <p:cNvCxnSpPr>
+            <a:cxnSpLocks/>
+          </p:cNvCxnSpPr>
+          <p:nvPr/>
+        </p:nvCxnSpPr>
+        <p:spPr>
+          <a:xfrm flipV="1">
+            <a:off x="8923665" y="4502155"/>
+            <a:ext cx="0" cy="218375"/>
+          </a:xfrm>
+          <a:prstGeom prst="straightConnector1">
+            <a:avLst/>
+          </a:prstGeom>
+          <a:ln>
+            <a:tailEnd type="triangle"/>
+          </a:ln>
+        </p:spPr>
+        <p:style>
+          <a:lnRef idx="1">
+            <a:schemeClr val="dk1"/>
+          </a:lnRef>
+          <a:fillRef idx="0">
+            <a:schemeClr val="dk1"/>
+          </a:fillRef>
+          <a:effectRef idx="0">
+            <a:schemeClr val="dk1"/>
+          </a:effectRef>
+          <a:fontRef idx="minor">
+            <a:schemeClr val="tx1"/>
+          </a:fontRef>
+        </p:style>
+      </p:cxnSp>
     </p:spTree>
     <p:extLst>
       <p:ext uri="{BB962C8B-B14F-4D97-AF65-F5344CB8AC3E}">
@@ -24549,6 +24674,47 @@
           </a:p>
         </p:txBody>
       </p:sp>
+      <p:cxnSp>
+        <p:nvCxnSpPr>
+          <p:cNvPr id="53" name="Straight Arrow Connector 52">
+            <a:extLst>
+              <a:ext uri="{FF2B5EF4-FFF2-40B4-BE49-F238E27FC236}">
+                <a16:creationId xmlns:a16="http://schemas.microsoft.com/office/drawing/2014/main" id="{D18DE43A-52B3-4B35-83C7-2F98DF13007D}"/>
+              </a:ext>
+            </a:extLst>
+          </p:cNvPr>
+          <p:cNvCxnSpPr>
+            <a:cxnSpLocks/>
+          </p:cNvCxnSpPr>
+          <p:nvPr/>
+        </p:nvCxnSpPr>
+        <p:spPr>
+          <a:xfrm flipV="1">
+            <a:off x="6158748" y="5196045"/>
+            <a:ext cx="0" cy="218375"/>
+          </a:xfrm>
+          <a:prstGeom prst="straightConnector1">
+            <a:avLst/>
+          </a:prstGeom>
+          <a:ln>
+            <a:tailEnd type="triangle"/>
+          </a:ln>
+        </p:spPr>
+        <p:style>
+          <a:lnRef idx="1">
+            <a:schemeClr val="dk1"/>
+          </a:lnRef>
+          <a:fillRef idx="0">
+            <a:schemeClr val="dk1"/>
+          </a:fillRef>
+          <a:effectRef idx="0">
+            <a:schemeClr val="dk1"/>
+          </a:effectRef>
+          <a:fontRef idx="minor">
+            <a:schemeClr val="tx1"/>
+          </a:fontRef>
+        </p:style>
+      </p:cxnSp>
     </p:spTree>
     <p:extLst>
       <p:ext uri="{BB962C8B-B14F-4D97-AF65-F5344CB8AC3E}">

</xml_diff>